<commit_message>
Lectures 3 and 4 added for AZ
</commit_message>
<xml_diff>
--- a/Data Visualizationand Analysis/Lecture 2 - VISIT in 3D with IBAMR.pptx
+++ b/Data Visualizationand Analysis/Lecture 2 - VISIT in 3D with IBAMR.pptx
@@ -1,29 +1,29 @@
 
 <file path=ppt/presentation.xml><?xml version="1.0" encoding="utf-8"?>
-<p:presentation xmlns:a="http://schemas.openxmlformats.org/drawingml/2006/main" xmlns:r="http://schemas.openxmlformats.org/officeDocument/2006/relationships" xmlns:mc="http://schemas.openxmlformats.org/markup-compatibility/2006" xmlns:mv="urn:schemas-microsoft-com:mac:vml" xmlns:p="http://schemas.openxmlformats.org/presentationml/2006/main" xmlns:c="http://schemas.openxmlformats.org/drawingml/2006/chart" xmlns:dgm="http://schemas.openxmlformats.org/drawingml/2006/diagram" xmlns:o="urn:schemas-microsoft-com:office:office" xmlns:v="urn:schemas-microsoft-com:vml" xmlns:pvml="urn:schemas-microsoft-com:office:powerpoint" xmlns:com="http://schemas.openxmlformats.org/drawingml/2006/compatibility" xmlns:p14="http://schemas.microsoft.com/office/powerpoint/2010/main" xmlns:p15="http://schemas.microsoft.com/office/powerpoint/2012/main" autoCompressPictures="0" strictFirstAndLastChars="0" saveSubsetFonts="1">
+<p:presentation xmlns:a="http://schemas.openxmlformats.org/drawingml/2006/main" xmlns:r="http://schemas.openxmlformats.org/officeDocument/2006/relationships" xmlns:p="http://schemas.openxmlformats.org/presentationml/2006/main" strictFirstAndLastChars="0" saveSubsetFonts="1" autoCompressPictures="0">
   <p:sldMasterIdLst>
-    <p:sldMasterId id="2147483654" r:id="rId3"/>
+    <p:sldMasterId id="2147483654" r:id="rId1"/>
   </p:sldMasterIdLst>
   <p:notesMasterIdLst>
-    <p:notesMasterId r:id="rId4"/>
+    <p:notesMasterId r:id="rId13"/>
   </p:notesMasterIdLst>
   <p:sldIdLst>
-    <p:sldId id="256" r:id="rId5"/>
-    <p:sldId id="257" r:id="rId6"/>
-    <p:sldId id="258" r:id="rId7"/>
-    <p:sldId id="259" r:id="rId8"/>
-    <p:sldId id="260" r:id="rId9"/>
-    <p:sldId id="261" r:id="rId10"/>
-    <p:sldId id="262" r:id="rId11"/>
-    <p:sldId id="263" r:id="rId12"/>
-    <p:sldId id="264" r:id="rId13"/>
-    <p:sldId id="265" r:id="rId14"/>
-    <p:sldId id="266" r:id="rId15"/>
+    <p:sldId id="256" r:id="rId2"/>
+    <p:sldId id="257" r:id="rId3"/>
+    <p:sldId id="258" r:id="rId4"/>
+    <p:sldId id="259" r:id="rId5"/>
+    <p:sldId id="260" r:id="rId6"/>
+    <p:sldId id="261" r:id="rId7"/>
+    <p:sldId id="262" r:id="rId8"/>
+    <p:sldId id="263" r:id="rId9"/>
+    <p:sldId id="264" r:id="rId10"/>
+    <p:sldId id="265" r:id="rId11"/>
+    <p:sldId id="266" r:id="rId12"/>
   </p:sldIdLst>
-  <p:sldSz cy="5143500" cx="9144000"/>
+  <p:sldSz cx="9144000" cy="5143500" type="screen16x9"/>
   <p:notesSz cx="6858000" cy="9144000"/>
   <p:defaultTextStyle>
-    <a:defPPr lvl="0" marR="0" rtl="0" algn="l">
+    <a:defPPr marR="0" lvl="0" algn="l" rtl="0">
       <a:lnSpc>
         <a:spcPct val="100000"/>
       </a:lnSpc>
@@ -34,7 +34,7 @@
         <a:spcPts val="0"/>
       </a:spcAft>
     </a:defPPr>
-    <a:lvl1pPr lvl="0" marR="0" rtl="0" algn="l">
+    <a:lvl1pPr marR="0" lvl="0" algn="l" rtl="0">
       <a:lnSpc>
         <a:spcPct val="100000"/>
       </a:lnSpc>
@@ -48,7 +48,7 @@
         <a:srgbClr val="000000"/>
       </a:buClr>
       <a:buFont typeface="Arial"/>
-      <a:defRPr b="0" i="0" sz="1400" u="none" cap="none" strike="noStrike">
+      <a:defRPr sz="1400" b="0" i="0" u="none" strike="noStrike" cap="none">
         <a:solidFill>
           <a:srgbClr val="000000"/>
         </a:solidFill>
@@ -58,7 +58,7 @@
         <a:sym typeface="Arial"/>
       </a:defRPr>
     </a:lvl1pPr>
-    <a:lvl2pPr lvl="1" marR="0" rtl="0" algn="l">
+    <a:lvl2pPr marR="0" lvl="1" algn="l" rtl="0">
       <a:lnSpc>
         <a:spcPct val="100000"/>
       </a:lnSpc>
@@ -72,7 +72,7 @@
         <a:srgbClr val="000000"/>
       </a:buClr>
       <a:buFont typeface="Arial"/>
-      <a:defRPr b="0" i="0" sz="1400" u="none" cap="none" strike="noStrike">
+      <a:defRPr sz="1400" b="0" i="0" u="none" strike="noStrike" cap="none">
         <a:solidFill>
           <a:srgbClr val="000000"/>
         </a:solidFill>
@@ -82,7 +82,7 @@
         <a:sym typeface="Arial"/>
       </a:defRPr>
     </a:lvl2pPr>
-    <a:lvl3pPr lvl="2" marR="0" rtl="0" algn="l">
+    <a:lvl3pPr marR="0" lvl="2" algn="l" rtl="0">
       <a:lnSpc>
         <a:spcPct val="100000"/>
       </a:lnSpc>
@@ -96,7 +96,7 @@
         <a:srgbClr val="000000"/>
       </a:buClr>
       <a:buFont typeface="Arial"/>
-      <a:defRPr b="0" i="0" sz="1400" u="none" cap="none" strike="noStrike">
+      <a:defRPr sz="1400" b="0" i="0" u="none" strike="noStrike" cap="none">
         <a:solidFill>
           <a:srgbClr val="000000"/>
         </a:solidFill>
@@ -106,7 +106,7 @@
         <a:sym typeface="Arial"/>
       </a:defRPr>
     </a:lvl3pPr>
-    <a:lvl4pPr lvl="3" marR="0" rtl="0" algn="l">
+    <a:lvl4pPr marR="0" lvl="3" algn="l" rtl="0">
       <a:lnSpc>
         <a:spcPct val="100000"/>
       </a:lnSpc>
@@ -120,7 +120,7 @@
         <a:srgbClr val="000000"/>
       </a:buClr>
       <a:buFont typeface="Arial"/>
-      <a:defRPr b="0" i="0" sz="1400" u="none" cap="none" strike="noStrike">
+      <a:defRPr sz="1400" b="0" i="0" u="none" strike="noStrike" cap="none">
         <a:solidFill>
           <a:srgbClr val="000000"/>
         </a:solidFill>
@@ -130,7 +130,7 @@
         <a:sym typeface="Arial"/>
       </a:defRPr>
     </a:lvl4pPr>
-    <a:lvl5pPr lvl="4" marR="0" rtl="0" algn="l">
+    <a:lvl5pPr marR="0" lvl="4" algn="l" rtl="0">
       <a:lnSpc>
         <a:spcPct val="100000"/>
       </a:lnSpc>
@@ -144,7 +144,7 @@
         <a:srgbClr val="000000"/>
       </a:buClr>
       <a:buFont typeface="Arial"/>
-      <a:defRPr b="0" i="0" sz="1400" u="none" cap="none" strike="noStrike">
+      <a:defRPr sz="1400" b="0" i="0" u="none" strike="noStrike" cap="none">
         <a:solidFill>
           <a:srgbClr val="000000"/>
         </a:solidFill>
@@ -154,7 +154,7 @@
         <a:sym typeface="Arial"/>
       </a:defRPr>
     </a:lvl5pPr>
-    <a:lvl6pPr lvl="5" marR="0" rtl="0" algn="l">
+    <a:lvl6pPr marR="0" lvl="5" algn="l" rtl="0">
       <a:lnSpc>
         <a:spcPct val="100000"/>
       </a:lnSpc>
@@ -168,7 +168,7 @@
         <a:srgbClr val="000000"/>
       </a:buClr>
       <a:buFont typeface="Arial"/>
-      <a:defRPr b="0" i="0" sz="1400" u="none" cap="none" strike="noStrike">
+      <a:defRPr sz="1400" b="0" i="0" u="none" strike="noStrike" cap="none">
         <a:solidFill>
           <a:srgbClr val="000000"/>
         </a:solidFill>
@@ -178,7 +178,7 @@
         <a:sym typeface="Arial"/>
       </a:defRPr>
     </a:lvl6pPr>
-    <a:lvl7pPr lvl="6" marR="0" rtl="0" algn="l">
+    <a:lvl7pPr marR="0" lvl="6" algn="l" rtl="0">
       <a:lnSpc>
         <a:spcPct val="100000"/>
       </a:lnSpc>
@@ -192,7 +192,7 @@
         <a:srgbClr val="000000"/>
       </a:buClr>
       <a:buFont typeface="Arial"/>
-      <a:defRPr b="0" i="0" sz="1400" u="none" cap="none" strike="noStrike">
+      <a:defRPr sz="1400" b="0" i="0" u="none" strike="noStrike" cap="none">
         <a:solidFill>
           <a:srgbClr val="000000"/>
         </a:solidFill>
@@ -202,7 +202,7 @@
         <a:sym typeface="Arial"/>
       </a:defRPr>
     </a:lvl7pPr>
-    <a:lvl8pPr lvl="7" marR="0" rtl="0" algn="l">
+    <a:lvl8pPr marR="0" lvl="7" algn="l" rtl="0">
       <a:lnSpc>
         <a:spcPct val="100000"/>
       </a:lnSpc>
@@ -216,7 +216,7 @@
         <a:srgbClr val="000000"/>
       </a:buClr>
       <a:buFont typeface="Arial"/>
-      <a:defRPr b="0" i="0" sz="1400" u="none" cap="none" strike="noStrike">
+      <a:defRPr sz="1400" b="0" i="0" u="none" strike="noStrike" cap="none">
         <a:solidFill>
           <a:srgbClr val="000000"/>
         </a:solidFill>
@@ -226,7 +226,7 @@
         <a:sym typeface="Arial"/>
       </a:defRPr>
     </a:lvl8pPr>
-    <a:lvl9pPr lvl="8" marR="0" rtl="0" algn="l">
+    <a:lvl9pPr marR="0" lvl="8" algn="l" rtl="0">
       <a:lnSpc>
         <a:spcPct val="100000"/>
       </a:lnSpc>
@@ -240,7 +240,7 @@
         <a:srgbClr val="000000"/>
       </a:buClr>
       <a:buFont typeface="Arial"/>
-      <a:defRPr b="0" i="0" sz="1400" u="none" cap="none" strike="noStrike">
+      <a:defRPr sz="1400" b="0" i="0" u="none" strike="noStrike" cap="none">
         <a:solidFill>
           <a:srgbClr val="000000"/>
         </a:solidFill>
@@ -255,11 +255,16 @@
 </file>
 
 <file path=ppt/notesMasters/notesMaster1.xml><?xml version="1.0" encoding="utf-8"?>
-<p:notesMaster xmlns:a="http://schemas.openxmlformats.org/drawingml/2006/main" xmlns:r="http://schemas.openxmlformats.org/officeDocument/2006/relationships" xmlns:mc="http://schemas.openxmlformats.org/markup-compatibility/2006" xmlns:mv="urn:schemas-microsoft-com:mac:vml" xmlns:p="http://schemas.openxmlformats.org/presentationml/2006/main" xmlns:c="http://schemas.openxmlformats.org/drawingml/2006/chart" xmlns:dgm="http://schemas.openxmlformats.org/drawingml/2006/diagram" xmlns:o="urn:schemas-microsoft-com:office:office" xmlns:v="urn:schemas-microsoft-com:vml" xmlns:pvml="urn:schemas-microsoft-com:office:powerpoint" xmlns:com="http://schemas.openxmlformats.org/drawingml/2006/compatibility" xmlns:p14="http://schemas.microsoft.com/office/powerpoint/2010/main" xmlns:p15="http://schemas.microsoft.com/office/powerpoint/2012/main">
+<p:notesMaster xmlns:a="http://schemas.openxmlformats.org/drawingml/2006/main" xmlns:r="http://schemas.openxmlformats.org/officeDocument/2006/relationships" xmlns:p="http://schemas.openxmlformats.org/presentationml/2006/main">
   <p:cSld>
+    <p:bg>
+      <p:bgRef idx="1001">
+        <a:schemeClr val="bg1"/>
+      </p:bgRef>
+    </p:bg>
     <p:spTree>
       <p:nvGrpSpPr>
-        <p:cNvPr id="2" name="Shape 2"/>
+        <p:cNvPr id="1" name="Shape 2"/>
         <p:cNvGrpSpPr/>
         <p:nvPr/>
       </p:nvGrpSpPr>
@@ -274,9 +279,11 @@
       <p:sp>
         <p:nvSpPr>
           <p:cNvPr id="3" name="Google Shape;3;n"/>
-          <p:cNvSpPr/>
+          <p:cNvSpPr>
+            <a:spLocks noGrp="1" noRot="1" noChangeAspect="1"/>
+          </p:cNvSpPr>
           <p:nvPr>
-            <p:ph idx="2" type="sldImg"/>
+            <p:ph type="sldImg" idx="2"/>
           </p:nvPr>
         </p:nvSpPr>
         <p:spPr>
@@ -285,9 +292,13 @@
             <a:ext cx="6096300" cy="3429000"/>
           </a:xfrm>
           <a:custGeom>
-            <a:rect b="b" l="l" r="r" t="t"/>
+            <a:avLst/>
+            <a:gdLst/>
+            <a:ahLst/>
+            <a:cxnLst/>
+            <a:rect l="l" t="t" r="r" b="b"/>
             <a:pathLst>
-              <a:path extrusionOk="0" h="120000" w="120000">
+              <a:path w="120000" h="120000" extrusionOk="0">
                 <a:moveTo>
                   <a:pt x="0" y="0"/>
                 </a:moveTo>
@@ -305,23 +316,25 @@
             </a:pathLst>
           </a:custGeom>
           <a:noFill/>
-          <a:ln cap="flat" cmpd="sng" w="9525">
+          <a:ln w="9525" cap="flat" cmpd="sng">
             <a:solidFill>
               <a:srgbClr val="000000"/>
             </a:solidFill>
             <a:prstDash val="solid"/>
             <a:round/>
-            <a:headEnd len="sm" w="sm" type="none"/>
-            <a:tailEnd len="sm" w="sm" type="none"/>
+            <a:headEnd type="none" w="sm" len="sm"/>
+            <a:tailEnd type="none" w="sm" len="sm"/>
           </a:ln>
         </p:spPr>
       </p:sp>
       <p:sp>
         <p:nvSpPr>
           <p:cNvPr id="4" name="Google Shape;4;n"/>
-          <p:cNvSpPr txBox="1"/>
+          <p:cNvSpPr txBox="1">
+            <a:spLocks noGrp="1"/>
+          </p:cNvSpPr>
           <p:nvPr>
-            <p:ph idx="1" type="body"/>
+            <p:ph type="body" idx="1"/>
           </p:nvPr>
         </p:nvSpPr>
         <p:spPr>
@@ -338,11 +351,11 @@
           </a:ln>
         </p:spPr>
         <p:txBody>
-          <a:bodyPr anchorCtr="0" anchor="t" bIns="91425" lIns="91425" spcFirstLastPara="1" rIns="91425" wrap="square" tIns="91425">
+          <a:bodyPr spcFirstLastPara="1" wrap="square" lIns="91425" tIns="91425" rIns="91425" bIns="91425" anchor="t" anchorCtr="0">
             <a:noAutofit/>
           </a:bodyPr>
           <a:lstStyle>
-            <a:lvl1pPr indent="-317500" lvl="0" marL="457200">
+            <a:lvl1pPr marL="457200" lvl="0" indent="-317500">
               <a:spcBef>
                 <a:spcPts val="0"/>
               </a:spcBef>
@@ -353,7 +366,7 @@
               <a:buChar char="●"/>
               <a:defRPr sz="1100"/>
             </a:lvl1pPr>
-            <a:lvl2pPr indent="-317500" lvl="1" marL="914400">
+            <a:lvl2pPr marL="914400" lvl="1" indent="-317500">
               <a:spcBef>
                 <a:spcPts val="0"/>
               </a:spcBef>
@@ -364,7 +377,7 @@
               <a:buChar char="○"/>
               <a:defRPr sz="1100"/>
             </a:lvl2pPr>
-            <a:lvl3pPr indent="-317500" lvl="2" marL="1371600">
+            <a:lvl3pPr marL="1371600" lvl="2" indent="-317500">
               <a:spcBef>
                 <a:spcPts val="0"/>
               </a:spcBef>
@@ -375,7 +388,7 @@
               <a:buChar char="■"/>
               <a:defRPr sz="1100"/>
             </a:lvl3pPr>
-            <a:lvl4pPr indent="-317500" lvl="3" marL="1828800">
+            <a:lvl4pPr marL="1828800" lvl="3" indent="-317500">
               <a:spcBef>
                 <a:spcPts val="0"/>
               </a:spcBef>
@@ -386,7 +399,7 @@
               <a:buChar char="●"/>
               <a:defRPr sz="1100"/>
             </a:lvl4pPr>
-            <a:lvl5pPr indent="-317500" lvl="4" marL="2286000">
+            <a:lvl5pPr marL="2286000" lvl="4" indent="-317500">
               <a:spcBef>
                 <a:spcPts val="0"/>
               </a:spcBef>
@@ -397,7 +410,7 @@
               <a:buChar char="○"/>
               <a:defRPr sz="1100"/>
             </a:lvl5pPr>
-            <a:lvl6pPr indent="-317500" lvl="5" marL="2743200">
+            <a:lvl6pPr marL="2743200" lvl="5" indent="-317500">
               <a:spcBef>
                 <a:spcPts val="0"/>
               </a:spcBef>
@@ -408,7 +421,7 @@
               <a:buChar char="■"/>
               <a:defRPr sz="1100"/>
             </a:lvl6pPr>
-            <a:lvl7pPr indent="-317500" lvl="6" marL="3200400">
+            <a:lvl7pPr marL="3200400" lvl="6" indent="-317500">
               <a:spcBef>
                 <a:spcPts val="0"/>
               </a:spcBef>
@@ -419,7 +432,7 @@
               <a:buChar char="●"/>
               <a:defRPr sz="1100"/>
             </a:lvl7pPr>
-            <a:lvl8pPr indent="-317500" lvl="7" marL="3657600">
+            <a:lvl8pPr marL="3657600" lvl="7" indent="-317500">
               <a:spcBef>
                 <a:spcPts val="0"/>
               </a:spcBef>
@@ -430,7 +443,7 @@
               <a:buChar char="○"/>
               <a:defRPr sz="1100"/>
             </a:lvl8pPr>
-            <a:lvl9pPr indent="-317500" lvl="8" marL="4114800">
+            <a:lvl9pPr marL="4114800" lvl="8" indent="-317500">
               <a:spcBef>
                 <a:spcPts val="0"/>
               </a:spcBef>
@@ -442,14 +455,16 @@
               <a:defRPr sz="1100"/>
             </a:lvl9pPr>
           </a:lstStyle>
-          <a:p/>
+          <a:p>
+            <a:endParaRPr/>
+          </a:p>
         </p:txBody>
       </p:sp>
     </p:spTree>
   </p:cSld>
-  <p:clrMap accent1="accent1" accent2="accent2" accent3="accent3" accent4="accent4" accent5="accent5" accent6="accent6" bg1="lt1" bg2="dk2" tx1="dk1" tx2="lt2" folHlink="folHlink" hlink="hlink"/>
+  <p:clrMap bg1="lt1" tx1="dk1" bg2="dk2" tx2="lt2" accent1="accent1" accent2="accent2" accent3="accent3" accent4="accent4" accent5="accent5" accent6="accent6" hlink="hlink" folHlink="folHlink"/>
   <p:notesStyle>
-    <a:defPPr lvl="0" marR="0" rtl="0" algn="l">
+    <a:defPPr marR="0" lvl="0" algn="l" rtl="0">
       <a:lnSpc>
         <a:spcPct val="100000"/>
       </a:lnSpc>
@@ -460,7 +475,7 @@
         <a:spcPts val="0"/>
       </a:spcAft>
     </a:defPPr>
-    <a:lvl1pPr lvl="0" marR="0" rtl="0" algn="l">
+    <a:lvl1pPr marR="0" lvl="0" algn="l" rtl="0">
       <a:lnSpc>
         <a:spcPct val="100000"/>
       </a:lnSpc>
@@ -474,7 +489,7 @@
         <a:srgbClr val="000000"/>
       </a:buClr>
       <a:buFont typeface="Arial"/>
-      <a:defRPr b="0" i="0" sz="1400" u="none" cap="none" strike="noStrike">
+      <a:defRPr sz="1400" b="0" i="0" u="none" strike="noStrike" cap="none">
         <a:solidFill>
           <a:srgbClr val="000000"/>
         </a:solidFill>
@@ -484,7 +499,7 @@
         <a:sym typeface="Arial"/>
       </a:defRPr>
     </a:lvl1pPr>
-    <a:lvl2pPr lvl="1" marR="0" rtl="0" algn="l">
+    <a:lvl2pPr marR="0" lvl="1" algn="l" rtl="0">
       <a:lnSpc>
         <a:spcPct val="100000"/>
       </a:lnSpc>
@@ -498,7 +513,7 @@
         <a:srgbClr val="000000"/>
       </a:buClr>
       <a:buFont typeface="Arial"/>
-      <a:defRPr b="0" i="0" sz="1400" u="none" cap="none" strike="noStrike">
+      <a:defRPr sz="1400" b="0" i="0" u="none" strike="noStrike" cap="none">
         <a:solidFill>
           <a:srgbClr val="000000"/>
         </a:solidFill>
@@ -508,7 +523,7 @@
         <a:sym typeface="Arial"/>
       </a:defRPr>
     </a:lvl2pPr>
-    <a:lvl3pPr lvl="2" marR="0" rtl="0" algn="l">
+    <a:lvl3pPr marR="0" lvl="2" algn="l" rtl="0">
       <a:lnSpc>
         <a:spcPct val="100000"/>
       </a:lnSpc>
@@ -522,7 +537,7 @@
         <a:srgbClr val="000000"/>
       </a:buClr>
       <a:buFont typeface="Arial"/>
-      <a:defRPr b="0" i="0" sz="1400" u="none" cap="none" strike="noStrike">
+      <a:defRPr sz="1400" b="0" i="0" u="none" strike="noStrike" cap="none">
         <a:solidFill>
           <a:srgbClr val="000000"/>
         </a:solidFill>
@@ -532,7 +547,7 @@
         <a:sym typeface="Arial"/>
       </a:defRPr>
     </a:lvl3pPr>
-    <a:lvl4pPr lvl="3" marR="0" rtl="0" algn="l">
+    <a:lvl4pPr marR="0" lvl="3" algn="l" rtl="0">
       <a:lnSpc>
         <a:spcPct val="100000"/>
       </a:lnSpc>
@@ -546,7 +561,7 @@
         <a:srgbClr val="000000"/>
       </a:buClr>
       <a:buFont typeface="Arial"/>
-      <a:defRPr b="0" i="0" sz="1400" u="none" cap="none" strike="noStrike">
+      <a:defRPr sz="1400" b="0" i="0" u="none" strike="noStrike" cap="none">
         <a:solidFill>
           <a:srgbClr val="000000"/>
         </a:solidFill>
@@ -556,7 +571,7 @@
         <a:sym typeface="Arial"/>
       </a:defRPr>
     </a:lvl4pPr>
-    <a:lvl5pPr lvl="4" marR="0" rtl="0" algn="l">
+    <a:lvl5pPr marR="0" lvl="4" algn="l" rtl="0">
       <a:lnSpc>
         <a:spcPct val="100000"/>
       </a:lnSpc>
@@ -570,7 +585,7 @@
         <a:srgbClr val="000000"/>
       </a:buClr>
       <a:buFont typeface="Arial"/>
-      <a:defRPr b="0" i="0" sz="1400" u="none" cap="none" strike="noStrike">
+      <a:defRPr sz="1400" b="0" i="0" u="none" strike="noStrike" cap="none">
         <a:solidFill>
           <a:srgbClr val="000000"/>
         </a:solidFill>
@@ -580,7 +595,7 @@
         <a:sym typeface="Arial"/>
       </a:defRPr>
     </a:lvl5pPr>
-    <a:lvl6pPr lvl="5" marR="0" rtl="0" algn="l">
+    <a:lvl6pPr marR="0" lvl="5" algn="l" rtl="0">
       <a:lnSpc>
         <a:spcPct val="100000"/>
       </a:lnSpc>
@@ -594,7 +609,7 @@
         <a:srgbClr val="000000"/>
       </a:buClr>
       <a:buFont typeface="Arial"/>
-      <a:defRPr b="0" i="0" sz="1400" u="none" cap="none" strike="noStrike">
+      <a:defRPr sz="1400" b="0" i="0" u="none" strike="noStrike" cap="none">
         <a:solidFill>
           <a:srgbClr val="000000"/>
         </a:solidFill>
@@ -604,7 +619,7 @@
         <a:sym typeface="Arial"/>
       </a:defRPr>
     </a:lvl6pPr>
-    <a:lvl7pPr lvl="6" marR="0" rtl="0" algn="l">
+    <a:lvl7pPr marR="0" lvl="6" algn="l" rtl="0">
       <a:lnSpc>
         <a:spcPct val="100000"/>
       </a:lnSpc>
@@ -618,7 +633,7 @@
         <a:srgbClr val="000000"/>
       </a:buClr>
       <a:buFont typeface="Arial"/>
-      <a:defRPr b="0" i="0" sz="1400" u="none" cap="none" strike="noStrike">
+      <a:defRPr sz="1400" b="0" i="0" u="none" strike="noStrike" cap="none">
         <a:solidFill>
           <a:srgbClr val="000000"/>
         </a:solidFill>
@@ -628,7 +643,7 @@
         <a:sym typeface="Arial"/>
       </a:defRPr>
     </a:lvl7pPr>
-    <a:lvl8pPr lvl="7" marR="0" rtl="0" algn="l">
+    <a:lvl8pPr marR="0" lvl="7" algn="l" rtl="0">
       <a:lnSpc>
         <a:spcPct val="100000"/>
       </a:lnSpc>
@@ -642,7 +657,7 @@
         <a:srgbClr val="000000"/>
       </a:buClr>
       <a:buFont typeface="Arial"/>
-      <a:defRPr b="0" i="0" sz="1400" u="none" cap="none" strike="noStrike">
+      <a:defRPr sz="1400" b="0" i="0" u="none" strike="noStrike" cap="none">
         <a:solidFill>
           <a:srgbClr val="000000"/>
         </a:solidFill>
@@ -652,7 +667,7 @@
         <a:sym typeface="Arial"/>
       </a:defRPr>
     </a:lvl8pPr>
-    <a:lvl9pPr lvl="8" marR="0" rtl="0" algn="l">
+    <a:lvl9pPr marR="0" lvl="8" algn="l" rtl="0">
       <a:lnSpc>
         <a:spcPct val="100000"/>
       </a:lnSpc>
@@ -666,7 +681,7 @@
         <a:srgbClr val="000000"/>
       </a:buClr>
       <a:buFont typeface="Arial"/>
-      <a:defRPr b="0" i="0" sz="1400" u="none" cap="none" strike="noStrike">
+      <a:defRPr sz="1400" b="0" i="0" u="none" strike="noStrike" cap="none">
         <a:solidFill>
           <a:srgbClr val="000000"/>
         </a:solidFill>
@@ -681,11 +696,11 @@
 </file>
 
 <file path=ppt/notesSlides/notesSlide1.xml><?xml version="1.0" encoding="utf-8"?>
-<p:notes xmlns:a="http://schemas.openxmlformats.org/drawingml/2006/main" xmlns:r="http://schemas.openxmlformats.org/officeDocument/2006/relationships" xmlns:mc="http://schemas.openxmlformats.org/markup-compatibility/2006" xmlns:mv="urn:schemas-microsoft-com:mac:vml" xmlns:p="http://schemas.openxmlformats.org/presentationml/2006/main" xmlns:c="http://schemas.openxmlformats.org/drawingml/2006/chart" xmlns:dgm="http://schemas.openxmlformats.org/drawingml/2006/diagram" xmlns:o="urn:schemas-microsoft-com:office:office" xmlns:v="urn:schemas-microsoft-com:vml" xmlns:pvml="urn:schemas-microsoft-com:office:powerpoint" xmlns:com="http://schemas.openxmlformats.org/drawingml/2006/compatibility" xmlns:p14="http://schemas.microsoft.com/office/powerpoint/2010/main" xmlns:p15="http://schemas.microsoft.com/office/powerpoint/2012/main" showMasterPhAnim="0" showMasterSp="0">
+<p:notes xmlns:a="http://schemas.openxmlformats.org/drawingml/2006/main" xmlns:r="http://schemas.openxmlformats.org/officeDocument/2006/relationships" xmlns:p="http://schemas.openxmlformats.org/presentationml/2006/main" showMasterSp="0" showMasterPhAnim="0">
   <p:cSld>
     <p:spTree>
       <p:nvGrpSpPr>
-        <p:cNvPr id="23" name="Shape 23"/>
+        <p:cNvPr id="1" name="Shape 23"/>
         <p:cNvGrpSpPr/>
         <p:nvPr/>
       </p:nvGrpSpPr>
@@ -700,9 +715,11 @@
       <p:sp>
         <p:nvSpPr>
           <p:cNvPr id="24" name="Google Shape;24;p:notes"/>
-          <p:cNvSpPr/>
+          <p:cNvSpPr>
+            <a:spLocks noGrp="1" noRot="1" noChangeAspect="1"/>
+          </p:cNvSpPr>
           <p:nvPr>
-            <p:ph idx="2" type="sldImg"/>
+            <p:ph type="sldImg" idx="2"/>
           </p:nvPr>
         </p:nvSpPr>
         <p:spPr>
@@ -711,9 +728,13 @@
             <a:ext cx="6096300" cy="3429000"/>
           </a:xfrm>
           <a:custGeom>
-            <a:rect b="b" l="l" r="r" t="t"/>
+            <a:avLst/>
+            <a:gdLst/>
+            <a:ahLst/>
+            <a:cxnLst/>
+            <a:rect l="l" t="t" r="r" b="b"/>
             <a:pathLst>
-              <a:path extrusionOk="0" h="120000" w="120000">
+              <a:path w="120000" h="120000" extrusionOk="0">
                 <a:moveTo>
                   <a:pt x="0" y="0"/>
                 </a:moveTo>
@@ -735,9 +756,11 @@
       <p:sp>
         <p:nvSpPr>
           <p:cNvPr id="25" name="Google Shape;25;p:notes"/>
-          <p:cNvSpPr txBox="1"/>
+          <p:cNvSpPr txBox="1">
+            <a:spLocks noGrp="1"/>
+          </p:cNvSpPr>
           <p:nvPr>
-            <p:ph idx="1" type="body"/>
+            <p:ph type="body" idx="1"/>
           </p:nvPr>
         </p:nvSpPr>
         <p:spPr>
@@ -750,12 +773,12 @@
           </a:prstGeom>
         </p:spPr>
         <p:txBody>
-          <a:bodyPr anchorCtr="0" anchor="t" bIns="91425" lIns="91425" spcFirstLastPara="1" rIns="91425" wrap="square" tIns="91425">
+          <a:bodyPr spcFirstLastPara="1" wrap="square" lIns="91425" tIns="91425" rIns="91425" bIns="91425" anchor="t" anchorCtr="0">
             <a:noAutofit/>
           </a:bodyPr>
           <a:lstStyle/>
           <a:p>
-            <a:pPr indent="0" lvl="0" marL="0" rtl="0" algn="l">
+            <a:pPr marL="0" lvl="0" indent="0" algn="l" rtl="0">
               <a:spcBef>
                 <a:spcPts val="0"/>
               </a:spcBef>
@@ -764,9 +787,6 @@
               </a:spcAft>
               <a:buNone/>
             </a:pPr>
-            <a:r>
-              <a:t/>
-            </a:r>
             <a:endParaRPr/>
           </a:p>
         </p:txBody>
@@ -780,11 +800,11 @@
 </file>
 
 <file path=ppt/notesSlides/notesSlide10.xml><?xml version="1.0" encoding="utf-8"?>
-<p:notes xmlns:a="http://schemas.openxmlformats.org/drawingml/2006/main" xmlns:r="http://schemas.openxmlformats.org/officeDocument/2006/relationships" xmlns:mc="http://schemas.openxmlformats.org/markup-compatibility/2006" xmlns:mv="urn:schemas-microsoft-com:mac:vml" xmlns:p="http://schemas.openxmlformats.org/presentationml/2006/main" xmlns:c="http://schemas.openxmlformats.org/drawingml/2006/chart" xmlns:dgm="http://schemas.openxmlformats.org/drawingml/2006/diagram" xmlns:o="urn:schemas-microsoft-com:office:office" xmlns:v="urn:schemas-microsoft-com:vml" xmlns:pvml="urn:schemas-microsoft-com:office:powerpoint" xmlns:com="http://schemas.openxmlformats.org/drawingml/2006/compatibility" xmlns:p14="http://schemas.microsoft.com/office/powerpoint/2010/main" xmlns:p15="http://schemas.microsoft.com/office/powerpoint/2012/main" showMasterPhAnim="0" showMasterSp="0">
+<p:notes xmlns:a="http://schemas.openxmlformats.org/drawingml/2006/main" xmlns:r="http://schemas.openxmlformats.org/officeDocument/2006/relationships" xmlns:p="http://schemas.openxmlformats.org/presentationml/2006/main" showMasterSp="0" showMasterPhAnim="0">
   <p:cSld>
     <p:spTree>
       <p:nvGrpSpPr>
-        <p:cNvPr id="78" name="Shape 78"/>
+        <p:cNvPr id="1" name="Shape 78"/>
         <p:cNvGrpSpPr/>
         <p:nvPr/>
       </p:nvGrpSpPr>
@@ -799,20 +819,26 @@
       <p:sp>
         <p:nvSpPr>
           <p:cNvPr id="79" name="Google Shape;79;g189e9488b_023:notes"/>
-          <p:cNvSpPr/>
+          <p:cNvSpPr>
+            <a:spLocks noGrp="1" noRot="1" noChangeAspect="1"/>
+          </p:cNvSpPr>
           <p:nvPr>
-            <p:ph idx="2" type="sldImg"/>
+            <p:ph type="sldImg" idx="2"/>
           </p:nvPr>
         </p:nvSpPr>
         <p:spPr>
           <a:xfrm>
-            <a:off x="381188" y="685800"/>
-            <a:ext cx="6096300" cy="3429000"/>
+            <a:off x="381000" y="685800"/>
+            <a:ext cx="6096000" cy="3429000"/>
           </a:xfrm>
           <a:custGeom>
-            <a:rect b="b" l="l" r="r" t="t"/>
+            <a:avLst/>
+            <a:gdLst/>
+            <a:ahLst/>
+            <a:cxnLst/>
+            <a:rect l="l" t="t" r="r" b="b"/>
             <a:pathLst>
-              <a:path extrusionOk="0" h="120000" w="120000">
+              <a:path w="120000" h="120000" extrusionOk="0">
                 <a:moveTo>
                   <a:pt x="0" y="0"/>
                 </a:moveTo>
@@ -834,9 +860,11 @@
       <p:sp>
         <p:nvSpPr>
           <p:cNvPr id="80" name="Google Shape;80;g189e9488b_023:notes"/>
-          <p:cNvSpPr txBox="1"/>
+          <p:cNvSpPr txBox="1">
+            <a:spLocks noGrp="1"/>
+          </p:cNvSpPr>
           <p:nvPr>
-            <p:ph idx="1" type="body"/>
+            <p:ph type="body" idx="1"/>
           </p:nvPr>
         </p:nvSpPr>
         <p:spPr>
@@ -849,12 +877,12 @@
           </a:prstGeom>
         </p:spPr>
         <p:txBody>
-          <a:bodyPr anchorCtr="0" anchor="t" bIns="91425" lIns="91425" spcFirstLastPara="1" rIns="91425" wrap="square" tIns="91425">
+          <a:bodyPr spcFirstLastPara="1" wrap="square" lIns="91425" tIns="91425" rIns="91425" bIns="91425" anchor="t" anchorCtr="0">
             <a:noAutofit/>
           </a:bodyPr>
           <a:lstStyle/>
           <a:p>
-            <a:pPr indent="0" lvl="0" marL="0" rtl="0" algn="l">
+            <a:pPr marL="0" lvl="0" indent="0" algn="l" rtl="0">
               <a:spcBef>
                 <a:spcPts val="0"/>
               </a:spcBef>
@@ -863,9 +891,6 @@
               </a:spcAft>
               <a:buNone/>
             </a:pPr>
-            <a:r>
-              <a:t/>
-            </a:r>
             <a:endParaRPr/>
           </a:p>
         </p:txBody>
@@ -879,11 +904,11 @@
 </file>
 
 <file path=ppt/notesSlides/notesSlide11.xml><?xml version="1.0" encoding="utf-8"?>
-<p:notes xmlns:a="http://schemas.openxmlformats.org/drawingml/2006/main" xmlns:r="http://schemas.openxmlformats.org/officeDocument/2006/relationships" xmlns:mc="http://schemas.openxmlformats.org/markup-compatibility/2006" xmlns:mv="urn:schemas-microsoft-com:mac:vml" xmlns:p="http://schemas.openxmlformats.org/presentationml/2006/main" xmlns:c="http://schemas.openxmlformats.org/drawingml/2006/chart" xmlns:dgm="http://schemas.openxmlformats.org/drawingml/2006/diagram" xmlns:o="urn:schemas-microsoft-com:office:office" xmlns:v="urn:schemas-microsoft-com:vml" xmlns:pvml="urn:schemas-microsoft-com:office:powerpoint" xmlns:com="http://schemas.openxmlformats.org/drawingml/2006/compatibility" xmlns:p14="http://schemas.microsoft.com/office/powerpoint/2010/main" xmlns:p15="http://schemas.microsoft.com/office/powerpoint/2012/main" showMasterPhAnim="0" showMasterSp="0">
+<p:notes xmlns:a="http://schemas.openxmlformats.org/drawingml/2006/main" xmlns:r="http://schemas.openxmlformats.org/officeDocument/2006/relationships" xmlns:p="http://schemas.openxmlformats.org/presentationml/2006/main" showMasterSp="0" showMasterPhAnim="0">
   <p:cSld>
     <p:spTree>
       <p:nvGrpSpPr>
-        <p:cNvPr id="84" name="Shape 84"/>
+        <p:cNvPr id="1" name="Shape 84"/>
         <p:cNvGrpSpPr/>
         <p:nvPr/>
       </p:nvGrpSpPr>
@@ -898,9 +923,11 @@
       <p:sp>
         <p:nvSpPr>
           <p:cNvPr id="85" name="Google Shape;85;g189e9488b_028:notes"/>
-          <p:cNvSpPr/>
+          <p:cNvSpPr>
+            <a:spLocks noGrp="1" noRot="1" noChangeAspect="1"/>
+          </p:cNvSpPr>
           <p:nvPr>
-            <p:ph idx="2" type="sldImg"/>
+            <p:ph type="sldImg" idx="2"/>
           </p:nvPr>
         </p:nvSpPr>
         <p:spPr>
@@ -909,9 +936,13 @@
             <a:ext cx="6096300" cy="3429000"/>
           </a:xfrm>
           <a:custGeom>
-            <a:rect b="b" l="l" r="r" t="t"/>
+            <a:avLst/>
+            <a:gdLst/>
+            <a:ahLst/>
+            <a:cxnLst/>
+            <a:rect l="l" t="t" r="r" b="b"/>
             <a:pathLst>
-              <a:path extrusionOk="0" h="120000" w="120000">
+              <a:path w="120000" h="120000" extrusionOk="0">
                 <a:moveTo>
                   <a:pt x="0" y="0"/>
                 </a:moveTo>
@@ -933,9 +964,11 @@
       <p:sp>
         <p:nvSpPr>
           <p:cNvPr id="86" name="Google Shape;86;g189e9488b_028:notes"/>
-          <p:cNvSpPr txBox="1"/>
+          <p:cNvSpPr txBox="1">
+            <a:spLocks noGrp="1"/>
+          </p:cNvSpPr>
           <p:nvPr>
-            <p:ph idx="1" type="body"/>
+            <p:ph type="body" idx="1"/>
           </p:nvPr>
         </p:nvSpPr>
         <p:spPr>
@@ -948,12 +981,12 @@
           </a:prstGeom>
         </p:spPr>
         <p:txBody>
-          <a:bodyPr anchorCtr="0" anchor="t" bIns="91425" lIns="91425" spcFirstLastPara="1" rIns="91425" wrap="square" tIns="91425">
+          <a:bodyPr spcFirstLastPara="1" wrap="square" lIns="91425" tIns="91425" rIns="91425" bIns="91425" anchor="t" anchorCtr="0">
             <a:noAutofit/>
           </a:bodyPr>
           <a:lstStyle/>
           <a:p>
-            <a:pPr indent="0" lvl="0" marL="0" rtl="0" algn="l">
+            <a:pPr marL="0" lvl="0" indent="0" algn="l" rtl="0">
               <a:spcBef>
                 <a:spcPts val="0"/>
               </a:spcBef>
@@ -962,9 +995,6 @@
               </a:spcAft>
               <a:buNone/>
             </a:pPr>
-            <a:r>
-              <a:t/>
-            </a:r>
             <a:endParaRPr/>
           </a:p>
         </p:txBody>
@@ -978,11 +1008,11 @@
 </file>
 
 <file path=ppt/notesSlides/notesSlide2.xml><?xml version="1.0" encoding="utf-8"?>
-<p:notes xmlns:a="http://schemas.openxmlformats.org/drawingml/2006/main" xmlns:r="http://schemas.openxmlformats.org/officeDocument/2006/relationships" xmlns:mc="http://schemas.openxmlformats.org/markup-compatibility/2006" xmlns:mv="urn:schemas-microsoft-com:mac:vml" xmlns:p="http://schemas.openxmlformats.org/presentationml/2006/main" xmlns:c="http://schemas.openxmlformats.org/drawingml/2006/chart" xmlns:dgm="http://schemas.openxmlformats.org/drawingml/2006/diagram" xmlns:o="urn:schemas-microsoft-com:office:office" xmlns:v="urn:schemas-microsoft-com:vml" xmlns:pvml="urn:schemas-microsoft-com:office:powerpoint" xmlns:com="http://schemas.openxmlformats.org/drawingml/2006/compatibility" xmlns:p14="http://schemas.microsoft.com/office/powerpoint/2010/main" xmlns:p15="http://schemas.microsoft.com/office/powerpoint/2012/main" showMasterPhAnim="0" showMasterSp="0">
+<p:notes xmlns:a="http://schemas.openxmlformats.org/drawingml/2006/main" xmlns:r="http://schemas.openxmlformats.org/officeDocument/2006/relationships" xmlns:p="http://schemas.openxmlformats.org/presentationml/2006/main" showMasterSp="0" showMasterPhAnim="0">
   <p:cSld>
     <p:spTree>
       <p:nvGrpSpPr>
-        <p:cNvPr id="28" name="Shape 28"/>
+        <p:cNvPr id="1" name="Shape 28"/>
         <p:cNvGrpSpPr/>
         <p:nvPr/>
       </p:nvGrpSpPr>
@@ -997,9 +1027,11 @@
       <p:sp>
         <p:nvSpPr>
           <p:cNvPr id="29" name="Google Shape;29;g1896a4dca_015:notes"/>
-          <p:cNvSpPr/>
+          <p:cNvSpPr>
+            <a:spLocks noGrp="1" noRot="1" noChangeAspect="1"/>
+          </p:cNvSpPr>
           <p:nvPr>
-            <p:ph idx="2" type="sldImg"/>
+            <p:ph type="sldImg" idx="2"/>
           </p:nvPr>
         </p:nvSpPr>
         <p:spPr>
@@ -1008,9 +1040,13 @@
             <a:ext cx="6096300" cy="3429000"/>
           </a:xfrm>
           <a:custGeom>
-            <a:rect b="b" l="l" r="r" t="t"/>
+            <a:avLst/>
+            <a:gdLst/>
+            <a:ahLst/>
+            <a:cxnLst/>
+            <a:rect l="l" t="t" r="r" b="b"/>
             <a:pathLst>
-              <a:path extrusionOk="0" h="120000" w="120000">
+              <a:path w="120000" h="120000" extrusionOk="0">
                 <a:moveTo>
                   <a:pt x="0" y="0"/>
                 </a:moveTo>
@@ -1032,9 +1068,11 @@
       <p:sp>
         <p:nvSpPr>
           <p:cNvPr id="30" name="Google Shape;30;g1896a4dca_015:notes"/>
-          <p:cNvSpPr txBox="1"/>
+          <p:cNvSpPr txBox="1">
+            <a:spLocks noGrp="1"/>
+          </p:cNvSpPr>
           <p:nvPr>
-            <p:ph idx="1" type="body"/>
+            <p:ph type="body" idx="1"/>
           </p:nvPr>
         </p:nvSpPr>
         <p:spPr>
@@ -1047,12 +1085,12 @@
           </a:prstGeom>
         </p:spPr>
         <p:txBody>
-          <a:bodyPr anchorCtr="0" anchor="t" bIns="91425" lIns="91425" spcFirstLastPara="1" rIns="91425" wrap="square" tIns="91425">
+          <a:bodyPr spcFirstLastPara="1" wrap="square" lIns="91425" tIns="91425" rIns="91425" bIns="91425" anchor="t" anchorCtr="0">
             <a:noAutofit/>
           </a:bodyPr>
           <a:lstStyle/>
           <a:p>
-            <a:pPr indent="0" lvl="0" marL="0" rtl="0" algn="l">
+            <a:pPr marL="0" lvl="0" indent="0" algn="l" rtl="0">
               <a:spcBef>
                 <a:spcPts val="0"/>
               </a:spcBef>
@@ -1061,9 +1099,6 @@
               </a:spcAft>
               <a:buNone/>
             </a:pPr>
-            <a:r>
-              <a:t/>
-            </a:r>
             <a:endParaRPr/>
           </a:p>
         </p:txBody>
@@ -1077,11 +1112,11 @@
 </file>
 
 <file path=ppt/notesSlides/notesSlide3.xml><?xml version="1.0" encoding="utf-8"?>
-<p:notes xmlns:a="http://schemas.openxmlformats.org/drawingml/2006/main" xmlns:r="http://schemas.openxmlformats.org/officeDocument/2006/relationships" xmlns:mc="http://schemas.openxmlformats.org/markup-compatibility/2006" xmlns:mv="urn:schemas-microsoft-com:mac:vml" xmlns:p="http://schemas.openxmlformats.org/presentationml/2006/main" xmlns:c="http://schemas.openxmlformats.org/drawingml/2006/chart" xmlns:dgm="http://schemas.openxmlformats.org/drawingml/2006/diagram" xmlns:o="urn:schemas-microsoft-com:office:office" xmlns:v="urn:schemas-microsoft-com:vml" xmlns:pvml="urn:schemas-microsoft-com:office:powerpoint" xmlns:com="http://schemas.openxmlformats.org/drawingml/2006/compatibility" xmlns:p14="http://schemas.microsoft.com/office/powerpoint/2010/main" xmlns:p15="http://schemas.microsoft.com/office/powerpoint/2012/main" showMasterPhAnim="0" showMasterSp="0">
+<p:notes xmlns:a="http://schemas.openxmlformats.org/drawingml/2006/main" xmlns:r="http://schemas.openxmlformats.org/officeDocument/2006/relationships" xmlns:p="http://schemas.openxmlformats.org/presentationml/2006/main" showMasterSp="0" showMasterPhAnim="0">
   <p:cSld>
     <p:spTree>
       <p:nvGrpSpPr>
-        <p:cNvPr id="33" name="Shape 33"/>
+        <p:cNvPr id="1" name="Shape 33"/>
         <p:cNvGrpSpPr/>
         <p:nvPr/>
       </p:nvGrpSpPr>
@@ -1096,9 +1131,11 @@
       <p:sp>
         <p:nvSpPr>
           <p:cNvPr id="34" name="Google Shape;34;g1896a4dca_00:notes"/>
-          <p:cNvSpPr/>
+          <p:cNvSpPr>
+            <a:spLocks noGrp="1" noRot="1" noChangeAspect="1"/>
+          </p:cNvSpPr>
           <p:nvPr>
-            <p:ph idx="2" type="sldImg"/>
+            <p:ph type="sldImg" idx="2"/>
           </p:nvPr>
         </p:nvSpPr>
         <p:spPr>
@@ -1107,9 +1144,13 @@
             <a:ext cx="6096300" cy="3429000"/>
           </a:xfrm>
           <a:custGeom>
-            <a:rect b="b" l="l" r="r" t="t"/>
+            <a:avLst/>
+            <a:gdLst/>
+            <a:ahLst/>
+            <a:cxnLst/>
+            <a:rect l="l" t="t" r="r" b="b"/>
             <a:pathLst>
-              <a:path extrusionOk="0" h="120000" w="120000">
+              <a:path w="120000" h="120000" extrusionOk="0">
                 <a:moveTo>
                   <a:pt x="0" y="0"/>
                 </a:moveTo>
@@ -1131,9 +1172,11 @@
       <p:sp>
         <p:nvSpPr>
           <p:cNvPr id="35" name="Google Shape;35;g1896a4dca_00:notes"/>
-          <p:cNvSpPr txBox="1"/>
+          <p:cNvSpPr txBox="1">
+            <a:spLocks noGrp="1"/>
+          </p:cNvSpPr>
           <p:nvPr>
-            <p:ph idx="1" type="body"/>
+            <p:ph type="body" idx="1"/>
           </p:nvPr>
         </p:nvSpPr>
         <p:spPr>
@@ -1146,12 +1189,12 @@
           </a:prstGeom>
         </p:spPr>
         <p:txBody>
-          <a:bodyPr anchorCtr="0" anchor="t" bIns="91425" lIns="91425" spcFirstLastPara="1" rIns="91425" wrap="square" tIns="91425">
+          <a:bodyPr spcFirstLastPara="1" wrap="square" lIns="91425" tIns="91425" rIns="91425" bIns="91425" anchor="t" anchorCtr="0">
             <a:noAutofit/>
           </a:bodyPr>
           <a:lstStyle/>
           <a:p>
-            <a:pPr indent="0" lvl="0" marL="0" rtl="0" algn="l">
+            <a:pPr marL="0" lvl="0" indent="0" algn="l" rtl="0">
               <a:spcBef>
                 <a:spcPts val="0"/>
               </a:spcBef>
@@ -1160,9 +1203,6 @@
               </a:spcAft>
               <a:buNone/>
             </a:pPr>
-            <a:r>
-              <a:t/>
-            </a:r>
             <a:endParaRPr/>
           </a:p>
         </p:txBody>
@@ -1176,11 +1216,11 @@
 </file>
 
 <file path=ppt/notesSlides/notesSlide4.xml><?xml version="1.0" encoding="utf-8"?>
-<p:notes xmlns:a="http://schemas.openxmlformats.org/drawingml/2006/main" xmlns:r="http://schemas.openxmlformats.org/officeDocument/2006/relationships" xmlns:mc="http://schemas.openxmlformats.org/markup-compatibility/2006" xmlns:mv="urn:schemas-microsoft-com:mac:vml" xmlns:p="http://schemas.openxmlformats.org/presentationml/2006/main" xmlns:c="http://schemas.openxmlformats.org/drawingml/2006/chart" xmlns:dgm="http://schemas.openxmlformats.org/drawingml/2006/diagram" xmlns:o="urn:schemas-microsoft-com:office:office" xmlns:v="urn:schemas-microsoft-com:vml" xmlns:pvml="urn:schemas-microsoft-com:office:powerpoint" xmlns:com="http://schemas.openxmlformats.org/drawingml/2006/compatibility" xmlns:p14="http://schemas.microsoft.com/office/powerpoint/2010/main" xmlns:p15="http://schemas.microsoft.com/office/powerpoint/2012/main" showMasterPhAnim="0" showMasterSp="0">
+<p:notes xmlns:a="http://schemas.openxmlformats.org/drawingml/2006/main" xmlns:r="http://schemas.openxmlformats.org/officeDocument/2006/relationships" xmlns:p="http://schemas.openxmlformats.org/presentationml/2006/main" showMasterSp="0" showMasterPhAnim="0">
   <p:cSld>
     <p:spTree>
       <p:nvGrpSpPr>
-        <p:cNvPr id="39" name="Shape 39"/>
+        <p:cNvPr id="1" name="Shape 39"/>
         <p:cNvGrpSpPr/>
         <p:nvPr/>
       </p:nvGrpSpPr>
@@ -1195,20 +1235,26 @@
       <p:sp>
         <p:nvSpPr>
           <p:cNvPr id="40" name="Google Shape;40;g1896a4dca_05:notes"/>
-          <p:cNvSpPr/>
+          <p:cNvSpPr>
+            <a:spLocks noGrp="1" noRot="1" noChangeAspect="1"/>
+          </p:cNvSpPr>
           <p:nvPr>
-            <p:ph idx="2" type="sldImg"/>
+            <p:ph type="sldImg" idx="2"/>
           </p:nvPr>
         </p:nvSpPr>
         <p:spPr>
           <a:xfrm>
-            <a:off x="381188" y="685800"/>
-            <a:ext cx="6096300" cy="3429000"/>
+            <a:off x="381000" y="685800"/>
+            <a:ext cx="6096000" cy="3429000"/>
           </a:xfrm>
           <a:custGeom>
-            <a:rect b="b" l="l" r="r" t="t"/>
+            <a:avLst/>
+            <a:gdLst/>
+            <a:ahLst/>
+            <a:cxnLst/>
+            <a:rect l="l" t="t" r="r" b="b"/>
             <a:pathLst>
-              <a:path extrusionOk="0" h="120000" w="120000">
+              <a:path w="120000" h="120000" extrusionOk="0">
                 <a:moveTo>
                   <a:pt x="0" y="0"/>
                 </a:moveTo>
@@ -1230,9 +1276,11 @@
       <p:sp>
         <p:nvSpPr>
           <p:cNvPr id="41" name="Google Shape;41;g1896a4dca_05:notes"/>
-          <p:cNvSpPr txBox="1"/>
+          <p:cNvSpPr txBox="1">
+            <a:spLocks noGrp="1"/>
+          </p:cNvSpPr>
           <p:nvPr>
-            <p:ph idx="1" type="body"/>
+            <p:ph type="body" idx="1"/>
           </p:nvPr>
         </p:nvSpPr>
         <p:spPr>
@@ -1245,12 +1293,12 @@
           </a:prstGeom>
         </p:spPr>
         <p:txBody>
-          <a:bodyPr anchorCtr="0" anchor="t" bIns="91425" lIns="91425" spcFirstLastPara="1" rIns="91425" wrap="square" tIns="91425">
+          <a:bodyPr spcFirstLastPara="1" wrap="square" lIns="91425" tIns="91425" rIns="91425" bIns="91425" anchor="t" anchorCtr="0">
             <a:noAutofit/>
           </a:bodyPr>
           <a:lstStyle/>
           <a:p>
-            <a:pPr indent="0" lvl="0" marL="0" rtl="0" algn="l">
+            <a:pPr marL="0" lvl="0" indent="0" algn="l" rtl="0">
               <a:spcBef>
                 <a:spcPts val="0"/>
               </a:spcBef>
@@ -1259,9 +1307,6 @@
               </a:spcAft>
               <a:buNone/>
             </a:pPr>
-            <a:r>
-              <a:t/>
-            </a:r>
             <a:endParaRPr/>
           </a:p>
         </p:txBody>
@@ -1275,11 +1320,11 @@
 </file>
 
 <file path=ppt/notesSlides/notesSlide5.xml><?xml version="1.0" encoding="utf-8"?>
-<p:notes xmlns:a="http://schemas.openxmlformats.org/drawingml/2006/main" xmlns:r="http://schemas.openxmlformats.org/officeDocument/2006/relationships" xmlns:mc="http://schemas.openxmlformats.org/markup-compatibility/2006" xmlns:mv="urn:schemas-microsoft-com:mac:vml" xmlns:p="http://schemas.openxmlformats.org/presentationml/2006/main" xmlns:c="http://schemas.openxmlformats.org/drawingml/2006/chart" xmlns:dgm="http://schemas.openxmlformats.org/drawingml/2006/diagram" xmlns:o="urn:schemas-microsoft-com:office:office" xmlns:v="urn:schemas-microsoft-com:vml" xmlns:pvml="urn:schemas-microsoft-com:office:powerpoint" xmlns:com="http://schemas.openxmlformats.org/drawingml/2006/compatibility" xmlns:p14="http://schemas.microsoft.com/office/powerpoint/2010/main" xmlns:p15="http://schemas.microsoft.com/office/powerpoint/2012/main" showMasterPhAnim="0" showMasterSp="0">
+<p:notes xmlns:a="http://schemas.openxmlformats.org/drawingml/2006/main" xmlns:r="http://schemas.openxmlformats.org/officeDocument/2006/relationships" xmlns:p="http://schemas.openxmlformats.org/presentationml/2006/main" showMasterSp="0" showMasterPhAnim="0">
   <p:cSld>
     <p:spTree>
       <p:nvGrpSpPr>
-        <p:cNvPr id="45" name="Shape 45"/>
+        <p:cNvPr id="1" name="Shape 45"/>
         <p:cNvGrpSpPr/>
         <p:nvPr/>
       </p:nvGrpSpPr>
@@ -1294,9 +1339,11 @@
       <p:sp>
         <p:nvSpPr>
           <p:cNvPr id="46" name="Google Shape;46;g1896a4dca_021:notes"/>
-          <p:cNvSpPr/>
+          <p:cNvSpPr>
+            <a:spLocks noGrp="1" noRot="1" noChangeAspect="1"/>
+          </p:cNvSpPr>
           <p:nvPr>
-            <p:ph idx="2" type="sldImg"/>
+            <p:ph type="sldImg" idx="2"/>
           </p:nvPr>
         </p:nvSpPr>
         <p:spPr>
@@ -1305,9 +1352,13 @@
             <a:ext cx="6096300" cy="3429000"/>
           </a:xfrm>
           <a:custGeom>
-            <a:rect b="b" l="l" r="r" t="t"/>
+            <a:avLst/>
+            <a:gdLst/>
+            <a:ahLst/>
+            <a:cxnLst/>
+            <a:rect l="l" t="t" r="r" b="b"/>
             <a:pathLst>
-              <a:path extrusionOk="0" h="120000" w="120000">
+              <a:path w="120000" h="120000" extrusionOk="0">
                 <a:moveTo>
                   <a:pt x="0" y="0"/>
                 </a:moveTo>
@@ -1329,9 +1380,11 @@
       <p:sp>
         <p:nvSpPr>
           <p:cNvPr id="47" name="Google Shape;47;g1896a4dca_021:notes"/>
-          <p:cNvSpPr txBox="1"/>
+          <p:cNvSpPr txBox="1">
+            <a:spLocks noGrp="1"/>
+          </p:cNvSpPr>
           <p:nvPr>
-            <p:ph idx="1" type="body"/>
+            <p:ph type="body" idx="1"/>
           </p:nvPr>
         </p:nvSpPr>
         <p:spPr>
@@ -1344,12 +1397,12 @@
           </a:prstGeom>
         </p:spPr>
         <p:txBody>
-          <a:bodyPr anchorCtr="0" anchor="t" bIns="91425" lIns="91425" spcFirstLastPara="1" rIns="91425" wrap="square" tIns="91425">
+          <a:bodyPr spcFirstLastPara="1" wrap="square" lIns="91425" tIns="91425" rIns="91425" bIns="91425" anchor="t" anchorCtr="0">
             <a:noAutofit/>
           </a:bodyPr>
           <a:lstStyle/>
           <a:p>
-            <a:pPr indent="0" lvl="0" marL="0" rtl="0" algn="l">
+            <a:pPr marL="0" lvl="0" indent="0" algn="l" rtl="0">
               <a:spcBef>
                 <a:spcPts val="0"/>
               </a:spcBef>
@@ -1358,9 +1411,6 @@
               </a:spcAft>
               <a:buNone/>
             </a:pPr>
-            <a:r>
-              <a:t/>
-            </a:r>
             <a:endParaRPr/>
           </a:p>
         </p:txBody>
@@ -1374,11 +1424,11 @@
 </file>
 
 <file path=ppt/notesSlides/notesSlide6.xml><?xml version="1.0" encoding="utf-8"?>
-<p:notes xmlns:a="http://schemas.openxmlformats.org/drawingml/2006/main" xmlns:r="http://schemas.openxmlformats.org/officeDocument/2006/relationships" xmlns:mc="http://schemas.openxmlformats.org/markup-compatibility/2006" xmlns:mv="urn:schemas-microsoft-com:mac:vml" xmlns:p="http://schemas.openxmlformats.org/presentationml/2006/main" xmlns:c="http://schemas.openxmlformats.org/drawingml/2006/chart" xmlns:dgm="http://schemas.openxmlformats.org/drawingml/2006/diagram" xmlns:o="urn:schemas-microsoft-com:office:office" xmlns:v="urn:schemas-microsoft-com:vml" xmlns:pvml="urn:schemas-microsoft-com:office:powerpoint" xmlns:com="http://schemas.openxmlformats.org/drawingml/2006/compatibility" xmlns:p14="http://schemas.microsoft.com/office/powerpoint/2010/main" xmlns:p15="http://schemas.microsoft.com/office/powerpoint/2012/main" showMasterPhAnim="0" showMasterSp="0">
+<p:notes xmlns:a="http://schemas.openxmlformats.org/drawingml/2006/main" xmlns:r="http://schemas.openxmlformats.org/officeDocument/2006/relationships" xmlns:p="http://schemas.openxmlformats.org/presentationml/2006/main" showMasterSp="0" showMasterPhAnim="0">
   <p:cSld>
     <p:spTree>
       <p:nvGrpSpPr>
-        <p:cNvPr id="52" name="Shape 52"/>
+        <p:cNvPr id="1" name="Shape 52"/>
         <p:cNvGrpSpPr/>
         <p:nvPr/>
       </p:nvGrpSpPr>
@@ -1393,9 +1443,11 @@
       <p:sp>
         <p:nvSpPr>
           <p:cNvPr id="53" name="Google Shape;53;g189e9488b_00:notes"/>
-          <p:cNvSpPr/>
+          <p:cNvSpPr>
+            <a:spLocks noGrp="1" noRot="1" noChangeAspect="1"/>
+          </p:cNvSpPr>
           <p:nvPr>
-            <p:ph idx="2" type="sldImg"/>
+            <p:ph type="sldImg" idx="2"/>
           </p:nvPr>
         </p:nvSpPr>
         <p:spPr>
@@ -1404,9 +1456,13 @@
             <a:ext cx="6096300" cy="3429000"/>
           </a:xfrm>
           <a:custGeom>
-            <a:rect b="b" l="l" r="r" t="t"/>
+            <a:avLst/>
+            <a:gdLst/>
+            <a:ahLst/>
+            <a:cxnLst/>
+            <a:rect l="l" t="t" r="r" b="b"/>
             <a:pathLst>
-              <a:path extrusionOk="0" h="120000" w="120000">
+              <a:path w="120000" h="120000" extrusionOk="0">
                 <a:moveTo>
                   <a:pt x="0" y="0"/>
                 </a:moveTo>
@@ -1428,9 +1484,11 @@
       <p:sp>
         <p:nvSpPr>
           <p:cNvPr id="54" name="Google Shape;54;g189e9488b_00:notes"/>
-          <p:cNvSpPr txBox="1"/>
+          <p:cNvSpPr txBox="1">
+            <a:spLocks noGrp="1"/>
+          </p:cNvSpPr>
           <p:nvPr>
-            <p:ph idx="1" type="body"/>
+            <p:ph type="body" idx="1"/>
           </p:nvPr>
         </p:nvSpPr>
         <p:spPr>
@@ -1443,12 +1501,12 @@
           </a:prstGeom>
         </p:spPr>
         <p:txBody>
-          <a:bodyPr anchorCtr="0" anchor="t" bIns="91425" lIns="91425" spcFirstLastPara="1" rIns="91425" wrap="square" tIns="91425">
+          <a:bodyPr spcFirstLastPara="1" wrap="square" lIns="91425" tIns="91425" rIns="91425" bIns="91425" anchor="t" anchorCtr="0">
             <a:noAutofit/>
           </a:bodyPr>
           <a:lstStyle/>
           <a:p>
-            <a:pPr indent="0" lvl="0" marL="0" rtl="0" algn="l">
+            <a:pPr marL="0" lvl="0" indent="0" algn="l" rtl="0">
               <a:spcBef>
                 <a:spcPts val="0"/>
               </a:spcBef>
@@ -1457,9 +1515,6 @@
               </a:spcAft>
               <a:buNone/>
             </a:pPr>
-            <a:r>
-              <a:t/>
-            </a:r>
             <a:endParaRPr/>
           </a:p>
         </p:txBody>
@@ -1473,11 +1528,11 @@
 </file>
 
 <file path=ppt/notesSlides/notesSlide7.xml><?xml version="1.0" encoding="utf-8"?>
-<p:notes xmlns:a="http://schemas.openxmlformats.org/drawingml/2006/main" xmlns:r="http://schemas.openxmlformats.org/officeDocument/2006/relationships" xmlns:mc="http://schemas.openxmlformats.org/markup-compatibility/2006" xmlns:mv="urn:schemas-microsoft-com:mac:vml" xmlns:p="http://schemas.openxmlformats.org/presentationml/2006/main" xmlns:c="http://schemas.openxmlformats.org/drawingml/2006/chart" xmlns:dgm="http://schemas.openxmlformats.org/drawingml/2006/diagram" xmlns:o="urn:schemas-microsoft-com:office:office" xmlns:v="urn:schemas-microsoft-com:vml" xmlns:pvml="urn:schemas-microsoft-com:office:powerpoint" xmlns:com="http://schemas.openxmlformats.org/drawingml/2006/compatibility" xmlns:p14="http://schemas.microsoft.com/office/powerpoint/2010/main" xmlns:p15="http://schemas.microsoft.com/office/powerpoint/2012/main" showMasterPhAnim="0" showMasterSp="0">
+<p:notes xmlns:a="http://schemas.openxmlformats.org/drawingml/2006/main" xmlns:r="http://schemas.openxmlformats.org/officeDocument/2006/relationships" xmlns:p="http://schemas.openxmlformats.org/presentationml/2006/main" showMasterSp="0" showMasterPhAnim="0">
   <p:cSld>
     <p:spTree>
       <p:nvGrpSpPr>
-        <p:cNvPr id="59" name="Shape 59"/>
+        <p:cNvPr id="1" name="Shape 59"/>
         <p:cNvGrpSpPr/>
         <p:nvPr/>
       </p:nvGrpSpPr>
@@ -1492,20 +1547,26 @@
       <p:sp>
         <p:nvSpPr>
           <p:cNvPr id="60" name="Google Shape;60;g189e9488b_07:notes"/>
-          <p:cNvSpPr/>
+          <p:cNvSpPr>
+            <a:spLocks noGrp="1" noRot="1" noChangeAspect="1"/>
+          </p:cNvSpPr>
           <p:nvPr>
-            <p:ph idx="2" type="sldImg"/>
+            <p:ph type="sldImg" idx="2"/>
           </p:nvPr>
         </p:nvSpPr>
         <p:spPr>
           <a:xfrm>
-            <a:off x="381188" y="685800"/>
-            <a:ext cx="6096300" cy="3429000"/>
+            <a:off x="381000" y="685800"/>
+            <a:ext cx="6096000" cy="3429000"/>
           </a:xfrm>
           <a:custGeom>
-            <a:rect b="b" l="l" r="r" t="t"/>
+            <a:avLst/>
+            <a:gdLst/>
+            <a:ahLst/>
+            <a:cxnLst/>
+            <a:rect l="l" t="t" r="r" b="b"/>
             <a:pathLst>
-              <a:path extrusionOk="0" h="120000" w="120000">
+              <a:path w="120000" h="120000" extrusionOk="0">
                 <a:moveTo>
                   <a:pt x="0" y="0"/>
                 </a:moveTo>
@@ -1527,9 +1588,11 @@
       <p:sp>
         <p:nvSpPr>
           <p:cNvPr id="61" name="Google Shape;61;g189e9488b_07:notes"/>
-          <p:cNvSpPr txBox="1"/>
+          <p:cNvSpPr txBox="1">
+            <a:spLocks noGrp="1"/>
+          </p:cNvSpPr>
           <p:nvPr>
-            <p:ph idx="1" type="body"/>
+            <p:ph type="body" idx="1"/>
           </p:nvPr>
         </p:nvSpPr>
         <p:spPr>
@@ -1542,12 +1605,12 @@
           </a:prstGeom>
         </p:spPr>
         <p:txBody>
-          <a:bodyPr anchorCtr="0" anchor="t" bIns="91425" lIns="91425" spcFirstLastPara="1" rIns="91425" wrap="square" tIns="91425">
+          <a:bodyPr spcFirstLastPara="1" wrap="square" lIns="91425" tIns="91425" rIns="91425" bIns="91425" anchor="t" anchorCtr="0">
             <a:noAutofit/>
           </a:bodyPr>
           <a:lstStyle/>
           <a:p>
-            <a:pPr indent="0" lvl="0" marL="0" rtl="0" algn="l">
+            <a:pPr marL="0" lvl="0" indent="0" algn="l" rtl="0">
               <a:spcBef>
                 <a:spcPts val="0"/>
               </a:spcBef>
@@ -1556,9 +1619,6 @@
               </a:spcAft>
               <a:buNone/>
             </a:pPr>
-            <a:r>
-              <a:t/>
-            </a:r>
             <a:endParaRPr/>
           </a:p>
         </p:txBody>
@@ -1572,11 +1632,11 @@
 </file>
 
 <file path=ppt/notesSlides/notesSlide8.xml><?xml version="1.0" encoding="utf-8"?>
-<p:notes xmlns:a="http://schemas.openxmlformats.org/drawingml/2006/main" xmlns:r="http://schemas.openxmlformats.org/officeDocument/2006/relationships" xmlns:mc="http://schemas.openxmlformats.org/markup-compatibility/2006" xmlns:mv="urn:schemas-microsoft-com:mac:vml" xmlns:p="http://schemas.openxmlformats.org/presentationml/2006/main" xmlns:c="http://schemas.openxmlformats.org/drawingml/2006/chart" xmlns:dgm="http://schemas.openxmlformats.org/drawingml/2006/diagram" xmlns:o="urn:schemas-microsoft-com:office:office" xmlns:v="urn:schemas-microsoft-com:vml" xmlns:pvml="urn:schemas-microsoft-com:office:powerpoint" xmlns:com="http://schemas.openxmlformats.org/drawingml/2006/compatibility" xmlns:p14="http://schemas.microsoft.com/office/powerpoint/2010/main" xmlns:p15="http://schemas.microsoft.com/office/powerpoint/2012/main" showMasterPhAnim="0" showMasterSp="0">
+<p:notes xmlns:a="http://schemas.openxmlformats.org/drawingml/2006/main" xmlns:r="http://schemas.openxmlformats.org/officeDocument/2006/relationships" xmlns:p="http://schemas.openxmlformats.org/presentationml/2006/main" showMasterSp="0" showMasterPhAnim="0">
   <p:cSld>
     <p:spTree>
       <p:nvGrpSpPr>
-        <p:cNvPr id="65" name="Shape 65"/>
+        <p:cNvPr id="1" name="Shape 65"/>
         <p:cNvGrpSpPr/>
         <p:nvPr/>
       </p:nvGrpSpPr>
@@ -1591,20 +1651,26 @@
       <p:sp>
         <p:nvSpPr>
           <p:cNvPr id="66" name="Google Shape;66;g189e9488b_012:notes"/>
-          <p:cNvSpPr/>
+          <p:cNvSpPr>
+            <a:spLocks noGrp="1" noRot="1" noChangeAspect="1"/>
+          </p:cNvSpPr>
           <p:nvPr>
-            <p:ph idx="2" type="sldImg"/>
+            <p:ph type="sldImg" idx="2"/>
           </p:nvPr>
         </p:nvSpPr>
         <p:spPr>
           <a:xfrm>
-            <a:off x="381188" y="685800"/>
-            <a:ext cx="6096300" cy="3429000"/>
+            <a:off x="381000" y="685800"/>
+            <a:ext cx="6096000" cy="3429000"/>
           </a:xfrm>
           <a:custGeom>
-            <a:rect b="b" l="l" r="r" t="t"/>
+            <a:avLst/>
+            <a:gdLst/>
+            <a:ahLst/>
+            <a:cxnLst/>
+            <a:rect l="l" t="t" r="r" b="b"/>
             <a:pathLst>
-              <a:path extrusionOk="0" h="120000" w="120000">
+              <a:path w="120000" h="120000" extrusionOk="0">
                 <a:moveTo>
                   <a:pt x="0" y="0"/>
                 </a:moveTo>
@@ -1626,9 +1692,11 @@
       <p:sp>
         <p:nvSpPr>
           <p:cNvPr id="67" name="Google Shape;67;g189e9488b_012:notes"/>
-          <p:cNvSpPr txBox="1"/>
+          <p:cNvSpPr txBox="1">
+            <a:spLocks noGrp="1"/>
+          </p:cNvSpPr>
           <p:nvPr>
-            <p:ph idx="1" type="body"/>
+            <p:ph type="body" idx="1"/>
           </p:nvPr>
         </p:nvSpPr>
         <p:spPr>
@@ -1641,12 +1709,12 @@
           </a:prstGeom>
         </p:spPr>
         <p:txBody>
-          <a:bodyPr anchorCtr="0" anchor="t" bIns="91425" lIns="91425" spcFirstLastPara="1" rIns="91425" wrap="square" tIns="91425">
+          <a:bodyPr spcFirstLastPara="1" wrap="square" lIns="91425" tIns="91425" rIns="91425" bIns="91425" anchor="t" anchorCtr="0">
             <a:noAutofit/>
           </a:bodyPr>
           <a:lstStyle/>
           <a:p>
-            <a:pPr indent="0" lvl="0" marL="0" rtl="0" algn="l">
+            <a:pPr marL="0" lvl="0" indent="0" algn="l" rtl="0">
               <a:spcBef>
                 <a:spcPts val="0"/>
               </a:spcBef>
@@ -1655,9 +1723,6 @@
               </a:spcAft>
               <a:buNone/>
             </a:pPr>
-            <a:r>
-              <a:t/>
-            </a:r>
             <a:endParaRPr/>
           </a:p>
         </p:txBody>
@@ -1671,11 +1736,11 @@
 </file>
 
 <file path=ppt/notesSlides/notesSlide9.xml><?xml version="1.0" encoding="utf-8"?>
-<p:notes xmlns:a="http://schemas.openxmlformats.org/drawingml/2006/main" xmlns:r="http://schemas.openxmlformats.org/officeDocument/2006/relationships" xmlns:mc="http://schemas.openxmlformats.org/markup-compatibility/2006" xmlns:mv="urn:schemas-microsoft-com:mac:vml" xmlns:p="http://schemas.openxmlformats.org/presentationml/2006/main" xmlns:c="http://schemas.openxmlformats.org/drawingml/2006/chart" xmlns:dgm="http://schemas.openxmlformats.org/drawingml/2006/diagram" xmlns:o="urn:schemas-microsoft-com:office:office" xmlns:v="urn:schemas-microsoft-com:vml" xmlns:pvml="urn:schemas-microsoft-com:office:powerpoint" xmlns:com="http://schemas.openxmlformats.org/drawingml/2006/compatibility" xmlns:p14="http://schemas.microsoft.com/office/powerpoint/2010/main" xmlns:p15="http://schemas.microsoft.com/office/powerpoint/2012/main" showMasterPhAnim="0" showMasterSp="0">
+<p:notes xmlns:a="http://schemas.openxmlformats.org/drawingml/2006/main" xmlns:r="http://schemas.openxmlformats.org/officeDocument/2006/relationships" xmlns:p="http://schemas.openxmlformats.org/presentationml/2006/main" showMasterSp="0" showMasterPhAnim="0">
   <p:cSld>
     <p:spTree>
       <p:nvGrpSpPr>
-        <p:cNvPr id="71" name="Shape 71"/>
+        <p:cNvPr id="1" name="Shape 71"/>
         <p:cNvGrpSpPr/>
         <p:nvPr/>
       </p:nvGrpSpPr>
@@ -1690,9 +1755,11 @@
       <p:sp>
         <p:nvSpPr>
           <p:cNvPr id="72" name="Google Shape;72;g189e9488b_017:notes"/>
-          <p:cNvSpPr/>
+          <p:cNvSpPr>
+            <a:spLocks noGrp="1" noRot="1" noChangeAspect="1"/>
+          </p:cNvSpPr>
           <p:nvPr>
-            <p:ph idx="2" type="sldImg"/>
+            <p:ph type="sldImg" idx="2"/>
           </p:nvPr>
         </p:nvSpPr>
         <p:spPr>
@@ -1701,9 +1768,13 @@
             <a:ext cx="6096300" cy="3429000"/>
           </a:xfrm>
           <a:custGeom>
-            <a:rect b="b" l="l" r="r" t="t"/>
+            <a:avLst/>
+            <a:gdLst/>
+            <a:ahLst/>
+            <a:cxnLst/>
+            <a:rect l="l" t="t" r="r" b="b"/>
             <a:pathLst>
-              <a:path extrusionOk="0" h="120000" w="120000">
+              <a:path w="120000" h="120000" extrusionOk="0">
                 <a:moveTo>
                   <a:pt x="0" y="0"/>
                 </a:moveTo>
@@ -1725,9 +1796,11 @@
       <p:sp>
         <p:nvSpPr>
           <p:cNvPr id="73" name="Google Shape;73;g189e9488b_017:notes"/>
-          <p:cNvSpPr txBox="1"/>
+          <p:cNvSpPr txBox="1">
+            <a:spLocks noGrp="1"/>
+          </p:cNvSpPr>
           <p:nvPr>
-            <p:ph idx="1" type="body"/>
+            <p:ph type="body" idx="1"/>
           </p:nvPr>
         </p:nvSpPr>
         <p:spPr>
@@ -1740,12 +1813,12 @@
           </a:prstGeom>
         </p:spPr>
         <p:txBody>
-          <a:bodyPr anchorCtr="0" anchor="t" bIns="91425" lIns="91425" spcFirstLastPara="1" rIns="91425" wrap="square" tIns="91425">
+          <a:bodyPr spcFirstLastPara="1" wrap="square" lIns="91425" tIns="91425" rIns="91425" bIns="91425" anchor="t" anchorCtr="0">
             <a:noAutofit/>
           </a:bodyPr>
           <a:lstStyle/>
           <a:p>
-            <a:pPr indent="0" lvl="0" marL="0" rtl="0" algn="l">
+            <a:pPr marL="0" lvl="0" indent="0" algn="l" rtl="0">
               <a:spcBef>
                 <a:spcPts val="0"/>
               </a:spcBef>
@@ -1754,9 +1827,6 @@
               </a:spcAft>
               <a:buNone/>
             </a:pPr>
-            <a:r>
-              <a:t/>
-            </a:r>
             <a:endParaRPr/>
           </a:p>
         </p:txBody>
@@ -1770,11 +1840,11 @@
 </file>
 
 <file path=ppt/slideLayouts/slideLayout1.xml><?xml version="1.0" encoding="utf-8"?>
-<p:sldLayout xmlns:a="http://schemas.openxmlformats.org/drawingml/2006/main" xmlns:r="http://schemas.openxmlformats.org/officeDocument/2006/relationships" xmlns:mc="http://schemas.openxmlformats.org/markup-compatibility/2006" xmlns:mv="urn:schemas-microsoft-com:mac:vml" xmlns:p="http://schemas.openxmlformats.org/presentationml/2006/main" xmlns:c="http://schemas.openxmlformats.org/drawingml/2006/chart" xmlns:dgm="http://schemas.openxmlformats.org/drawingml/2006/diagram" xmlns:o="urn:schemas-microsoft-com:office:office" xmlns:v="urn:schemas-microsoft-com:vml" xmlns:pvml="urn:schemas-microsoft-com:office:powerpoint" xmlns:com="http://schemas.openxmlformats.org/drawingml/2006/compatibility" xmlns:p14="http://schemas.microsoft.com/office/powerpoint/2010/main" xmlns:p15="http://schemas.microsoft.com/office/powerpoint/2012/main" matchingName="Title slide" type="title">
+<p:sldLayout xmlns:a="http://schemas.openxmlformats.org/drawingml/2006/main" xmlns:r="http://schemas.openxmlformats.org/officeDocument/2006/relationships" xmlns:p="http://schemas.openxmlformats.org/presentationml/2006/main" matchingName="Title slide" type="title">
   <p:cSld name="TITLE">
     <p:spTree>
       <p:nvGrpSpPr>
-        <p:cNvPr id="8" name="Shape 8"/>
+        <p:cNvPr id="1" name="Shape 8"/>
         <p:cNvGrpSpPr/>
         <p:nvPr/>
       </p:nvGrpSpPr>
@@ -1789,7 +1859,9 @@
       <p:sp>
         <p:nvSpPr>
           <p:cNvPr id="9" name="Google Shape;9;p2"/>
-          <p:cNvSpPr txBox="1"/>
+          <p:cNvSpPr txBox="1">
+            <a:spLocks noGrp="1"/>
+          </p:cNvSpPr>
           <p:nvPr>
             <p:ph type="ctrTitle"/>
           </p:nvPr>
@@ -1804,7 +1876,7 @@
           </a:prstGeom>
         </p:spPr>
         <p:txBody>
-          <a:bodyPr anchorCtr="0" anchor="b" bIns="91425" lIns="91425" spcFirstLastPara="1" rIns="91425" wrap="square" tIns="91425">
+          <a:bodyPr spcFirstLastPara="1" wrap="square" lIns="91425" tIns="91425" rIns="91425" bIns="91425" anchor="b" anchorCtr="0">
             <a:noAutofit/>
           </a:bodyPr>
           <a:lstStyle>
@@ -1908,15 +1980,19 @@
               <a:defRPr sz="4800"/>
             </a:lvl9pPr>
           </a:lstStyle>
-          <a:p/>
+          <a:p>
+            <a:endParaRPr/>
+          </a:p>
         </p:txBody>
       </p:sp>
       <p:sp>
         <p:nvSpPr>
           <p:cNvPr id="10" name="Google Shape;10;p2"/>
-          <p:cNvSpPr txBox="1"/>
+          <p:cNvSpPr txBox="1">
+            <a:spLocks noGrp="1"/>
+          </p:cNvSpPr>
           <p:nvPr>
-            <p:ph idx="1" type="subTitle"/>
+            <p:ph type="subTitle" idx="1"/>
           </p:nvPr>
         </p:nvSpPr>
         <p:spPr>
@@ -1929,7 +2005,7 @@
           </a:prstGeom>
         </p:spPr>
         <p:txBody>
-          <a:bodyPr anchorCtr="0" anchor="t" bIns="91425" lIns="91425" spcFirstLastPara="1" rIns="91425" wrap="square" tIns="91425">
+          <a:bodyPr spcFirstLastPara="1" wrap="square" lIns="91425" tIns="91425" rIns="91425" bIns="91425" anchor="t" anchorCtr="0">
             <a:noAutofit/>
           </a:bodyPr>
           <a:lstStyle>
@@ -2096,7 +2172,9 @@
               </a:defRPr>
             </a:lvl9pPr>
           </a:lstStyle>
-          <a:p/>
+          <a:p>
+            <a:endParaRPr/>
+          </a:p>
         </p:txBody>
       </p:sp>
     </p:spTree>
@@ -2108,11 +2186,11 @@
 </file>
 
 <file path=ppt/slideLayouts/slideLayout2.xml><?xml version="1.0" encoding="utf-8"?>
-<p:sldLayout xmlns:a="http://schemas.openxmlformats.org/drawingml/2006/main" xmlns:r="http://schemas.openxmlformats.org/officeDocument/2006/relationships" xmlns:mc="http://schemas.openxmlformats.org/markup-compatibility/2006" xmlns:mv="urn:schemas-microsoft-com:mac:vml" xmlns:p="http://schemas.openxmlformats.org/presentationml/2006/main" xmlns:c="http://schemas.openxmlformats.org/drawingml/2006/chart" xmlns:dgm="http://schemas.openxmlformats.org/drawingml/2006/diagram" xmlns:o="urn:schemas-microsoft-com:office:office" xmlns:v="urn:schemas-microsoft-com:vml" xmlns:pvml="urn:schemas-microsoft-com:office:powerpoint" xmlns:com="http://schemas.openxmlformats.org/drawingml/2006/compatibility" xmlns:p14="http://schemas.microsoft.com/office/powerpoint/2010/main" xmlns:p15="http://schemas.microsoft.com/office/powerpoint/2012/main" matchingName="Title and body" type="tx">
+<p:sldLayout xmlns:a="http://schemas.openxmlformats.org/drawingml/2006/main" xmlns:r="http://schemas.openxmlformats.org/officeDocument/2006/relationships" xmlns:p="http://schemas.openxmlformats.org/presentationml/2006/main" matchingName="Title and body" type="tx">
   <p:cSld name="TITLE_AND_BODY">
     <p:spTree>
       <p:nvGrpSpPr>
-        <p:cNvPr id="11" name="Shape 11"/>
+        <p:cNvPr id="1" name="Shape 11"/>
         <p:cNvGrpSpPr/>
         <p:nvPr/>
       </p:nvGrpSpPr>
@@ -2127,7 +2205,9 @@
       <p:sp>
         <p:nvSpPr>
           <p:cNvPr id="12" name="Google Shape;12;p3"/>
-          <p:cNvSpPr txBox="1"/>
+          <p:cNvSpPr txBox="1">
+            <a:spLocks noGrp="1"/>
+          </p:cNvSpPr>
           <p:nvPr>
             <p:ph type="title"/>
           </p:nvPr>
@@ -2142,7 +2222,7 @@
           </a:prstGeom>
         </p:spPr>
         <p:txBody>
-          <a:bodyPr anchorCtr="0" anchor="b" bIns="91425" lIns="91425" spcFirstLastPara="1" rIns="91425" wrap="square" tIns="91425">
+          <a:bodyPr spcFirstLastPara="1" wrap="square" lIns="91425" tIns="91425" rIns="91425" bIns="91425" anchor="b" anchorCtr="0">
             <a:noAutofit/>
           </a:bodyPr>
           <a:lstStyle>
@@ -2246,15 +2326,19 @@
               <a:defRPr/>
             </a:lvl9pPr>
           </a:lstStyle>
-          <a:p/>
+          <a:p>
+            <a:endParaRPr/>
+          </a:p>
         </p:txBody>
       </p:sp>
       <p:sp>
         <p:nvSpPr>
           <p:cNvPr id="13" name="Google Shape;13;p3"/>
-          <p:cNvSpPr txBox="1"/>
+          <p:cNvSpPr txBox="1">
+            <a:spLocks noGrp="1"/>
+          </p:cNvSpPr>
           <p:nvPr>
-            <p:ph idx="1" type="body"/>
+            <p:ph type="body" idx="1"/>
           </p:nvPr>
         </p:nvSpPr>
         <p:spPr>
@@ -2267,11 +2351,11 @@
           </a:prstGeom>
         </p:spPr>
         <p:txBody>
-          <a:bodyPr anchorCtr="0" anchor="t" bIns="91425" lIns="91425" spcFirstLastPara="1" rIns="91425" wrap="square" tIns="91425">
+          <a:bodyPr spcFirstLastPara="1" wrap="square" lIns="91425" tIns="91425" rIns="91425" bIns="91425" anchor="t" anchorCtr="0">
             <a:noAutofit/>
           </a:bodyPr>
           <a:lstStyle>
-            <a:lvl1pPr indent="-419100" lvl="0" marL="457200">
+            <a:lvl1pPr marL="457200" lvl="0" indent="-419100">
               <a:spcBef>
                 <a:spcPts val="600"/>
               </a:spcBef>
@@ -2282,7 +2366,7 @@
               <a:buChar char="●"/>
               <a:defRPr/>
             </a:lvl1pPr>
-            <a:lvl2pPr indent="-381000" lvl="1" marL="914400">
+            <a:lvl2pPr marL="914400" lvl="1" indent="-381000">
               <a:spcBef>
                 <a:spcPts val="0"/>
               </a:spcBef>
@@ -2293,7 +2377,7 @@
               <a:buChar char="○"/>
               <a:defRPr/>
             </a:lvl2pPr>
-            <a:lvl3pPr indent="-381000" lvl="2" marL="1371600">
+            <a:lvl3pPr marL="1371600" lvl="2" indent="-381000">
               <a:spcBef>
                 <a:spcPts val="0"/>
               </a:spcBef>
@@ -2304,7 +2388,7 @@
               <a:buChar char="■"/>
               <a:defRPr/>
             </a:lvl3pPr>
-            <a:lvl4pPr indent="-342900" lvl="3" marL="1828800">
+            <a:lvl4pPr marL="1828800" lvl="3" indent="-342900">
               <a:spcBef>
                 <a:spcPts val="0"/>
               </a:spcBef>
@@ -2315,7 +2399,7 @@
               <a:buChar char="●"/>
               <a:defRPr/>
             </a:lvl4pPr>
-            <a:lvl5pPr indent="-342900" lvl="4" marL="2286000">
+            <a:lvl5pPr marL="2286000" lvl="4" indent="-342900">
               <a:spcBef>
                 <a:spcPts val="0"/>
               </a:spcBef>
@@ -2326,7 +2410,7 @@
               <a:buChar char="○"/>
               <a:defRPr/>
             </a:lvl5pPr>
-            <a:lvl6pPr indent="-342900" lvl="5" marL="2743200">
+            <a:lvl6pPr marL="2743200" lvl="5" indent="-342900">
               <a:spcBef>
                 <a:spcPts val="0"/>
               </a:spcBef>
@@ -2337,7 +2421,7 @@
               <a:buChar char="■"/>
               <a:defRPr/>
             </a:lvl6pPr>
-            <a:lvl7pPr indent="-342900" lvl="6" marL="3200400">
+            <a:lvl7pPr marL="3200400" lvl="6" indent="-342900">
               <a:spcBef>
                 <a:spcPts val="0"/>
               </a:spcBef>
@@ -2348,7 +2432,7 @@
               <a:buChar char="●"/>
               <a:defRPr/>
             </a:lvl7pPr>
-            <a:lvl8pPr indent="-342900" lvl="7" marL="3657600">
+            <a:lvl8pPr marL="3657600" lvl="7" indent="-342900">
               <a:spcBef>
                 <a:spcPts val="0"/>
               </a:spcBef>
@@ -2359,7 +2443,7 @@
               <a:buChar char="○"/>
               <a:defRPr/>
             </a:lvl8pPr>
-            <a:lvl9pPr indent="-342900" lvl="8" marL="4114800">
+            <a:lvl9pPr marL="4114800" lvl="8" indent="-342900">
               <a:spcBef>
                 <a:spcPts val="0"/>
               </a:spcBef>
@@ -2371,7 +2455,9 @@
               <a:defRPr/>
             </a:lvl9pPr>
           </a:lstStyle>
-          <a:p/>
+          <a:p>
+            <a:endParaRPr/>
+          </a:p>
         </p:txBody>
       </p:sp>
     </p:spTree>
@@ -2383,11 +2469,11 @@
 </file>
 
 <file path=ppt/slideLayouts/slideLayout3.xml><?xml version="1.0" encoding="utf-8"?>
-<p:sldLayout xmlns:a="http://schemas.openxmlformats.org/drawingml/2006/main" xmlns:r="http://schemas.openxmlformats.org/officeDocument/2006/relationships" xmlns:mc="http://schemas.openxmlformats.org/markup-compatibility/2006" xmlns:mv="urn:schemas-microsoft-com:mac:vml" xmlns:p="http://schemas.openxmlformats.org/presentationml/2006/main" xmlns:c="http://schemas.openxmlformats.org/drawingml/2006/chart" xmlns:dgm="http://schemas.openxmlformats.org/drawingml/2006/diagram" xmlns:o="urn:schemas-microsoft-com:office:office" xmlns:v="urn:schemas-microsoft-com:vml" xmlns:pvml="urn:schemas-microsoft-com:office:powerpoint" xmlns:com="http://schemas.openxmlformats.org/drawingml/2006/compatibility" xmlns:p14="http://schemas.microsoft.com/office/powerpoint/2010/main" xmlns:p15="http://schemas.microsoft.com/office/powerpoint/2012/main" matchingName="Title and two columns" type="twoColTx">
+<p:sldLayout xmlns:a="http://schemas.openxmlformats.org/drawingml/2006/main" xmlns:r="http://schemas.openxmlformats.org/officeDocument/2006/relationships" xmlns:p="http://schemas.openxmlformats.org/presentationml/2006/main" matchingName="Title and two columns" type="twoColTx">
   <p:cSld name="TITLE_AND_TWO_COLUMNS">
     <p:spTree>
       <p:nvGrpSpPr>
-        <p:cNvPr id="14" name="Shape 14"/>
+        <p:cNvPr id="1" name="Shape 14"/>
         <p:cNvGrpSpPr/>
         <p:nvPr/>
       </p:nvGrpSpPr>
@@ -2402,7 +2488,9 @@
       <p:sp>
         <p:nvSpPr>
           <p:cNvPr id="15" name="Google Shape;15;p4"/>
-          <p:cNvSpPr txBox="1"/>
+          <p:cNvSpPr txBox="1">
+            <a:spLocks noGrp="1"/>
+          </p:cNvSpPr>
           <p:nvPr>
             <p:ph type="title"/>
           </p:nvPr>
@@ -2417,7 +2505,7 @@
           </a:prstGeom>
         </p:spPr>
         <p:txBody>
-          <a:bodyPr anchorCtr="0" anchor="b" bIns="91425" lIns="91425" spcFirstLastPara="1" rIns="91425" wrap="square" tIns="91425">
+          <a:bodyPr spcFirstLastPara="1" wrap="square" lIns="91425" tIns="91425" rIns="91425" bIns="91425" anchor="b" anchorCtr="0">
             <a:noAutofit/>
           </a:bodyPr>
           <a:lstStyle>
@@ -2521,15 +2609,19 @@
               <a:defRPr/>
             </a:lvl9pPr>
           </a:lstStyle>
-          <a:p/>
+          <a:p>
+            <a:endParaRPr/>
+          </a:p>
         </p:txBody>
       </p:sp>
       <p:sp>
         <p:nvSpPr>
           <p:cNvPr id="16" name="Google Shape;16;p4"/>
-          <p:cNvSpPr txBox="1"/>
+          <p:cNvSpPr txBox="1">
+            <a:spLocks noGrp="1"/>
+          </p:cNvSpPr>
           <p:nvPr>
-            <p:ph idx="1" type="body"/>
+            <p:ph type="body" idx="1"/>
           </p:nvPr>
         </p:nvSpPr>
         <p:spPr>
@@ -2542,11 +2634,11 @@
           </a:prstGeom>
         </p:spPr>
         <p:txBody>
-          <a:bodyPr anchorCtr="0" anchor="t" bIns="91425" lIns="91425" spcFirstLastPara="1" rIns="91425" wrap="square" tIns="91425">
+          <a:bodyPr spcFirstLastPara="1" wrap="square" lIns="91425" tIns="91425" rIns="91425" bIns="91425" anchor="t" anchorCtr="0">
             <a:noAutofit/>
           </a:bodyPr>
           <a:lstStyle>
-            <a:lvl1pPr indent="-419100" lvl="0" marL="457200">
+            <a:lvl1pPr marL="457200" lvl="0" indent="-419100">
               <a:spcBef>
                 <a:spcPts val="600"/>
               </a:spcBef>
@@ -2557,7 +2649,7 @@
               <a:buChar char="●"/>
               <a:defRPr/>
             </a:lvl1pPr>
-            <a:lvl2pPr indent="-381000" lvl="1" marL="914400">
+            <a:lvl2pPr marL="914400" lvl="1" indent="-381000">
               <a:spcBef>
                 <a:spcPts val="0"/>
               </a:spcBef>
@@ -2568,7 +2660,7 @@
               <a:buChar char="○"/>
               <a:defRPr/>
             </a:lvl2pPr>
-            <a:lvl3pPr indent="-381000" lvl="2" marL="1371600">
+            <a:lvl3pPr marL="1371600" lvl="2" indent="-381000">
               <a:spcBef>
                 <a:spcPts val="0"/>
               </a:spcBef>
@@ -2579,7 +2671,7 @@
               <a:buChar char="■"/>
               <a:defRPr/>
             </a:lvl3pPr>
-            <a:lvl4pPr indent="-342900" lvl="3" marL="1828800">
+            <a:lvl4pPr marL="1828800" lvl="3" indent="-342900">
               <a:spcBef>
                 <a:spcPts val="0"/>
               </a:spcBef>
@@ -2590,7 +2682,7 @@
               <a:buChar char="●"/>
               <a:defRPr/>
             </a:lvl4pPr>
-            <a:lvl5pPr indent="-342900" lvl="4" marL="2286000">
+            <a:lvl5pPr marL="2286000" lvl="4" indent="-342900">
               <a:spcBef>
                 <a:spcPts val="0"/>
               </a:spcBef>
@@ -2601,7 +2693,7 @@
               <a:buChar char="○"/>
               <a:defRPr/>
             </a:lvl5pPr>
-            <a:lvl6pPr indent="-342900" lvl="5" marL="2743200">
+            <a:lvl6pPr marL="2743200" lvl="5" indent="-342900">
               <a:spcBef>
                 <a:spcPts val="0"/>
               </a:spcBef>
@@ -2612,7 +2704,7 @@
               <a:buChar char="■"/>
               <a:defRPr/>
             </a:lvl6pPr>
-            <a:lvl7pPr indent="-342900" lvl="6" marL="3200400">
+            <a:lvl7pPr marL="3200400" lvl="6" indent="-342900">
               <a:spcBef>
                 <a:spcPts val="0"/>
               </a:spcBef>
@@ -2623,7 +2715,7 @@
               <a:buChar char="●"/>
               <a:defRPr/>
             </a:lvl7pPr>
-            <a:lvl8pPr indent="-342900" lvl="7" marL="3657600">
+            <a:lvl8pPr marL="3657600" lvl="7" indent="-342900">
               <a:spcBef>
                 <a:spcPts val="0"/>
               </a:spcBef>
@@ -2634,7 +2726,7 @@
               <a:buChar char="○"/>
               <a:defRPr/>
             </a:lvl8pPr>
-            <a:lvl9pPr indent="-342900" lvl="8" marL="4114800">
+            <a:lvl9pPr marL="4114800" lvl="8" indent="-342900">
               <a:spcBef>
                 <a:spcPts val="0"/>
               </a:spcBef>
@@ -2646,15 +2738,19 @@
               <a:defRPr/>
             </a:lvl9pPr>
           </a:lstStyle>
-          <a:p/>
+          <a:p>
+            <a:endParaRPr/>
+          </a:p>
         </p:txBody>
       </p:sp>
       <p:sp>
         <p:nvSpPr>
           <p:cNvPr id="17" name="Google Shape;17;p4"/>
-          <p:cNvSpPr txBox="1"/>
+          <p:cNvSpPr txBox="1">
+            <a:spLocks noGrp="1"/>
+          </p:cNvSpPr>
           <p:nvPr>
-            <p:ph idx="2" type="body"/>
+            <p:ph type="body" idx="2"/>
           </p:nvPr>
         </p:nvSpPr>
         <p:spPr>
@@ -2667,11 +2763,11 @@
           </a:prstGeom>
         </p:spPr>
         <p:txBody>
-          <a:bodyPr anchorCtr="0" anchor="t" bIns="91425" lIns="91425" spcFirstLastPara="1" rIns="91425" wrap="square" tIns="91425">
+          <a:bodyPr spcFirstLastPara="1" wrap="square" lIns="91425" tIns="91425" rIns="91425" bIns="91425" anchor="t" anchorCtr="0">
             <a:noAutofit/>
           </a:bodyPr>
           <a:lstStyle>
-            <a:lvl1pPr indent="-419100" lvl="0" marL="457200">
+            <a:lvl1pPr marL="457200" lvl="0" indent="-419100">
               <a:spcBef>
                 <a:spcPts val="600"/>
               </a:spcBef>
@@ -2682,7 +2778,7 @@
               <a:buChar char="●"/>
               <a:defRPr/>
             </a:lvl1pPr>
-            <a:lvl2pPr indent="-381000" lvl="1" marL="914400">
+            <a:lvl2pPr marL="914400" lvl="1" indent="-381000">
               <a:spcBef>
                 <a:spcPts val="0"/>
               </a:spcBef>
@@ -2693,7 +2789,7 @@
               <a:buChar char="○"/>
               <a:defRPr/>
             </a:lvl2pPr>
-            <a:lvl3pPr indent="-381000" lvl="2" marL="1371600">
+            <a:lvl3pPr marL="1371600" lvl="2" indent="-381000">
               <a:spcBef>
                 <a:spcPts val="0"/>
               </a:spcBef>
@@ -2704,7 +2800,7 @@
               <a:buChar char="■"/>
               <a:defRPr/>
             </a:lvl3pPr>
-            <a:lvl4pPr indent="-342900" lvl="3" marL="1828800">
+            <a:lvl4pPr marL="1828800" lvl="3" indent="-342900">
               <a:spcBef>
                 <a:spcPts val="0"/>
               </a:spcBef>
@@ -2715,7 +2811,7 @@
               <a:buChar char="●"/>
               <a:defRPr/>
             </a:lvl4pPr>
-            <a:lvl5pPr indent="-342900" lvl="4" marL="2286000">
+            <a:lvl5pPr marL="2286000" lvl="4" indent="-342900">
               <a:spcBef>
                 <a:spcPts val="0"/>
               </a:spcBef>
@@ -2726,7 +2822,7 @@
               <a:buChar char="○"/>
               <a:defRPr/>
             </a:lvl5pPr>
-            <a:lvl6pPr indent="-342900" lvl="5" marL="2743200">
+            <a:lvl6pPr marL="2743200" lvl="5" indent="-342900">
               <a:spcBef>
                 <a:spcPts val="0"/>
               </a:spcBef>
@@ -2737,7 +2833,7 @@
               <a:buChar char="■"/>
               <a:defRPr/>
             </a:lvl6pPr>
-            <a:lvl7pPr indent="-342900" lvl="6" marL="3200400">
+            <a:lvl7pPr marL="3200400" lvl="6" indent="-342900">
               <a:spcBef>
                 <a:spcPts val="0"/>
               </a:spcBef>
@@ -2748,7 +2844,7 @@
               <a:buChar char="●"/>
               <a:defRPr/>
             </a:lvl7pPr>
-            <a:lvl8pPr indent="-342900" lvl="7" marL="3657600">
+            <a:lvl8pPr marL="3657600" lvl="7" indent="-342900">
               <a:spcBef>
                 <a:spcPts val="0"/>
               </a:spcBef>
@@ -2759,7 +2855,7 @@
               <a:buChar char="○"/>
               <a:defRPr/>
             </a:lvl8pPr>
-            <a:lvl9pPr indent="-342900" lvl="8" marL="4114800">
+            <a:lvl9pPr marL="4114800" lvl="8" indent="-342900">
               <a:spcBef>
                 <a:spcPts val="0"/>
               </a:spcBef>
@@ -2771,7 +2867,9 @@
               <a:defRPr/>
             </a:lvl9pPr>
           </a:lstStyle>
-          <a:p/>
+          <a:p>
+            <a:endParaRPr/>
+          </a:p>
         </p:txBody>
       </p:sp>
     </p:spTree>
@@ -2783,11 +2881,11 @@
 </file>
 
 <file path=ppt/slideLayouts/slideLayout4.xml><?xml version="1.0" encoding="utf-8"?>
-<p:sldLayout xmlns:a="http://schemas.openxmlformats.org/drawingml/2006/main" xmlns:r="http://schemas.openxmlformats.org/officeDocument/2006/relationships" xmlns:mc="http://schemas.openxmlformats.org/markup-compatibility/2006" xmlns:mv="urn:schemas-microsoft-com:mac:vml" xmlns:p="http://schemas.openxmlformats.org/presentationml/2006/main" xmlns:c="http://schemas.openxmlformats.org/drawingml/2006/chart" xmlns:dgm="http://schemas.openxmlformats.org/drawingml/2006/diagram" xmlns:o="urn:schemas-microsoft-com:office:office" xmlns:v="urn:schemas-microsoft-com:vml" xmlns:pvml="urn:schemas-microsoft-com:office:powerpoint" xmlns:com="http://schemas.openxmlformats.org/drawingml/2006/compatibility" xmlns:p14="http://schemas.microsoft.com/office/powerpoint/2010/main" xmlns:p15="http://schemas.microsoft.com/office/powerpoint/2012/main" matchingName="Title only" type="titleOnly">
+<p:sldLayout xmlns:a="http://schemas.openxmlformats.org/drawingml/2006/main" xmlns:r="http://schemas.openxmlformats.org/officeDocument/2006/relationships" xmlns:p="http://schemas.openxmlformats.org/presentationml/2006/main" matchingName="Title only" type="titleOnly">
   <p:cSld name="TITLE_ONLY">
     <p:spTree>
       <p:nvGrpSpPr>
-        <p:cNvPr id="18" name="Shape 18"/>
+        <p:cNvPr id="1" name="Shape 18"/>
         <p:cNvGrpSpPr/>
         <p:nvPr/>
       </p:nvGrpSpPr>
@@ -2802,7 +2900,9 @@
       <p:sp>
         <p:nvSpPr>
           <p:cNvPr id="19" name="Google Shape;19;p5"/>
-          <p:cNvSpPr txBox="1"/>
+          <p:cNvSpPr txBox="1">
+            <a:spLocks noGrp="1"/>
+          </p:cNvSpPr>
           <p:nvPr>
             <p:ph type="title"/>
           </p:nvPr>
@@ -2817,7 +2917,7 @@
           </a:prstGeom>
         </p:spPr>
         <p:txBody>
-          <a:bodyPr anchorCtr="0" anchor="b" bIns="91425" lIns="91425" spcFirstLastPara="1" rIns="91425" wrap="square" tIns="91425">
+          <a:bodyPr spcFirstLastPara="1" wrap="square" lIns="91425" tIns="91425" rIns="91425" bIns="91425" anchor="b" anchorCtr="0">
             <a:noAutofit/>
           </a:bodyPr>
           <a:lstStyle>
@@ -2921,7 +3021,9 @@
               <a:defRPr/>
             </a:lvl9pPr>
           </a:lstStyle>
-          <a:p/>
+          <a:p>
+            <a:endParaRPr/>
+          </a:p>
         </p:txBody>
       </p:sp>
     </p:spTree>
@@ -2933,11 +3035,11 @@
 </file>
 
 <file path=ppt/slideLayouts/slideLayout5.xml><?xml version="1.0" encoding="utf-8"?>
-<p:sldLayout xmlns:a="http://schemas.openxmlformats.org/drawingml/2006/main" xmlns:r="http://schemas.openxmlformats.org/officeDocument/2006/relationships" xmlns:mc="http://schemas.openxmlformats.org/markup-compatibility/2006" xmlns:mv="urn:schemas-microsoft-com:mac:vml" xmlns:p="http://schemas.openxmlformats.org/presentationml/2006/main" xmlns:c="http://schemas.openxmlformats.org/drawingml/2006/chart" xmlns:dgm="http://schemas.openxmlformats.org/drawingml/2006/diagram" xmlns:o="urn:schemas-microsoft-com:office:office" xmlns:v="urn:schemas-microsoft-com:vml" xmlns:pvml="urn:schemas-microsoft-com:office:powerpoint" xmlns:com="http://schemas.openxmlformats.org/drawingml/2006/compatibility" xmlns:p14="http://schemas.microsoft.com/office/powerpoint/2010/main" xmlns:p15="http://schemas.microsoft.com/office/powerpoint/2012/main" matchingName="Caption">
+<p:sldLayout xmlns:a="http://schemas.openxmlformats.org/drawingml/2006/main" xmlns:r="http://schemas.openxmlformats.org/officeDocument/2006/relationships" xmlns:p="http://schemas.openxmlformats.org/presentationml/2006/main" matchingName="Caption">
   <p:cSld name="CAPTION_ONLY">
     <p:spTree>
       <p:nvGrpSpPr>
-        <p:cNvPr id="20" name="Shape 20"/>
+        <p:cNvPr id="1" name="Shape 20"/>
         <p:cNvGrpSpPr/>
         <p:nvPr/>
       </p:nvGrpSpPr>
@@ -2952,9 +3054,11 @@
       <p:sp>
         <p:nvSpPr>
           <p:cNvPr id="21" name="Google Shape;21;p6"/>
-          <p:cNvSpPr txBox="1"/>
+          <p:cNvSpPr txBox="1">
+            <a:spLocks noGrp="1"/>
+          </p:cNvSpPr>
           <p:nvPr>
-            <p:ph idx="1" type="body"/>
+            <p:ph type="body" idx="1"/>
           </p:nvPr>
         </p:nvSpPr>
         <p:spPr>
@@ -2967,11 +3071,11 @@
           </a:prstGeom>
         </p:spPr>
         <p:txBody>
-          <a:bodyPr anchorCtr="0" anchor="t" bIns="91425" lIns="91425" spcFirstLastPara="1" rIns="91425" wrap="square" tIns="91425">
+          <a:bodyPr spcFirstLastPara="1" wrap="square" lIns="91425" tIns="91425" rIns="91425" bIns="91425" anchor="t" anchorCtr="0">
             <a:noAutofit/>
           </a:bodyPr>
           <a:lstStyle>
-            <a:lvl1pPr indent="-228600" lvl="0" marL="457200" algn="ctr">
+            <a:lvl1pPr marL="457200" lvl="0" indent="-228600" algn="ctr">
               <a:spcBef>
                 <a:spcPts val="360"/>
               </a:spcBef>
@@ -2983,7 +3087,9 @@
               <a:defRPr sz="1800"/>
             </a:lvl1pPr>
           </a:lstStyle>
-          <a:p/>
+          <a:p>
+            <a:endParaRPr/>
+          </a:p>
         </p:txBody>
       </p:sp>
     </p:spTree>
@@ -2995,11 +3101,11 @@
 </file>
 
 <file path=ppt/slideLayouts/slideLayout6.xml><?xml version="1.0" encoding="utf-8"?>
-<p:sldLayout xmlns:a="http://schemas.openxmlformats.org/drawingml/2006/main" xmlns:r="http://schemas.openxmlformats.org/officeDocument/2006/relationships" xmlns:mc="http://schemas.openxmlformats.org/markup-compatibility/2006" xmlns:mv="urn:schemas-microsoft-com:mac:vml" xmlns:p="http://schemas.openxmlformats.org/presentationml/2006/main" xmlns:c="http://schemas.openxmlformats.org/drawingml/2006/chart" xmlns:dgm="http://schemas.openxmlformats.org/drawingml/2006/diagram" xmlns:o="urn:schemas-microsoft-com:office:office" xmlns:v="urn:schemas-microsoft-com:vml" xmlns:pvml="urn:schemas-microsoft-com:office:powerpoint" xmlns:com="http://schemas.openxmlformats.org/drawingml/2006/compatibility" xmlns:p14="http://schemas.microsoft.com/office/powerpoint/2010/main" xmlns:p15="http://schemas.microsoft.com/office/powerpoint/2012/main" matchingName="Blank" type="blank">
+<p:sldLayout xmlns:a="http://schemas.openxmlformats.org/drawingml/2006/main" xmlns:r="http://schemas.openxmlformats.org/officeDocument/2006/relationships" xmlns:p="http://schemas.openxmlformats.org/presentationml/2006/main" matchingName="Blank" type="blank">
   <p:cSld name="BLANK">
     <p:spTree>
       <p:nvGrpSpPr>
-        <p:cNvPr id="22" name="Shape 22"/>
+        <p:cNvPr id="1" name="Shape 22"/>
         <p:cNvGrpSpPr/>
         <p:nvPr/>
       </p:nvGrpSpPr>
@@ -3020,18 +3126,19 @@
 </file>
 
 <file path=ppt/slideMasters/slideMaster1.xml><?xml version="1.0" encoding="utf-8"?>
-<p:sldMaster xmlns:a="http://schemas.openxmlformats.org/drawingml/2006/main" xmlns:r="http://schemas.openxmlformats.org/officeDocument/2006/relationships" xmlns:mc="http://schemas.openxmlformats.org/markup-compatibility/2006" xmlns:mv="urn:schemas-microsoft-com:mac:vml" xmlns:p="http://schemas.openxmlformats.org/presentationml/2006/main" xmlns:c="http://schemas.openxmlformats.org/drawingml/2006/chart" xmlns:dgm="http://schemas.openxmlformats.org/drawingml/2006/diagram" xmlns:o="urn:schemas-microsoft-com:office:office" xmlns:v="urn:schemas-microsoft-com:vml" xmlns:pvml="urn:schemas-microsoft-com:office:powerpoint" xmlns:com="http://schemas.openxmlformats.org/drawingml/2006/compatibility" xmlns:p14="http://schemas.microsoft.com/office/powerpoint/2010/main" xmlns:p15="http://schemas.microsoft.com/office/powerpoint/2012/main">
+<p:sldMaster xmlns:a="http://schemas.openxmlformats.org/drawingml/2006/main" xmlns:r="http://schemas.openxmlformats.org/officeDocument/2006/relationships" xmlns:p="http://schemas.openxmlformats.org/presentationml/2006/main">
   <p:cSld name="simple-light">
     <p:bg>
       <p:bgPr>
         <a:solidFill>
           <a:schemeClr val="lt1"/>
         </a:solidFill>
+        <a:effectLst/>
       </p:bgPr>
     </p:bg>
     <p:spTree>
       <p:nvGrpSpPr>
-        <p:cNvPr id="5" name="Shape 5"/>
+        <p:cNvPr id="1" name="Shape 5"/>
         <p:cNvGrpSpPr/>
         <p:nvPr/>
       </p:nvGrpSpPr>
@@ -3046,7 +3153,9 @@
       <p:sp>
         <p:nvSpPr>
           <p:cNvPr id="6" name="Google Shape;6;p1"/>
-          <p:cNvSpPr txBox="1"/>
+          <p:cNvSpPr txBox="1">
+            <a:spLocks noGrp="1"/>
+          </p:cNvSpPr>
           <p:nvPr>
             <p:ph type="title"/>
           </p:nvPr>
@@ -3065,7 +3174,7 @@
           </a:ln>
         </p:spPr>
         <p:txBody>
-          <a:bodyPr anchorCtr="0" anchor="b" bIns="91425" lIns="91425" spcFirstLastPara="1" rIns="91425" wrap="square" tIns="91425">
+          <a:bodyPr spcFirstLastPara="1" wrap="square" lIns="91425" tIns="91425" rIns="91425" bIns="91425" anchor="b" anchorCtr="0">
             <a:noAutofit/>
           </a:bodyPr>
           <a:lstStyle>
@@ -3081,7 +3190,7 @@
               </a:buClr>
               <a:buSzPts val="3600"/>
               <a:buNone/>
-              <a:defRPr b="1" sz="3600">
+              <a:defRPr sz="3600" b="1">
                 <a:solidFill>
                   <a:schemeClr val="dk1"/>
                 </a:solidFill>
@@ -3099,7 +3208,7 @@
               </a:buClr>
               <a:buSzPts val="3600"/>
               <a:buNone/>
-              <a:defRPr b="1" sz="3600">
+              <a:defRPr sz="3600" b="1">
                 <a:solidFill>
                   <a:schemeClr val="dk1"/>
                 </a:solidFill>
@@ -3117,7 +3226,7 @@
               </a:buClr>
               <a:buSzPts val="3600"/>
               <a:buNone/>
-              <a:defRPr b="1" sz="3600">
+              <a:defRPr sz="3600" b="1">
                 <a:solidFill>
                   <a:schemeClr val="dk1"/>
                 </a:solidFill>
@@ -3135,7 +3244,7 @@
               </a:buClr>
               <a:buSzPts val="3600"/>
               <a:buNone/>
-              <a:defRPr b="1" sz="3600">
+              <a:defRPr sz="3600" b="1">
                 <a:solidFill>
                   <a:schemeClr val="dk1"/>
                 </a:solidFill>
@@ -3153,7 +3262,7 @@
               </a:buClr>
               <a:buSzPts val="3600"/>
               <a:buNone/>
-              <a:defRPr b="1" sz="3600">
+              <a:defRPr sz="3600" b="1">
                 <a:solidFill>
                   <a:schemeClr val="dk1"/>
                 </a:solidFill>
@@ -3171,7 +3280,7 @@
               </a:buClr>
               <a:buSzPts val="3600"/>
               <a:buNone/>
-              <a:defRPr b="1" sz="3600">
+              <a:defRPr sz="3600" b="1">
                 <a:solidFill>
                   <a:schemeClr val="dk1"/>
                 </a:solidFill>
@@ -3189,7 +3298,7 @@
               </a:buClr>
               <a:buSzPts val="3600"/>
               <a:buNone/>
-              <a:defRPr b="1" sz="3600">
+              <a:defRPr sz="3600" b="1">
                 <a:solidFill>
                   <a:schemeClr val="dk1"/>
                 </a:solidFill>
@@ -3207,7 +3316,7 @@
               </a:buClr>
               <a:buSzPts val="3600"/>
               <a:buNone/>
-              <a:defRPr b="1" sz="3600">
+              <a:defRPr sz="3600" b="1">
                 <a:solidFill>
                   <a:schemeClr val="dk1"/>
                 </a:solidFill>
@@ -3225,22 +3334,26 @@
               </a:buClr>
               <a:buSzPts val="3600"/>
               <a:buNone/>
-              <a:defRPr b="1" sz="3600">
+              <a:defRPr sz="3600" b="1">
                 <a:solidFill>
                   <a:schemeClr val="dk1"/>
                 </a:solidFill>
               </a:defRPr>
             </a:lvl9pPr>
           </a:lstStyle>
-          <a:p/>
+          <a:p>
+            <a:endParaRPr/>
+          </a:p>
         </p:txBody>
       </p:sp>
       <p:sp>
         <p:nvSpPr>
           <p:cNvPr id="7" name="Google Shape;7;p1"/>
-          <p:cNvSpPr txBox="1"/>
+          <p:cNvSpPr txBox="1">
+            <a:spLocks noGrp="1"/>
+          </p:cNvSpPr>
           <p:nvPr>
-            <p:ph idx="1" type="body"/>
+            <p:ph type="body" idx="1"/>
           </p:nvPr>
         </p:nvSpPr>
         <p:spPr>
@@ -3257,11 +3370,11 @@
           </a:ln>
         </p:spPr>
         <p:txBody>
-          <a:bodyPr anchorCtr="0" anchor="t" bIns="91425" lIns="91425" spcFirstLastPara="1" rIns="91425" wrap="square" tIns="91425">
+          <a:bodyPr spcFirstLastPara="1" wrap="square" lIns="91425" tIns="91425" rIns="91425" bIns="91425" anchor="t" anchorCtr="0">
             <a:noAutofit/>
           </a:bodyPr>
           <a:lstStyle>
-            <a:lvl1pPr indent="-419100" lvl="0" marL="457200">
+            <a:lvl1pPr marL="457200" lvl="0" indent="-419100">
               <a:spcBef>
                 <a:spcPts val="600"/>
               </a:spcBef>
@@ -3279,7 +3392,7 @@
                 </a:solidFill>
               </a:defRPr>
             </a:lvl1pPr>
-            <a:lvl2pPr indent="-381000" lvl="1" marL="914400">
+            <a:lvl2pPr marL="914400" lvl="1" indent="-381000">
               <a:spcBef>
                 <a:spcPts val="0"/>
               </a:spcBef>
@@ -3297,7 +3410,7 @@
                 </a:solidFill>
               </a:defRPr>
             </a:lvl2pPr>
-            <a:lvl3pPr indent="-381000" lvl="2" marL="1371600">
+            <a:lvl3pPr marL="1371600" lvl="2" indent="-381000">
               <a:spcBef>
                 <a:spcPts val="0"/>
               </a:spcBef>
@@ -3315,7 +3428,7 @@
                 </a:solidFill>
               </a:defRPr>
             </a:lvl3pPr>
-            <a:lvl4pPr indent="-342900" lvl="3" marL="1828800">
+            <a:lvl4pPr marL="1828800" lvl="3" indent="-342900">
               <a:spcBef>
                 <a:spcPts val="0"/>
               </a:spcBef>
@@ -3333,7 +3446,7 @@
                 </a:solidFill>
               </a:defRPr>
             </a:lvl4pPr>
-            <a:lvl5pPr indent="-342900" lvl="4" marL="2286000">
+            <a:lvl5pPr marL="2286000" lvl="4" indent="-342900">
               <a:spcBef>
                 <a:spcPts val="0"/>
               </a:spcBef>
@@ -3351,7 +3464,7 @@
                 </a:solidFill>
               </a:defRPr>
             </a:lvl5pPr>
-            <a:lvl6pPr indent="-342900" lvl="5" marL="2743200">
+            <a:lvl6pPr marL="2743200" lvl="5" indent="-342900">
               <a:spcBef>
                 <a:spcPts val="0"/>
               </a:spcBef>
@@ -3369,7 +3482,7 @@
                 </a:solidFill>
               </a:defRPr>
             </a:lvl6pPr>
-            <a:lvl7pPr indent="-342900" lvl="6" marL="3200400">
+            <a:lvl7pPr marL="3200400" lvl="6" indent="-342900">
               <a:spcBef>
                 <a:spcPts val="0"/>
               </a:spcBef>
@@ -3387,7 +3500,7 @@
                 </a:solidFill>
               </a:defRPr>
             </a:lvl7pPr>
-            <a:lvl8pPr indent="-342900" lvl="7" marL="3657600">
+            <a:lvl8pPr marL="3657600" lvl="7" indent="-342900">
               <a:spcBef>
                 <a:spcPts val="0"/>
               </a:spcBef>
@@ -3405,7 +3518,7 @@
                 </a:solidFill>
               </a:defRPr>
             </a:lvl8pPr>
-            <a:lvl9pPr indent="-342900" lvl="8" marL="4114800">
+            <a:lvl9pPr marL="4114800" lvl="8" indent="-342900">
               <a:spcBef>
                 <a:spcPts val="0"/>
               </a:spcBef>
@@ -3424,12 +3537,14 @@
               </a:defRPr>
             </a:lvl9pPr>
           </a:lstStyle>
-          <a:p/>
+          <a:p>
+            <a:endParaRPr/>
+          </a:p>
         </p:txBody>
       </p:sp>
     </p:spTree>
   </p:cSld>
-  <p:clrMap accent1="accent1" accent2="accent2" accent3="accent3" accent4="accent4" accent5="accent5" accent6="accent6" bg1="lt1" bg2="dk2" tx1="dk1" tx2="lt2" folHlink="folHlink" hlink="hlink"/>
+  <p:clrMap bg1="lt1" tx1="dk1" bg2="dk2" tx2="lt2" accent1="accent1" accent2="accent2" accent3="accent3" accent4="accent4" accent5="accent5" accent6="accent6" hlink="hlink" folHlink="folHlink"/>
   <p:sldLayoutIdLst>
     <p:sldLayoutId id="2147483648" r:id="rId1"/>
     <p:sldLayoutId id="2147483649" r:id="rId2"/>
@@ -3438,10 +3553,10 @@
     <p:sldLayoutId id="2147483652" r:id="rId5"/>
     <p:sldLayoutId id="2147483653" r:id="rId6"/>
   </p:sldLayoutIdLst>
-  <p:hf dt="0" ftr="0" hdr="0" sldNum="0"/>
+  <p:hf sldNum="0" hdr="0" ftr="0" dt="0"/>
   <p:txStyles>
     <p:titleStyle>
-      <a:defPPr lvl="0" marR="0" rtl="0" algn="l">
+      <a:defPPr marR="0" lvl="0" algn="l" rtl="0">
         <a:lnSpc>
           <a:spcPct val="100000"/>
         </a:lnSpc>
@@ -3452,7 +3567,7 @@
           <a:spcPts val="0"/>
         </a:spcAft>
       </a:defPPr>
-      <a:lvl1pPr lvl="0" marR="0" rtl="0" algn="l">
+      <a:lvl1pPr marR="0" lvl="0" algn="l" rtl="0">
         <a:lnSpc>
           <a:spcPct val="100000"/>
         </a:lnSpc>
@@ -3466,7 +3581,7 @@
           <a:srgbClr val="000000"/>
         </a:buClr>
         <a:buFont typeface="Arial"/>
-        <a:defRPr b="0" i="0" sz="1400" u="none" cap="none" strike="noStrike">
+        <a:defRPr sz="1400" b="0" i="0" u="none" strike="noStrike" cap="none">
           <a:solidFill>
             <a:srgbClr val="000000"/>
           </a:solidFill>
@@ -3476,7 +3591,7 @@
           <a:sym typeface="Arial"/>
         </a:defRPr>
       </a:lvl1pPr>
-      <a:lvl2pPr lvl="1" marR="0" rtl="0" algn="l">
+      <a:lvl2pPr marR="0" lvl="1" algn="l" rtl="0">
         <a:lnSpc>
           <a:spcPct val="100000"/>
         </a:lnSpc>
@@ -3490,7 +3605,7 @@
           <a:srgbClr val="000000"/>
         </a:buClr>
         <a:buFont typeface="Arial"/>
-        <a:defRPr b="0" i="0" sz="1400" u="none" cap="none" strike="noStrike">
+        <a:defRPr sz="1400" b="0" i="0" u="none" strike="noStrike" cap="none">
           <a:solidFill>
             <a:srgbClr val="000000"/>
           </a:solidFill>
@@ -3500,7 +3615,7 @@
           <a:sym typeface="Arial"/>
         </a:defRPr>
       </a:lvl2pPr>
-      <a:lvl3pPr lvl="2" marR="0" rtl="0" algn="l">
+      <a:lvl3pPr marR="0" lvl="2" algn="l" rtl="0">
         <a:lnSpc>
           <a:spcPct val="100000"/>
         </a:lnSpc>
@@ -3514,7 +3629,7 @@
           <a:srgbClr val="000000"/>
         </a:buClr>
         <a:buFont typeface="Arial"/>
-        <a:defRPr b="0" i="0" sz="1400" u="none" cap="none" strike="noStrike">
+        <a:defRPr sz="1400" b="0" i="0" u="none" strike="noStrike" cap="none">
           <a:solidFill>
             <a:srgbClr val="000000"/>
           </a:solidFill>
@@ -3524,7 +3639,7 @@
           <a:sym typeface="Arial"/>
         </a:defRPr>
       </a:lvl3pPr>
-      <a:lvl4pPr lvl="3" marR="0" rtl="0" algn="l">
+      <a:lvl4pPr marR="0" lvl="3" algn="l" rtl="0">
         <a:lnSpc>
           <a:spcPct val="100000"/>
         </a:lnSpc>
@@ -3538,7 +3653,7 @@
           <a:srgbClr val="000000"/>
         </a:buClr>
         <a:buFont typeface="Arial"/>
-        <a:defRPr b="0" i="0" sz="1400" u="none" cap="none" strike="noStrike">
+        <a:defRPr sz="1400" b="0" i="0" u="none" strike="noStrike" cap="none">
           <a:solidFill>
             <a:srgbClr val="000000"/>
           </a:solidFill>
@@ -3548,7 +3663,7 @@
           <a:sym typeface="Arial"/>
         </a:defRPr>
       </a:lvl4pPr>
-      <a:lvl5pPr lvl="4" marR="0" rtl="0" algn="l">
+      <a:lvl5pPr marR="0" lvl="4" algn="l" rtl="0">
         <a:lnSpc>
           <a:spcPct val="100000"/>
         </a:lnSpc>
@@ -3562,7 +3677,7 @@
           <a:srgbClr val="000000"/>
         </a:buClr>
         <a:buFont typeface="Arial"/>
-        <a:defRPr b="0" i="0" sz="1400" u="none" cap="none" strike="noStrike">
+        <a:defRPr sz="1400" b="0" i="0" u="none" strike="noStrike" cap="none">
           <a:solidFill>
             <a:srgbClr val="000000"/>
           </a:solidFill>
@@ -3572,7 +3687,7 @@
           <a:sym typeface="Arial"/>
         </a:defRPr>
       </a:lvl5pPr>
-      <a:lvl6pPr lvl="5" marR="0" rtl="0" algn="l">
+      <a:lvl6pPr marR="0" lvl="5" algn="l" rtl="0">
         <a:lnSpc>
           <a:spcPct val="100000"/>
         </a:lnSpc>
@@ -3586,7 +3701,7 @@
           <a:srgbClr val="000000"/>
         </a:buClr>
         <a:buFont typeface="Arial"/>
-        <a:defRPr b="0" i="0" sz="1400" u="none" cap="none" strike="noStrike">
+        <a:defRPr sz="1400" b="0" i="0" u="none" strike="noStrike" cap="none">
           <a:solidFill>
             <a:srgbClr val="000000"/>
           </a:solidFill>
@@ -3596,7 +3711,7 @@
           <a:sym typeface="Arial"/>
         </a:defRPr>
       </a:lvl6pPr>
-      <a:lvl7pPr lvl="6" marR="0" rtl="0" algn="l">
+      <a:lvl7pPr marR="0" lvl="6" algn="l" rtl="0">
         <a:lnSpc>
           <a:spcPct val="100000"/>
         </a:lnSpc>
@@ -3610,7 +3725,7 @@
           <a:srgbClr val="000000"/>
         </a:buClr>
         <a:buFont typeface="Arial"/>
-        <a:defRPr b="0" i="0" sz="1400" u="none" cap="none" strike="noStrike">
+        <a:defRPr sz="1400" b="0" i="0" u="none" strike="noStrike" cap="none">
           <a:solidFill>
             <a:srgbClr val="000000"/>
           </a:solidFill>
@@ -3620,7 +3735,7 @@
           <a:sym typeface="Arial"/>
         </a:defRPr>
       </a:lvl7pPr>
-      <a:lvl8pPr lvl="7" marR="0" rtl="0" algn="l">
+      <a:lvl8pPr marR="0" lvl="7" algn="l" rtl="0">
         <a:lnSpc>
           <a:spcPct val="100000"/>
         </a:lnSpc>
@@ -3634,7 +3749,7 @@
           <a:srgbClr val="000000"/>
         </a:buClr>
         <a:buFont typeface="Arial"/>
-        <a:defRPr b="0" i="0" sz="1400" u="none" cap="none" strike="noStrike">
+        <a:defRPr sz="1400" b="0" i="0" u="none" strike="noStrike" cap="none">
           <a:solidFill>
             <a:srgbClr val="000000"/>
           </a:solidFill>
@@ -3644,7 +3759,7 @@
           <a:sym typeface="Arial"/>
         </a:defRPr>
       </a:lvl8pPr>
-      <a:lvl9pPr lvl="8" marR="0" rtl="0" algn="l">
+      <a:lvl9pPr marR="0" lvl="8" algn="l" rtl="0">
         <a:lnSpc>
           <a:spcPct val="100000"/>
         </a:lnSpc>
@@ -3658,7 +3773,7 @@
           <a:srgbClr val="000000"/>
         </a:buClr>
         <a:buFont typeface="Arial"/>
-        <a:defRPr b="0" i="0" sz="1400" u="none" cap="none" strike="noStrike">
+        <a:defRPr sz="1400" b="0" i="0" u="none" strike="noStrike" cap="none">
           <a:solidFill>
             <a:srgbClr val="000000"/>
           </a:solidFill>
@@ -3670,7 +3785,7 @@
       </a:lvl9pPr>
     </p:titleStyle>
     <p:bodyStyle>
-      <a:defPPr lvl="0" marR="0" rtl="0" algn="l">
+      <a:defPPr marR="0" lvl="0" algn="l" rtl="0">
         <a:lnSpc>
           <a:spcPct val="100000"/>
         </a:lnSpc>
@@ -3681,7 +3796,7 @@
           <a:spcPts val="0"/>
         </a:spcAft>
       </a:defPPr>
-      <a:lvl1pPr lvl="0" marR="0" rtl="0" algn="l">
+      <a:lvl1pPr marR="0" lvl="0" algn="l" rtl="0">
         <a:lnSpc>
           <a:spcPct val="100000"/>
         </a:lnSpc>
@@ -3695,7 +3810,7 @@
           <a:srgbClr val="000000"/>
         </a:buClr>
         <a:buFont typeface="Arial"/>
-        <a:defRPr b="0" i="0" sz="1400" u="none" cap="none" strike="noStrike">
+        <a:defRPr sz="1400" b="0" i="0" u="none" strike="noStrike" cap="none">
           <a:solidFill>
             <a:srgbClr val="000000"/>
           </a:solidFill>
@@ -3705,7 +3820,7 @@
           <a:sym typeface="Arial"/>
         </a:defRPr>
       </a:lvl1pPr>
-      <a:lvl2pPr lvl="1" marR="0" rtl="0" algn="l">
+      <a:lvl2pPr marR="0" lvl="1" algn="l" rtl="0">
         <a:lnSpc>
           <a:spcPct val="100000"/>
         </a:lnSpc>
@@ -3719,7 +3834,7 @@
           <a:srgbClr val="000000"/>
         </a:buClr>
         <a:buFont typeface="Arial"/>
-        <a:defRPr b="0" i="0" sz="1400" u="none" cap="none" strike="noStrike">
+        <a:defRPr sz="1400" b="0" i="0" u="none" strike="noStrike" cap="none">
           <a:solidFill>
             <a:srgbClr val="000000"/>
           </a:solidFill>
@@ -3729,7 +3844,7 @@
           <a:sym typeface="Arial"/>
         </a:defRPr>
       </a:lvl2pPr>
-      <a:lvl3pPr lvl="2" marR="0" rtl="0" algn="l">
+      <a:lvl3pPr marR="0" lvl="2" algn="l" rtl="0">
         <a:lnSpc>
           <a:spcPct val="100000"/>
         </a:lnSpc>
@@ -3743,7 +3858,7 @@
           <a:srgbClr val="000000"/>
         </a:buClr>
         <a:buFont typeface="Arial"/>
-        <a:defRPr b="0" i="0" sz="1400" u="none" cap="none" strike="noStrike">
+        <a:defRPr sz="1400" b="0" i="0" u="none" strike="noStrike" cap="none">
           <a:solidFill>
             <a:srgbClr val="000000"/>
           </a:solidFill>
@@ -3753,7 +3868,7 @@
           <a:sym typeface="Arial"/>
         </a:defRPr>
       </a:lvl3pPr>
-      <a:lvl4pPr lvl="3" marR="0" rtl="0" algn="l">
+      <a:lvl4pPr marR="0" lvl="3" algn="l" rtl="0">
         <a:lnSpc>
           <a:spcPct val="100000"/>
         </a:lnSpc>
@@ -3767,7 +3882,7 @@
           <a:srgbClr val="000000"/>
         </a:buClr>
         <a:buFont typeface="Arial"/>
-        <a:defRPr b="0" i="0" sz="1400" u="none" cap="none" strike="noStrike">
+        <a:defRPr sz="1400" b="0" i="0" u="none" strike="noStrike" cap="none">
           <a:solidFill>
             <a:srgbClr val="000000"/>
           </a:solidFill>
@@ -3777,7 +3892,7 @@
           <a:sym typeface="Arial"/>
         </a:defRPr>
       </a:lvl4pPr>
-      <a:lvl5pPr lvl="4" marR="0" rtl="0" algn="l">
+      <a:lvl5pPr marR="0" lvl="4" algn="l" rtl="0">
         <a:lnSpc>
           <a:spcPct val="100000"/>
         </a:lnSpc>
@@ -3791,7 +3906,7 @@
           <a:srgbClr val="000000"/>
         </a:buClr>
         <a:buFont typeface="Arial"/>
-        <a:defRPr b="0" i="0" sz="1400" u="none" cap="none" strike="noStrike">
+        <a:defRPr sz="1400" b="0" i="0" u="none" strike="noStrike" cap="none">
           <a:solidFill>
             <a:srgbClr val="000000"/>
           </a:solidFill>
@@ -3801,7 +3916,7 @@
           <a:sym typeface="Arial"/>
         </a:defRPr>
       </a:lvl5pPr>
-      <a:lvl6pPr lvl="5" marR="0" rtl="0" algn="l">
+      <a:lvl6pPr marR="0" lvl="5" algn="l" rtl="0">
         <a:lnSpc>
           <a:spcPct val="100000"/>
         </a:lnSpc>
@@ -3815,7 +3930,7 @@
           <a:srgbClr val="000000"/>
         </a:buClr>
         <a:buFont typeface="Arial"/>
-        <a:defRPr b="0" i="0" sz="1400" u="none" cap="none" strike="noStrike">
+        <a:defRPr sz="1400" b="0" i="0" u="none" strike="noStrike" cap="none">
           <a:solidFill>
             <a:srgbClr val="000000"/>
           </a:solidFill>
@@ -3825,7 +3940,7 @@
           <a:sym typeface="Arial"/>
         </a:defRPr>
       </a:lvl6pPr>
-      <a:lvl7pPr lvl="6" marR="0" rtl="0" algn="l">
+      <a:lvl7pPr marR="0" lvl="6" algn="l" rtl="0">
         <a:lnSpc>
           <a:spcPct val="100000"/>
         </a:lnSpc>
@@ -3839,7 +3954,7 @@
           <a:srgbClr val="000000"/>
         </a:buClr>
         <a:buFont typeface="Arial"/>
-        <a:defRPr b="0" i="0" sz="1400" u="none" cap="none" strike="noStrike">
+        <a:defRPr sz="1400" b="0" i="0" u="none" strike="noStrike" cap="none">
           <a:solidFill>
             <a:srgbClr val="000000"/>
           </a:solidFill>
@@ -3849,7 +3964,7 @@
           <a:sym typeface="Arial"/>
         </a:defRPr>
       </a:lvl7pPr>
-      <a:lvl8pPr lvl="7" marR="0" rtl="0" algn="l">
+      <a:lvl8pPr marR="0" lvl="7" algn="l" rtl="0">
         <a:lnSpc>
           <a:spcPct val="100000"/>
         </a:lnSpc>
@@ -3863,7 +3978,7 @@
           <a:srgbClr val="000000"/>
         </a:buClr>
         <a:buFont typeface="Arial"/>
-        <a:defRPr b="0" i="0" sz="1400" u="none" cap="none" strike="noStrike">
+        <a:defRPr sz="1400" b="0" i="0" u="none" strike="noStrike" cap="none">
           <a:solidFill>
             <a:srgbClr val="000000"/>
           </a:solidFill>
@@ -3873,7 +3988,7 @@
           <a:sym typeface="Arial"/>
         </a:defRPr>
       </a:lvl8pPr>
-      <a:lvl9pPr lvl="8" marR="0" rtl="0" algn="l">
+      <a:lvl9pPr marR="0" lvl="8" algn="l" rtl="0">
         <a:lnSpc>
           <a:spcPct val="100000"/>
         </a:lnSpc>
@@ -3887,7 +4002,7 @@
           <a:srgbClr val="000000"/>
         </a:buClr>
         <a:buFont typeface="Arial"/>
-        <a:defRPr b="0" i="0" sz="1400" u="none" cap="none" strike="noStrike">
+        <a:defRPr sz="1400" b="0" i="0" u="none" strike="noStrike" cap="none">
           <a:solidFill>
             <a:srgbClr val="000000"/>
           </a:solidFill>
@@ -3899,7 +4014,7 @@
       </a:lvl9pPr>
     </p:bodyStyle>
     <p:otherStyle>
-      <a:defPPr lvl="0" marR="0" rtl="0" algn="l">
+      <a:defPPr marR="0" lvl="0" algn="l" rtl="0">
         <a:lnSpc>
           <a:spcPct val="100000"/>
         </a:lnSpc>
@@ -3910,7 +4025,7 @@
           <a:spcPts val="0"/>
         </a:spcAft>
       </a:defPPr>
-      <a:lvl1pPr lvl="0" marR="0" rtl="0" algn="l">
+      <a:lvl1pPr marR="0" lvl="0" algn="l" rtl="0">
         <a:lnSpc>
           <a:spcPct val="100000"/>
         </a:lnSpc>
@@ -3924,7 +4039,7 @@
           <a:srgbClr val="000000"/>
         </a:buClr>
         <a:buFont typeface="Arial"/>
-        <a:defRPr b="0" i="0" sz="1400" u="none" cap="none" strike="noStrike">
+        <a:defRPr sz="1400" b="0" i="0" u="none" strike="noStrike" cap="none">
           <a:solidFill>
             <a:srgbClr val="000000"/>
           </a:solidFill>
@@ -3934,7 +4049,7 @@
           <a:sym typeface="Arial"/>
         </a:defRPr>
       </a:lvl1pPr>
-      <a:lvl2pPr lvl="1" marR="0" rtl="0" algn="l">
+      <a:lvl2pPr marR="0" lvl="1" algn="l" rtl="0">
         <a:lnSpc>
           <a:spcPct val="100000"/>
         </a:lnSpc>
@@ -3948,7 +4063,7 @@
           <a:srgbClr val="000000"/>
         </a:buClr>
         <a:buFont typeface="Arial"/>
-        <a:defRPr b="0" i="0" sz="1400" u="none" cap="none" strike="noStrike">
+        <a:defRPr sz="1400" b="0" i="0" u="none" strike="noStrike" cap="none">
           <a:solidFill>
             <a:srgbClr val="000000"/>
           </a:solidFill>
@@ -3958,7 +4073,7 @@
           <a:sym typeface="Arial"/>
         </a:defRPr>
       </a:lvl2pPr>
-      <a:lvl3pPr lvl="2" marR="0" rtl="0" algn="l">
+      <a:lvl3pPr marR="0" lvl="2" algn="l" rtl="0">
         <a:lnSpc>
           <a:spcPct val="100000"/>
         </a:lnSpc>
@@ -3972,7 +4087,7 @@
           <a:srgbClr val="000000"/>
         </a:buClr>
         <a:buFont typeface="Arial"/>
-        <a:defRPr b="0" i="0" sz="1400" u="none" cap="none" strike="noStrike">
+        <a:defRPr sz="1400" b="0" i="0" u="none" strike="noStrike" cap="none">
           <a:solidFill>
             <a:srgbClr val="000000"/>
           </a:solidFill>
@@ -3982,7 +4097,7 @@
           <a:sym typeface="Arial"/>
         </a:defRPr>
       </a:lvl3pPr>
-      <a:lvl4pPr lvl="3" marR="0" rtl="0" algn="l">
+      <a:lvl4pPr marR="0" lvl="3" algn="l" rtl="0">
         <a:lnSpc>
           <a:spcPct val="100000"/>
         </a:lnSpc>
@@ -3996,7 +4111,7 @@
           <a:srgbClr val="000000"/>
         </a:buClr>
         <a:buFont typeface="Arial"/>
-        <a:defRPr b="0" i="0" sz="1400" u="none" cap="none" strike="noStrike">
+        <a:defRPr sz="1400" b="0" i="0" u="none" strike="noStrike" cap="none">
           <a:solidFill>
             <a:srgbClr val="000000"/>
           </a:solidFill>
@@ -4006,7 +4121,7 @@
           <a:sym typeface="Arial"/>
         </a:defRPr>
       </a:lvl4pPr>
-      <a:lvl5pPr lvl="4" marR="0" rtl="0" algn="l">
+      <a:lvl5pPr marR="0" lvl="4" algn="l" rtl="0">
         <a:lnSpc>
           <a:spcPct val="100000"/>
         </a:lnSpc>
@@ -4020,7 +4135,7 @@
           <a:srgbClr val="000000"/>
         </a:buClr>
         <a:buFont typeface="Arial"/>
-        <a:defRPr b="0" i="0" sz="1400" u="none" cap="none" strike="noStrike">
+        <a:defRPr sz="1400" b="0" i="0" u="none" strike="noStrike" cap="none">
           <a:solidFill>
             <a:srgbClr val="000000"/>
           </a:solidFill>
@@ -4030,7 +4145,7 @@
           <a:sym typeface="Arial"/>
         </a:defRPr>
       </a:lvl5pPr>
-      <a:lvl6pPr lvl="5" marR="0" rtl="0" algn="l">
+      <a:lvl6pPr marR="0" lvl="5" algn="l" rtl="0">
         <a:lnSpc>
           <a:spcPct val="100000"/>
         </a:lnSpc>
@@ -4044,7 +4159,7 @@
           <a:srgbClr val="000000"/>
         </a:buClr>
         <a:buFont typeface="Arial"/>
-        <a:defRPr b="0" i="0" sz="1400" u="none" cap="none" strike="noStrike">
+        <a:defRPr sz="1400" b="0" i="0" u="none" strike="noStrike" cap="none">
           <a:solidFill>
             <a:srgbClr val="000000"/>
           </a:solidFill>
@@ -4054,7 +4169,7 @@
           <a:sym typeface="Arial"/>
         </a:defRPr>
       </a:lvl6pPr>
-      <a:lvl7pPr lvl="6" marR="0" rtl="0" algn="l">
+      <a:lvl7pPr marR="0" lvl="6" algn="l" rtl="0">
         <a:lnSpc>
           <a:spcPct val="100000"/>
         </a:lnSpc>
@@ -4068,7 +4183,7 @@
           <a:srgbClr val="000000"/>
         </a:buClr>
         <a:buFont typeface="Arial"/>
-        <a:defRPr b="0" i="0" sz="1400" u="none" cap="none" strike="noStrike">
+        <a:defRPr sz="1400" b="0" i="0" u="none" strike="noStrike" cap="none">
           <a:solidFill>
             <a:srgbClr val="000000"/>
           </a:solidFill>
@@ -4078,7 +4193,7 @@
           <a:sym typeface="Arial"/>
         </a:defRPr>
       </a:lvl7pPr>
-      <a:lvl8pPr lvl="7" marR="0" rtl="0" algn="l">
+      <a:lvl8pPr marR="0" lvl="7" algn="l" rtl="0">
         <a:lnSpc>
           <a:spcPct val="100000"/>
         </a:lnSpc>
@@ -4092,7 +4207,7 @@
           <a:srgbClr val="000000"/>
         </a:buClr>
         <a:buFont typeface="Arial"/>
-        <a:defRPr b="0" i="0" sz="1400" u="none" cap="none" strike="noStrike">
+        <a:defRPr sz="1400" b="0" i="0" u="none" strike="noStrike" cap="none">
           <a:solidFill>
             <a:srgbClr val="000000"/>
           </a:solidFill>
@@ -4102,7 +4217,7 @@
           <a:sym typeface="Arial"/>
         </a:defRPr>
       </a:lvl8pPr>
-      <a:lvl9pPr lvl="8" marR="0" rtl="0" algn="l">
+      <a:lvl9pPr marR="0" lvl="8" algn="l" rtl="0">
         <a:lnSpc>
           <a:spcPct val="100000"/>
         </a:lnSpc>
@@ -4116,7 +4231,7 @@
           <a:srgbClr val="000000"/>
         </a:buClr>
         <a:buFont typeface="Arial"/>
-        <a:defRPr b="0" i="0" sz="1400" u="none" cap="none" strike="noStrike">
+        <a:defRPr sz="1400" b="0" i="0" u="none" strike="noStrike" cap="none">
           <a:solidFill>
             <a:srgbClr val="000000"/>
           </a:solidFill>
@@ -4132,11 +4247,11 @@
 </file>
 
 <file path=ppt/slides/slide1.xml><?xml version="1.0" encoding="utf-8"?>
-<p:sld xmlns:a="http://schemas.openxmlformats.org/drawingml/2006/main" xmlns:r="http://schemas.openxmlformats.org/officeDocument/2006/relationships" xmlns:mc="http://schemas.openxmlformats.org/markup-compatibility/2006" xmlns:mv="urn:schemas-microsoft-com:mac:vml" xmlns:p="http://schemas.openxmlformats.org/presentationml/2006/main" xmlns:c="http://schemas.openxmlformats.org/drawingml/2006/chart" xmlns:dgm="http://schemas.openxmlformats.org/drawingml/2006/diagram" xmlns:o="urn:schemas-microsoft-com:office:office" xmlns:v="urn:schemas-microsoft-com:vml" xmlns:pvml="urn:schemas-microsoft-com:office:powerpoint" xmlns:com="http://schemas.openxmlformats.org/drawingml/2006/compatibility" xmlns:p14="http://schemas.microsoft.com/office/powerpoint/2010/main" xmlns:p15="http://schemas.microsoft.com/office/powerpoint/2012/main">
+<p:sld xmlns:a="http://schemas.openxmlformats.org/drawingml/2006/main" xmlns:r="http://schemas.openxmlformats.org/officeDocument/2006/relationships" xmlns:p="http://schemas.openxmlformats.org/presentationml/2006/main">
   <p:cSld>
     <p:spTree>
       <p:nvGrpSpPr>
-        <p:cNvPr id="26" name="Shape 26"/>
+        <p:cNvPr id="1" name="Shape 26"/>
         <p:cNvGrpSpPr/>
         <p:nvPr/>
       </p:nvGrpSpPr>
@@ -4151,7 +4266,9 @@
       <p:sp>
         <p:nvSpPr>
           <p:cNvPr id="27" name="Google Shape;27;p8"/>
-          <p:cNvSpPr txBox="1"/>
+          <p:cNvSpPr txBox="1">
+            <a:spLocks noGrp="1"/>
+          </p:cNvSpPr>
           <p:nvPr>
             <p:ph type="ctrTitle"/>
           </p:nvPr>
@@ -4166,12 +4283,12 @@
           </a:prstGeom>
         </p:spPr>
         <p:txBody>
-          <a:bodyPr anchorCtr="0" anchor="b" bIns="91425" lIns="91425" spcFirstLastPara="1" rIns="91425" wrap="square" tIns="91425">
+          <a:bodyPr spcFirstLastPara="1" wrap="square" lIns="91425" tIns="91425" rIns="91425" bIns="91425" anchor="b" anchorCtr="0">
             <a:noAutofit/>
           </a:bodyPr>
           <a:lstStyle/>
           <a:p>
-            <a:pPr indent="0" lvl="0" marL="0" rtl="0" algn="ctr">
+            <a:pPr marL="0" lvl="0" indent="0" algn="ctr" rtl="0">
               <a:spcBef>
                 <a:spcPts val="0"/>
               </a:spcBef>
@@ -4197,11 +4314,11 @@
 </file>
 
 <file path=ppt/slides/slide10.xml><?xml version="1.0" encoding="utf-8"?>
-<p:sld xmlns:a="http://schemas.openxmlformats.org/drawingml/2006/main" xmlns:r="http://schemas.openxmlformats.org/officeDocument/2006/relationships" xmlns:mc="http://schemas.openxmlformats.org/markup-compatibility/2006" xmlns:mv="urn:schemas-microsoft-com:mac:vml" xmlns:p="http://schemas.openxmlformats.org/presentationml/2006/main" xmlns:c="http://schemas.openxmlformats.org/drawingml/2006/chart" xmlns:dgm="http://schemas.openxmlformats.org/drawingml/2006/diagram" xmlns:o="urn:schemas-microsoft-com:office:office" xmlns:v="urn:schemas-microsoft-com:vml" xmlns:pvml="urn:schemas-microsoft-com:office:powerpoint" xmlns:com="http://schemas.openxmlformats.org/drawingml/2006/compatibility" xmlns:p14="http://schemas.microsoft.com/office/powerpoint/2010/main" xmlns:p15="http://schemas.microsoft.com/office/powerpoint/2012/main">
+<p:sld xmlns:a="http://schemas.openxmlformats.org/drawingml/2006/main" xmlns:r="http://schemas.openxmlformats.org/officeDocument/2006/relationships" xmlns:p="http://schemas.openxmlformats.org/presentationml/2006/main">
   <p:cSld>
     <p:spTree>
       <p:nvGrpSpPr>
-        <p:cNvPr id="81" name="Shape 81"/>
+        <p:cNvPr id="1" name="Shape 81"/>
         <p:cNvGrpSpPr/>
         <p:nvPr/>
       </p:nvGrpSpPr>
@@ -4216,7 +4333,9 @@
       <p:sp>
         <p:nvSpPr>
           <p:cNvPr id="82" name="Google Shape;82;p17"/>
-          <p:cNvSpPr txBox="1"/>
+          <p:cNvSpPr txBox="1">
+            <a:spLocks noGrp="1"/>
+          </p:cNvSpPr>
           <p:nvPr>
             <p:ph type="title"/>
           </p:nvPr>
@@ -4231,12 +4350,12 @@
           </a:prstGeom>
         </p:spPr>
         <p:txBody>
-          <a:bodyPr anchorCtr="0" anchor="b" bIns="91425" lIns="91425" spcFirstLastPara="1" rIns="91425" wrap="square" tIns="91425">
+          <a:bodyPr spcFirstLastPara="1" wrap="square" lIns="91425" tIns="91425" rIns="91425" bIns="91425" anchor="b" anchorCtr="0">
             <a:noAutofit/>
           </a:bodyPr>
           <a:lstStyle/>
           <a:p>
-            <a:pPr indent="0" lvl="0" marL="0" rtl="0" algn="l">
+            <a:pPr marL="0" lvl="0" indent="0" algn="l" rtl="0">
               <a:spcBef>
                 <a:spcPts val="0"/>
               </a:spcBef>
@@ -4256,9 +4375,11 @@
       <p:sp>
         <p:nvSpPr>
           <p:cNvPr id="83" name="Google Shape;83;p17"/>
-          <p:cNvSpPr txBox="1"/>
+          <p:cNvSpPr txBox="1">
+            <a:spLocks noGrp="1"/>
+          </p:cNvSpPr>
           <p:nvPr>
-            <p:ph idx="1" type="body"/>
+            <p:ph type="body" idx="1"/>
           </p:nvPr>
         </p:nvSpPr>
         <p:spPr>
@@ -4271,12 +4392,12 @@
           </a:prstGeom>
         </p:spPr>
         <p:txBody>
-          <a:bodyPr anchorCtr="0" anchor="t" bIns="91425" lIns="91425" spcFirstLastPara="1" rIns="91425" wrap="square" tIns="91425">
+          <a:bodyPr spcFirstLastPara="1" wrap="square" lIns="91425" tIns="91425" rIns="91425" bIns="91425" anchor="t" anchorCtr="0">
             <a:noAutofit/>
           </a:bodyPr>
           <a:lstStyle/>
           <a:p>
-            <a:pPr indent="0" lvl="0" marL="0" rtl="0" algn="l">
+            <a:pPr marL="0" lvl="0" indent="0" algn="l" rtl="0">
               <a:spcBef>
                 <a:spcPts val="600"/>
               </a:spcBef>
@@ -4286,13 +4407,25 @@
               <a:buNone/>
             </a:pPr>
             <a:r>
-              <a:rPr lang="en"/>
+              <a:rPr lang="en" sz="2400" dirty="0"/>
               <a:t>In similar ways you can add other properties on slices - here is an example of looking at the vorticity on the same slice as the velocity field</a:t>
             </a:r>
-            <a:endParaRPr/>
-          </a:p>
-          <a:p>
-            <a:pPr indent="0" lvl="0" marL="0" rtl="0" algn="l">
+            <a:endParaRPr sz="2400" dirty="0"/>
+          </a:p>
+          <a:p>
+            <a:pPr marL="0" lvl="0" indent="0" algn="l" rtl="0">
+              <a:spcBef>
+                <a:spcPts val="600"/>
+              </a:spcBef>
+              <a:spcAft>
+                <a:spcPts val="0"/>
+              </a:spcAft>
+              <a:buNone/>
+            </a:pPr>
+            <a:endParaRPr sz="2400" dirty="0"/>
+          </a:p>
+          <a:p>
+            <a:pPr marL="0" lvl="0" indent="0" algn="l" rtl="0">
               <a:spcBef>
                 <a:spcPts val="600"/>
               </a:spcBef>
@@ -4302,25 +4435,10 @@
               <a:buNone/>
             </a:pPr>
             <a:r>
-              <a:t/>
-            </a:r>
-            <a:endParaRPr/>
-          </a:p>
-          <a:p>
-            <a:pPr indent="0" lvl="0" marL="0" rtl="0" algn="l">
-              <a:spcBef>
-                <a:spcPts val="600"/>
-              </a:spcBef>
-              <a:spcAft>
-                <a:spcPts val="0"/>
-              </a:spcAft>
-              <a:buNone/>
-            </a:pPr>
-            <a:r>
-              <a:rPr lang="en"/>
+              <a:rPr lang="en" sz="2400" dirty="0"/>
               <a:t>Once again you just apply the operator attribute to the desired field (here I also modified some of the plot attributes of the vorticity field.) </a:t>
             </a:r>
-            <a:endParaRPr/>
+            <a:endParaRPr sz="2400" dirty="0"/>
           </a:p>
         </p:txBody>
       </p:sp>
@@ -4333,11 +4451,11 @@
 </file>
 
 <file path=ppt/slides/slide11.xml><?xml version="1.0" encoding="utf-8"?>
-<p:sld xmlns:a="http://schemas.openxmlformats.org/drawingml/2006/main" xmlns:r="http://schemas.openxmlformats.org/officeDocument/2006/relationships" xmlns:mc="http://schemas.openxmlformats.org/markup-compatibility/2006" xmlns:mv="urn:schemas-microsoft-com:mac:vml" xmlns:p="http://schemas.openxmlformats.org/presentationml/2006/main" xmlns:c="http://schemas.openxmlformats.org/drawingml/2006/chart" xmlns:dgm="http://schemas.openxmlformats.org/drawingml/2006/diagram" xmlns:o="urn:schemas-microsoft-com:office:office" xmlns:v="urn:schemas-microsoft-com:vml" xmlns:pvml="urn:schemas-microsoft-com:office:powerpoint" xmlns:com="http://schemas.openxmlformats.org/drawingml/2006/compatibility" xmlns:p14="http://schemas.microsoft.com/office/powerpoint/2010/main" xmlns:p15="http://schemas.microsoft.com/office/powerpoint/2012/main">
+<p:sld xmlns:a="http://schemas.openxmlformats.org/drawingml/2006/main" xmlns:r="http://schemas.openxmlformats.org/officeDocument/2006/relationships" xmlns:p="http://schemas.openxmlformats.org/presentationml/2006/main">
   <p:cSld>
     <p:spTree>
       <p:nvGrpSpPr>
-        <p:cNvPr id="87" name="Shape 87"/>
+        <p:cNvPr id="1" name="Shape 87"/>
         <p:cNvGrpSpPr/>
         <p:nvPr/>
       </p:nvGrpSpPr>
@@ -4352,7 +4470,9 @@
       <p:sp>
         <p:nvSpPr>
           <p:cNvPr id="88" name="Google Shape;88;p18"/>
-          <p:cNvSpPr txBox="1"/>
+          <p:cNvSpPr txBox="1">
+            <a:spLocks noGrp="1"/>
+          </p:cNvSpPr>
           <p:nvPr>
             <p:ph type="title"/>
           </p:nvPr>
@@ -4367,12 +4487,12 @@
           </a:prstGeom>
         </p:spPr>
         <p:txBody>
-          <a:bodyPr anchorCtr="0" anchor="b" bIns="91425" lIns="91425" spcFirstLastPara="1" rIns="91425" wrap="square" tIns="91425">
+          <a:bodyPr spcFirstLastPara="1" wrap="square" lIns="91425" tIns="91425" rIns="91425" bIns="91425" anchor="b" anchorCtr="0">
             <a:noAutofit/>
           </a:bodyPr>
           <a:lstStyle/>
           <a:p>
-            <a:pPr indent="0" lvl="0" marL="0" rtl="0" algn="l">
+            <a:pPr marL="0" lvl="0" indent="0" algn="l" rtl="0">
               <a:spcBef>
                 <a:spcPts val="0"/>
               </a:spcBef>
@@ -4392,9 +4512,11 @@
       <p:sp>
         <p:nvSpPr>
           <p:cNvPr id="89" name="Google Shape;89;p18"/>
-          <p:cNvSpPr txBox="1"/>
+          <p:cNvSpPr txBox="1">
+            <a:spLocks noGrp="1"/>
+          </p:cNvSpPr>
           <p:nvPr>
-            <p:ph idx="1" type="body"/>
+            <p:ph type="body" idx="1"/>
           </p:nvPr>
         </p:nvSpPr>
         <p:spPr>
@@ -4407,12 +4529,12 @@
           </a:prstGeom>
         </p:spPr>
         <p:txBody>
-          <a:bodyPr anchorCtr="0" anchor="t" bIns="91425" lIns="91425" spcFirstLastPara="1" rIns="91425" wrap="square" tIns="91425">
+          <a:bodyPr spcFirstLastPara="1" wrap="square" lIns="91425" tIns="91425" rIns="91425" bIns="91425" anchor="t" anchorCtr="0">
             <a:noAutofit/>
           </a:bodyPr>
           <a:lstStyle/>
           <a:p>
-            <a:pPr indent="0" lvl="0" marL="0" rtl="0" algn="l">
+            <a:pPr marL="0" lvl="0" indent="0" algn="l" rtl="0">
               <a:spcBef>
                 <a:spcPts val="600"/>
               </a:spcBef>
@@ -4428,7 +4550,7 @@
             <a:endParaRPr/>
           </a:p>
           <a:p>
-            <a:pPr indent="0" lvl="0" marL="0" rtl="0" algn="l">
+            <a:pPr marL="0" lvl="0" indent="0" algn="l" rtl="0">
               <a:spcBef>
                 <a:spcPts val="600"/>
               </a:spcBef>
@@ -4437,9 +4559,6 @@
               </a:spcAft>
               <a:buNone/>
             </a:pPr>
-            <a:r>
-              <a:t/>
-            </a:r>
             <a:endParaRPr/>
           </a:p>
         </p:txBody>
@@ -4481,11 +4600,11 @@
 </file>
 
 <file path=ppt/slides/slide2.xml><?xml version="1.0" encoding="utf-8"?>
-<p:sld xmlns:a="http://schemas.openxmlformats.org/drawingml/2006/main" xmlns:r="http://schemas.openxmlformats.org/officeDocument/2006/relationships" xmlns:mc="http://schemas.openxmlformats.org/markup-compatibility/2006" xmlns:mv="urn:schemas-microsoft-com:mac:vml" xmlns:p="http://schemas.openxmlformats.org/presentationml/2006/main" xmlns:c="http://schemas.openxmlformats.org/drawingml/2006/chart" xmlns:dgm="http://schemas.openxmlformats.org/drawingml/2006/diagram" xmlns:o="urn:schemas-microsoft-com:office:office" xmlns:v="urn:schemas-microsoft-com:vml" xmlns:pvml="urn:schemas-microsoft-com:office:powerpoint" xmlns:com="http://schemas.openxmlformats.org/drawingml/2006/compatibility" xmlns:p14="http://schemas.microsoft.com/office/powerpoint/2010/main" xmlns:p15="http://schemas.microsoft.com/office/powerpoint/2012/main">
+<p:sld xmlns:a="http://schemas.openxmlformats.org/drawingml/2006/main" xmlns:r="http://schemas.openxmlformats.org/officeDocument/2006/relationships" xmlns:p="http://schemas.openxmlformats.org/presentationml/2006/main">
   <p:cSld>
     <p:spTree>
       <p:nvGrpSpPr>
-        <p:cNvPr id="31" name="Shape 31"/>
+        <p:cNvPr id="1" name="Shape 31"/>
         <p:cNvGrpSpPr/>
         <p:nvPr/>
       </p:nvGrpSpPr>
@@ -4500,9 +4619,11 @@
       <p:sp>
         <p:nvSpPr>
           <p:cNvPr id="32" name="Google Shape;32;p9"/>
-          <p:cNvSpPr txBox="1"/>
+          <p:cNvSpPr txBox="1">
+            <a:spLocks noGrp="1"/>
+          </p:cNvSpPr>
           <p:nvPr>
-            <p:ph idx="1" type="body"/>
+            <p:ph type="body" idx="1"/>
           </p:nvPr>
         </p:nvSpPr>
         <p:spPr>
@@ -4515,12 +4636,12 @@
           </a:prstGeom>
         </p:spPr>
         <p:txBody>
-          <a:bodyPr anchorCtr="0" anchor="t" bIns="91425" lIns="91425" spcFirstLastPara="1" rIns="91425" wrap="square" tIns="91425">
+          <a:bodyPr spcFirstLastPara="1" wrap="square" lIns="91425" tIns="91425" rIns="91425" bIns="91425" anchor="t" anchorCtr="0">
             <a:noAutofit/>
           </a:bodyPr>
           <a:lstStyle/>
           <a:p>
-            <a:pPr indent="0" lvl="0" marL="0" rtl="0" algn="l">
+            <a:pPr marL="0" lvl="0" indent="0" algn="l" rtl="0">
               <a:spcBef>
                 <a:spcPts val="600"/>
               </a:spcBef>
@@ -4536,7 +4657,7 @@
             <a:endParaRPr/>
           </a:p>
           <a:p>
-            <a:pPr indent="457200" lvl="0" marL="0" rtl="0" algn="ctr">
+            <a:pPr marL="0" lvl="0" indent="457200" algn="ctr" rtl="0">
               <a:spcBef>
                 <a:spcPts val="600"/>
               </a:spcBef>
@@ -4550,13 +4671,13 @@
               <a:t>	</a:t>
             </a:r>
             <a:r>
-              <a:rPr b="1" lang="en" sz="4800"/>
+              <a:rPr lang="en" sz="4800" b="1"/>
               <a:t>VISIT/MATLAB - How to make it look better</a:t>
             </a:r>
-            <a:endParaRPr b="1" sz="4800"/>
-          </a:p>
-          <a:p>
-            <a:pPr indent="0" lvl="0" marL="0" rtl="0" algn="l">
+            <a:endParaRPr sz="4800" b="1"/>
+          </a:p>
+          <a:p>
+            <a:pPr marL="0" lvl="0" indent="0" algn="l" rtl="0">
               <a:spcBef>
                 <a:spcPts val="600"/>
               </a:spcBef>
@@ -4569,7 +4690,7 @@
               <a:rPr lang="en"/>
               <a:t>many of the same things apply in 3D</a:t>
             </a:r>
-            <a:endParaRPr b="1" sz="4800"/>
+            <a:endParaRPr sz="4800" b="1"/>
           </a:p>
         </p:txBody>
       </p:sp>
@@ -4582,11 +4703,11 @@
 </file>
 
 <file path=ppt/slides/slide3.xml><?xml version="1.0" encoding="utf-8"?>
-<p:sld xmlns:a="http://schemas.openxmlformats.org/drawingml/2006/main" xmlns:r="http://schemas.openxmlformats.org/officeDocument/2006/relationships" xmlns:mc="http://schemas.openxmlformats.org/markup-compatibility/2006" xmlns:mv="urn:schemas-microsoft-com:mac:vml" xmlns:p="http://schemas.openxmlformats.org/presentationml/2006/main" xmlns:c="http://schemas.openxmlformats.org/drawingml/2006/chart" xmlns:dgm="http://schemas.openxmlformats.org/drawingml/2006/diagram" xmlns:o="urn:schemas-microsoft-com:office:office" xmlns:v="urn:schemas-microsoft-com:vml" xmlns:pvml="urn:schemas-microsoft-com:office:powerpoint" xmlns:com="http://schemas.openxmlformats.org/drawingml/2006/compatibility" xmlns:p14="http://schemas.microsoft.com/office/powerpoint/2010/main" xmlns:p15="http://schemas.microsoft.com/office/powerpoint/2012/main">
+<p:sld xmlns:a="http://schemas.openxmlformats.org/drawingml/2006/main" xmlns:r="http://schemas.openxmlformats.org/officeDocument/2006/relationships" xmlns:p="http://schemas.openxmlformats.org/presentationml/2006/main">
   <p:cSld>
     <p:spTree>
       <p:nvGrpSpPr>
-        <p:cNvPr id="36" name="Shape 36"/>
+        <p:cNvPr id="1" name="Shape 36"/>
         <p:cNvGrpSpPr/>
         <p:nvPr/>
       </p:nvGrpSpPr>
@@ -4601,7 +4722,9 @@
       <p:sp>
         <p:nvSpPr>
           <p:cNvPr id="37" name="Google Shape;37;p10"/>
-          <p:cNvSpPr txBox="1"/>
+          <p:cNvSpPr txBox="1">
+            <a:spLocks noGrp="1"/>
+          </p:cNvSpPr>
           <p:nvPr>
             <p:ph type="title"/>
           </p:nvPr>
@@ -4616,12 +4739,12 @@
           </a:prstGeom>
         </p:spPr>
         <p:txBody>
-          <a:bodyPr anchorCtr="0" anchor="b" bIns="91425" lIns="91425" spcFirstLastPara="1" rIns="91425" wrap="square" tIns="91425">
+          <a:bodyPr spcFirstLastPara="1" wrap="square" lIns="91425" tIns="91425" rIns="91425" bIns="91425" anchor="b" anchorCtr="0">
             <a:noAutofit/>
           </a:bodyPr>
           <a:lstStyle/>
           <a:p>
-            <a:pPr indent="0" lvl="0" marL="0" rtl="0" algn="l">
+            <a:pPr marL="0" lvl="0" indent="0" algn="l" rtl="0">
               <a:spcBef>
                 <a:spcPts val="0"/>
               </a:spcBef>
@@ -4641,9 +4764,11 @@
       <p:sp>
         <p:nvSpPr>
           <p:cNvPr id="38" name="Google Shape;38;p10"/>
-          <p:cNvSpPr txBox="1"/>
+          <p:cNvSpPr txBox="1">
+            <a:spLocks noGrp="1"/>
+          </p:cNvSpPr>
           <p:nvPr>
-            <p:ph idx="1" type="body"/>
+            <p:ph type="body" idx="1"/>
           </p:nvPr>
         </p:nvSpPr>
         <p:spPr>
@@ -4656,12 +4781,12 @@
           </a:prstGeom>
         </p:spPr>
         <p:txBody>
-          <a:bodyPr anchorCtr="0" anchor="t" bIns="91425" lIns="91425" spcFirstLastPara="1" rIns="91425" wrap="square" tIns="91425">
+          <a:bodyPr spcFirstLastPara="1" wrap="square" lIns="91425" tIns="91425" rIns="91425" bIns="91425" anchor="t" anchorCtr="0">
             <a:noAutofit/>
           </a:bodyPr>
           <a:lstStyle/>
           <a:p>
-            <a:pPr indent="0" lvl="0" marL="0" rtl="0" algn="l">
+            <a:pPr marL="0" lvl="0" indent="0" algn="l" rtl="0">
               <a:spcBef>
                 <a:spcPts val="600"/>
               </a:spcBef>
@@ -4677,7 +4802,7 @@
             <a:endParaRPr/>
           </a:p>
           <a:p>
-            <a:pPr indent="-419100" lvl="0" marL="914400" rtl="0" algn="l">
+            <a:pPr marL="914400" lvl="0" indent="-419100" algn="l" rtl="0">
               <a:spcBef>
                 <a:spcPts val="600"/>
               </a:spcBef>
@@ -4694,7 +4819,7 @@
             <a:endParaRPr/>
           </a:p>
           <a:p>
-            <a:pPr indent="-419100" lvl="0" marL="914400" rtl="0" algn="l">
+            <a:pPr marL="914400" lvl="0" indent="-419100" algn="l" rtl="0">
               <a:spcBef>
                 <a:spcPts val="0"/>
               </a:spcBef>
@@ -4721,11 +4846,11 @@
 </file>
 
 <file path=ppt/slides/slide4.xml><?xml version="1.0" encoding="utf-8"?>
-<p:sld xmlns:a="http://schemas.openxmlformats.org/drawingml/2006/main" xmlns:r="http://schemas.openxmlformats.org/officeDocument/2006/relationships" xmlns:mc="http://schemas.openxmlformats.org/markup-compatibility/2006" xmlns:mv="urn:schemas-microsoft-com:mac:vml" xmlns:p="http://schemas.openxmlformats.org/presentationml/2006/main" xmlns:c="http://schemas.openxmlformats.org/drawingml/2006/chart" xmlns:dgm="http://schemas.openxmlformats.org/drawingml/2006/diagram" xmlns:o="urn:schemas-microsoft-com:office:office" xmlns:v="urn:schemas-microsoft-com:vml" xmlns:pvml="urn:schemas-microsoft-com:office:powerpoint" xmlns:com="http://schemas.openxmlformats.org/drawingml/2006/compatibility" xmlns:p14="http://schemas.microsoft.com/office/powerpoint/2010/main" xmlns:p15="http://schemas.microsoft.com/office/powerpoint/2012/main">
+<p:sld xmlns:a="http://schemas.openxmlformats.org/drawingml/2006/main" xmlns:r="http://schemas.openxmlformats.org/officeDocument/2006/relationships" xmlns:p="http://schemas.openxmlformats.org/presentationml/2006/main">
   <p:cSld>
     <p:spTree>
       <p:nvGrpSpPr>
-        <p:cNvPr id="42" name="Shape 42"/>
+        <p:cNvPr id="1" name="Shape 42"/>
         <p:cNvGrpSpPr/>
         <p:nvPr/>
       </p:nvGrpSpPr>
@@ -4740,7 +4865,9 @@
       <p:sp>
         <p:nvSpPr>
           <p:cNvPr id="43" name="Google Shape;43;p11"/>
-          <p:cNvSpPr txBox="1"/>
+          <p:cNvSpPr txBox="1">
+            <a:spLocks noGrp="1"/>
+          </p:cNvSpPr>
           <p:nvPr>
             <p:ph type="title"/>
           </p:nvPr>
@@ -4755,12 +4882,12 @@
           </a:prstGeom>
         </p:spPr>
         <p:txBody>
-          <a:bodyPr anchorCtr="0" anchor="b" bIns="91425" lIns="91425" spcFirstLastPara="1" rIns="91425" wrap="square" tIns="91425">
+          <a:bodyPr spcFirstLastPara="1" wrap="square" lIns="91425" tIns="91425" rIns="91425" bIns="91425" anchor="b" anchorCtr="0">
             <a:noAutofit/>
           </a:bodyPr>
           <a:lstStyle/>
           <a:p>
-            <a:pPr indent="0" lvl="0" marL="0" rtl="0" algn="l">
+            <a:pPr marL="0" lvl="0" indent="0" algn="l" rtl="0">
               <a:spcBef>
                 <a:spcPts val="0"/>
               </a:spcBef>
@@ -4780,9 +4907,11 @@
       <p:sp>
         <p:nvSpPr>
           <p:cNvPr id="44" name="Google Shape;44;p11"/>
-          <p:cNvSpPr txBox="1"/>
+          <p:cNvSpPr txBox="1">
+            <a:spLocks noGrp="1"/>
+          </p:cNvSpPr>
           <p:nvPr>
-            <p:ph idx="1" type="body"/>
+            <p:ph type="body" idx="1"/>
           </p:nvPr>
         </p:nvSpPr>
         <p:spPr>
@@ -4795,12 +4924,12 @@
           </a:prstGeom>
         </p:spPr>
         <p:txBody>
-          <a:bodyPr anchorCtr="0" anchor="t" bIns="91425" lIns="91425" spcFirstLastPara="1" rIns="91425" wrap="square" tIns="91425">
+          <a:bodyPr spcFirstLastPara="1" wrap="square" lIns="91425" tIns="91425" rIns="91425" bIns="91425" anchor="t" anchorCtr="0">
             <a:noAutofit/>
           </a:bodyPr>
           <a:lstStyle/>
           <a:p>
-            <a:pPr indent="-419100" lvl="0" marL="457200" rtl="0" algn="l">
+            <a:pPr marL="457200" lvl="0" indent="-419100" algn="l" rtl="0">
               <a:spcBef>
                 <a:spcPts val="600"/>
               </a:spcBef>
@@ -4811,13 +4940,13 @@
               <a:buChar char="●"/>
             </a:pPr>
             <a:r>
-              <a:rPr lang="en"/>
+              <a:rPr lang="en" sz="2800" dirty="0"/>
               <a:t>add contour of omega_magnitude</a:t>
             </a:r>
-            <a:endParaRPr/>
-          </a:p>
-          <a:p>
-            <a:pPr indent="-419100" lvl="0" marL="457200" rtl="0" algn="l">
+            <a:endParaRPr sz="2800" dirty="0"/>
+          </a:p>
+          <a:p>
+            <a:pPr marL="457200" lvl="0" indent="-419100" algn="l" rtl="0">
               <a:spcBef>
                 <a:spcPts val="0"/>
               </a:spcBef>
@@ -4828,13 +4957,13 @@
               <a:buChar char="●"/>
             </a:pPr>
             <a:r>
-              <a:rPr lang="en"/>
+              <a:rPr lang="en" sz="2800" dirty="0"/>
               <a:t>modify the attributes</a:t>
             </a:r>
-            <a:endParaRPr/>
-          </a:p>
-          <a:p>
-            <a:pPr indent="-381000" lvl="1" marL="914400" rtl="0" algn="l">
+            <a:endParaRPr sz="2800" dirty="0"/>
+          </a:p>
+          <a:p>
+            <a:pPr marL="914400" lvl="1" indent="-381000" algn="l" rtl="0">
               <a:spcBef>
                 <a:spcPts val="0"/>
               </a:spcBef>
@@ -4845,13 +4974,13 @@
               <a:buChar char="○"/>
             </a:pPr>
             <a:r>
-              <a:rPr lang="en"/>
+              <a:rPr lang="en" sz="2000" dirty="0"/>
               <a:t>change the minimum and maximum vorticity as in 2D</a:t>
             </a:r>
-            <a:endParaRPr/>
-          </a:p>
-          <a:p>
-            <a:pPr indent="-381000" lvl="1" marL="914400" rtl="0" algn="l">
+            <a:endParaRPr sz="2000" dirty="0"/>
+          </a:p>
+          <a:p>
+            <a:pPr marL="914400" lvl="1" indent="-381000" algn="l" rtl="0">
               <a:spcBef>
                 <a:spcPts val="0"/>
               </a:spcBef>
@@ -4862,13 +4991,13 @@
               <a:buChar char="○"/>
             </a:pPr>
             <a:r>
-              <a:rPr lang="en"/>
+              <a:rPr lang="en" sz="2000" dirty="0"/>
               <a:t>modify N levels somewhere between 5 and 10</a:t>
             </a:r>
-            <a:endParaRPr/>
-          </a:p>
-          <a:p>
-            <a:pPr indent="-381000" lvl="1" marL="914400" rtl="0" algn="l">
+            <a:endParaRPr sz="2000" dirty="0"/>
+          </a:p>
+          <a:p>
+            <a:pPr marL="914400" lvl="1" indent="-381000" algn="l" rtl="0">
               <a:spcBef>
                 <a:spcPts val="0"/>
               </a:spcBef>
@@ -4879,13 +5008,13 @@
               <a:buChar char="○"/>
             </a:pPr>
             <a:r>
-              <a:rPr lang="en"/>
+              <a:rPr lang="en" sz="2000" dirty="0"/>
               <a:t>choose single for contour colors</a:t>
             </a:r>
-            <a:endParaRPr/>
-          </a:p>
-          <a:p>
-            <a:pPr indent="-381000" lvl="2" marL="1371600" rtl="0" algn="l">
+            <a:endParaRPr sz="2000" dirty="0"/>
+          </a:p>
+          <a:p>
+            <a:pPr marL="1371600" lvl="2" indent="-381000" algn="l" rtl="0">
               <a:spcBef>
                 <a:spcPts val="0"/>
               </a:spcBef>
@@ -4896,13 +5025,13 @@
               <a:buChar char="■"/>
             </a:pPr>
             <a:r>
-              <a:rPr lang="en"/>
+              <a:rPr lang="en" sz="2000" dirty="0"/>
               <a:t>modify the color - I chose blue</a:t>
             </a:r>
-            <a:endParaRPr/>
-          </a:p>
-          <a:p>
-            <a:pPr indent="-381000" lvl="2" marL="1371600" rtl="0" algn="l">
+            <a:endParaRPr sz="2000" dirty="0"/>
+          </a:p>
+          <a:p>
+            <a:pPr marL="1371600" lvl="2" indent="-381000" algn="l" rtl="0">
               <a:spcBef>
                 <a:spcPts val="0"/>
               </a:spcBef>
@@ -4913,13 +5042,13 @@
               <a:buChar char="■"/>
             </a:pPr>
             <a:r>
-              <a:rPr lang="en"/>
+              <a:rPr lang="en" sz="2000" dirty="0"/>
               <a:t>modify the opacity between 10% and 15% </a:t>
             </a:r>
-            <a:endParaRPr/>
-          </a:p>
-          <a:p>
-            <a:pPr indent="-419100" lvl="0" marL="457200" rtl="0" algn="l">
+            <a:endParaRPr sz="2000" dirty="0"/>
+          </a:p>
+          <a:p>
+            <a:pPr marL="457200" lvl="0" indent="-419100" algn="l" rtl="0">
               <a:spcBef>
                 <a:spcPts val="0"/>
               </a:spcBef>
@@ -4930,13 +5059,13 @@
               <a:buChar char="●"/>
             </a:pPr>
             <a:r>
-              <a:rPr lang="en"/>
+              <a:rPr lang="en" sz="2800" dirty="0"/>
               <a:t>zoom in and modify the camera angle </a:t>
             </a:r>
-            <a:endParaRPr/>
-          </a:p>
-          <a:p>
-            <a:pPr indent="0" lvl="0" marL="0" rtl="0" algn="l">
+            <a:endParaRPr sz="2800" dirty="0"/>
+          </a:p>
+          <a:p>
+            <a:pPr marL="0" lvl="0" indent="0" algn="l" rtl="0">
               <a:spcBef>
                 <a:spcPts val="600"/>
               </a:spcBef>
@@ -4945,10 +5074,7 @@
               </a:spcAft>
               <a:buNone/>
             </a:pPr>
-            <a:r>
-              <a:t/>
-            </a:r>
-            <a:endParaRPr/>
+            <a:endParaRPr sz="2800" dirty="0"/>
           </a:p>
         </p:txBody>
       </p:sp>
@@ -4961,11 +5087,11 @@
 </file>
 
 <file path=ppt/slides/slide5.xml><?xml version="1.0" encoding="utf-8"?>
-<p:sld xmlns:a="http://schemas.openxmlformats.org/drawingml/2006/main" xmlns:r="http://schemas.openxmlformats.org/officeDocument/2006/relationships" xmlns:mc="http://schemas.openxmlformats.org/markup-compatibility/2006" xmlns:mv="urn:schemas-microsoft-com:mac:vml" xmlns:p="http://schemas.openxmlformats.org/presentationml/2006/main" xmlns:c="http://schemas.openxmlformats.org/drawingml/2006/chart" xmlns:dgm="http://schemas.openxmlformats.org/drawingml/2006/diagram" xmlns:o="urn:schemas-microsoft-com:office:office" xmlns:v="urn:schemas-microsoft-com:vml" xmlns:pvml="urn:schemas-microsoft-com:office:powerpoint" xmlns:com="http://schemas.openxmlformats.org/drawingml/2006/compatibility" xmlns:p14="http://schemas.microsoft.com/office/powerpoint/2010/main" xmlns:p15="http://schemas.microsoft.com/office/powerpoint/2012/main">
+<p:sld xmlns:a="http://schemas.openxmlformats.org/drawingml/2006/main" xmlns:r="http://schemas.openxmlformats.org/officeDocument/2006/relationships" xmlns:p="http://schemas.openxmlformats.org/presentationml/2006/main">
   <p:cSld>
     <p:spTree>
       <p:nvGrpSpPr>
-        <p:cNvPr id="48" name="Shape 48"/>
+        <p:cNvPr id="1" name="Shape 48"/>
         <p:cNvGrpSpPr/>
         <p:nvPr/>
       </p:nvGrpSpPr>
@@ -4980,7 +5106,9 @@
       <p:sp>
         <p:nvSpPr>
           <p:cNvPr id="49" name="Google Shape;49;p12"/>
-          <p:cNvSpPr txBox="1"/>
+          <p:cNvSpPr txBox="1">
+            <a:spLocks noGrp="1"/>
+          </p:cNvSpPr>
           <p:nvPr>
             <p:ph type="title"/>
           </p:nvPr>
@@ -4995,12 +5123,12 @@
           </a:prstGeom>
         </p:spPr>
         <p:txBody>
-          <a:bodyPr anchorCtr="0" anchor="b" bIns="91425" lIns="91425" spcFirstLastPara="1" rIns="91425" wrap="square" tIns="91425">
+          <a:bodyPr spcFirstLastPara="1" wrap="square" lIns="91425" tIns="91425" rIns="91425" bIns="91425" anchor="b" anchorCtr="0">
             <a:noAutofit/>
           </a:bodyPr>
           <a:lstStyle/>
           <a:p>
-            <a:pPr indent="0" lvl="0" marL="0" rtl="0" algn="l">
+            <a:pPr marL="0" lvl="0" indent="0" algn="l" rtl="0">
               <a:spcBef>
                 <a:spcPts val="0"/>
               </a:spcBef>
@@ -5037,12 +5165,12 @@
           </a:ln>
         </p:spPr>
         <p:txBody>
-          <a:bodyPr anchorCtr="0" anchor="ctr" bIns="91425" lIns="91425" spcFirstLastPara="1" rIns="91425" wrap="square" tIns="91425">
+          <a:bodyPr spcFirstLastPara="1" wrap="square" lIns="91425" tIns="91425" rIns="91425" bIns="91425" anchor="ctr" anchorCtr="0">
             <a:noAutofit/>
           </a:bodyPr>
           <a:lstStyle/>
           <a:p>
-            <a:pPr indent="0" lvl="0" marL="0" rtl="0" algn="l">
+            <a:pPr marL="0" lvl="0" indent="0" algn="l" rtl="0">
               <a:spcBef>
                 <a:spcPts val="0"/>
               </a:spcBef>
@@ -5066,7 +5194,7 @@
             </a:endParaRPr>
           </a:p>
           <a:p>
-            <a:pPr indent="0" lvl="0" marL="0" rtl="0" algn="l">
+            <a:pPr marL="0" lvl="0" indent="0" algn="l" rtl="0">
               <a:spcBef>
                 <a:spcPts val="0"/>
               </a:spcBef>
@@ -5124,11 +5252,11 @@
 </file>
 
 <file path=ppt/slides/slide6.xml><?xml version="1.0" encoding="utf-8"?>
-<p:sld xmlns:a="http://schemas.openxmlformats.org/drawingml/2006/main" xmlns:r="http://schemas.openxmlformats.org/officeDocument/2006/relationships" xmlns:mc="http://schemas.openxmlformats.org/markup-compatibility/2006" xmlns:mv="urn:schemas-microsoft-com:mac:vml" xmlns:p="http://schemas.openxmlformats.org/presentationml/2006/main" xmlns:c="http://schemas.openxmlformats.org/drawingml/2006/chart" xmlns:dgm="http://schemas.openxmlformats.org/drawingml/2006/diagram" xmlns:o="urn:schemas-microsoft-com:office:office" xmlns:v="urn:schemas-microsoft-com:vml" xmlns:pvml="urn:schemas-microsoft-com:office:powerpoint" xmlns:com="http://schemas.openxmlformats.org/drawingml/2006/compatibility" xmlns:p14="http://schemas.microsoft.com/office/powerpoint/2010/main" xmlns:p15="http://schemas.microsoft.com/office/powerpoint/2012/main">
+<p:sld xmlns:a="http://schemas.openxmlformats.org/drawingml/2006/main" xmlns:r="http://schemas.openxmlformats.org/officeDocument/2006/relationships" xmlns:p="http://schemas.openxmlformats.org/presentationml/2006/main">
   <p:cSld>
     <p:spTree>
       <p:nvGrpSpPr>
-        <p:cNvPr id="55" name="Shape 55"/>
+        <p:cNvPr id="1" name="Shape 55"/>
         <p:cNvGrpSpPr/>
         <p:nvPr/>
       </p:nvGrpSpPr>
@@ -5143,7 +5271,9 @@
       <p:sp>
         <p:nvSpPr>
           <p:cNvPr id="56" name="Google Shape;56;p13"/>
-          <p:cNvSpPr txBox="1"/>
+          <p:cNvSpPr txBox="1">
+            <a:spLocks noGrp="1"/>
+          </p:cNvSpPr>
           <p:nvPr>
             <p:ph type="title"/>
           </p:nvPr>
@@ -5158,12 +5288,12 @@
           </a:prstGeom>
         </p:spPr>
         <p:txBody>
-          <a:bodyPr anchorCtr="0" anchor="b" bIns="91425" lIns="91425" spcFirstLastPara="1" rIns="91425" wrap="square" tIns="91425">
+          <a:bodyPr spcFirstLastPara="1" wrap="square" lIns="91425" tIns="91425" rIns="91425" bIns="91425" anchor="b" anchorCtr="0">
             <a:noAutofit/>
           </a:bodyPr>
           <a:lstStyle/>
           <a:p>
-            <a:pPr indent="0" lvl="0" marL="0" rtl="0" algn="l">
+            <a:pPr marL="0" lvl="0" indent="0" algn="l" rtl="0">
               <a:spcBef>
                 <a:spcPts val="0"/>
               </a:spcBef>
@@ -5200,12 +5330,12 @@
           </a:ln>
         </p:spPr>
         <p:txBody>
-          <a:bodyPr anchorCtr="0" anchor="ctr" bIns="91425" lIns="91425" spcFirstLastPara="1" rIns="91425" wrap="square" tIns="91425">
+          <a:bodyPr spcFirstLastPara="1" wrap="square" lIns="91425" tIns="91425" rIns="91425" bIns="91425" anchor="ctr" anchorCtr="0">
             <a:noAutofit/>
           </a:bodyPr>
           <a:lstStyle/>
           <a:p>
-            <a:pPr indent="0" lvl="0" marL="0" rtl="0" algn="l">
+            <a:pPr marL="0" lvl="0" indent="0" algn="l" rtl="0">
               <a:spcBef>
                 <a:spcPts val="0"/>
               </a:spcBef>
@@ -5263,11 +5393,11 @@
 </file>
 
 <file path=ppt/slides/slide7.xml><?xml version="1.0" encoding="utf-8"?>
-<p:sld xmlns:a="http://schemas.openxmlformats.org/drawingml/2006/main" xmlns:r="http://schemas.openxmlformats.org/officeDocument/2006/relationships" xmlns:mc="http://schemas.openxmlformats.org/markup-compatibility/2006" xmlns:mv="urn:schemas-microsoft-com:mac:vml" xmlns:p="http://schemas.openxmlformats.org/presentationml/2006/main" xmlns:c="http://schemas.openxmlformats.org/drawingml/2006/chart" xmlns:dgm="http://schemas.openxmlformats.org/drawingml/2006/diagram" xmlns:o="urn:schemas-microsoft-com:office:office" xmlns:v="urn:schemas-microsoft-com:vml" xmlns:pvml="urn:schemas-microsoft-com:office:powerpoint" xmlns:com="http://schemas.openxmlformats.org/drawingml/2006/compatibility" xmlns:p14="http://schemas.microsoft.com/office/powerpoint/2010/main" xmlns:p15="http://schemas.microsoft.com/office/powerpoint/2012/main">
+<p:sld xmlns:a="http://schemas.openxmlformats.org/drawingml/2006/main" xmlns:r="http://schemas.openxmlformats.org/officeDocument/2006/relationships" xmlns:p="http://schemas.openxmlformats.org/presentationml/2006/main">
   <p:cSld>
     <p:spTree>
       <p:nvGrpSpPr>
-        <p:cNvPr id="62" name="Shape 62"/>
+        <p:cNvPr id="1" name="Shape 62"/>
         <p:cNvGrpSpPr/>
         <p:nvPr/>
       </p:nvGrpSpPr>
@@ -5282,7 +5412,9 @@
       <p:sp>
         <p:nvSpPr>
           <p:cNvPr id="63" name="Google Shape;63;p14"/>
-          <p:cNvSpPr txBox="1"/>
+          <p:cNvSpPr txBox="1">
+            <a:spLocks noGrp="1"/>
+          </p:cNvSpPr>
           <p:nvPr>
             <p:ph type="title"/>
           </p:nvPr>
@@ -5297,12 +5429,12 @@
           </a:prstGeom>
         </p:spPr>
         <p:txBody>
-          <a:bodyPr anchorCtr="0" anchor="b" bIns="91425" lIns="91425" spcFirstLastPara="1" rIns="91425" wrap="square" tIns="91425">
+          <a:bodyPr spcFirstLastPara="1" wrap="square" lIns="91425" tIns="91425" rIns="91425" bIns="91425" anchor="b" anchorCtr="0">
             <a:noAutofit/>
           </a:bodyPr>
           <a:lstStyle/>
           <a:p>
-            <a:pPr indent="0" lvl="0" marL="0" rtl="0" algn="l">
+            <a:pPr marL="0" lvl="0" indent="0" algn="l" rtl="0">
               <a:spcBef>
                 <a:spcPts val="0"/>
               </a:spcBef>
@@ -5322,9 +5454,11 @@
       <p:sp>
         <p:nvSpPr>
           <p:cNvPr id="64" name="Google Shape;64;p14"/>
-          <p:cNvSpPr txBox="1"/>
+          <p:cNvSpPr txBox="1">
+            <a:spLocks noGrp="1"/>
+          </p:cNvSpPr>
           <p:nvPr>
-            <p:ph idx="1" type="body"/>
+            <p:ph type="body" idx="1"/>
           </p:nvPr>
         </p:nvSpPr>
         <p:spPr>
@@ -5337,12 +5471,12 @@
           </a:prstGeom>
         </p:spPr>
         <p:txBody>
-          <a:bodyPr anchorCtr="0" anchor="t" bIns="91425" lIns="91425" spcFirstLastPara="1" rIns="91425" wrap="square" tIns="91425">
+          <a:bodyPr spcFirstLastPara="1" wrap="square" lIns="91425" tIns="91425" rIns="91425" bIns="91425" anchor="t" anchorCtr="0">
             <a:noAutofit/>
           </a:bodyPr>
           <a:lstStyle/>
           <a:p>
-            <a:pPr indent="-419100" lvl="0" marL="457200" rtl="0" algn="l">
+            <a:pPr marL="457200" lvl="0" indent="-419100" algn="l" rtl="0">
               <a:spcBef>
                 <a:spcPts val="600"/>
               </a:spcBef>
@@ -5353,13 +5487,13 @@
               <a:buChar char="●"/>
             </a:pPr>
             <a:r>
-              <a:rPr lang="en"/>
+              <a:rPr lang="en" sz="2800" dirty="0"/>
               <a:t>add vector of U</a:t>
             </a:r>
-            <a:endParaRPr/>
-          </a:p>
-          <a:p>
-            <a:pPr indent="-419100" lvl="0" marL="457200" rtl="0" algn="l">
+            <a:endParaRPr sz="2800" dirty="0"/>
+          </a:p>
+          <a:p>
+            <a:pPr marL="457200" lvl="0" indent="-419100" algn="l" rtl="0">
               <a:spcBef>
                 <a:spcPts val="0"/>
               </a:spcBef>
@@ -5370,13 +5504,13 @@
               <a:buChar char="●"/>
             </a:pPr>
             <a:r>
-              <a:rPr lang="en"/>
+              <a:rPr lang="en" sz="2800" dirty="0"/>
               <a:t>modify the attributes</a:t>
             </a:r>
-            <a:endParaRPr/>
-          </a:p>
-          <a:p>
-            <a:pPr indent="-381000" lvl="1" marL="914400" rtl="0" algn="l">
+            <a:endParaRPr sz="2800" dirty="0"/>
+          </a:p>
+          <a:p>
+            <a:pPr marL="914400" lvl="1" indent="-381000" algn="l" rtl="0">
               <a:spcBef>
                 <a:spcPts val="0"/>
               </a:spcBef>
@@ -5387,13 +5521,13 @@
               <a:buChar char="○"/>
             </a:pPr>
             <a:r>
-              <a:rPr lang="en"/>
+              <a:rPr lang="en" sz="2000" dirty="0"/>
               <a:t>location: change the number of vectors (fixed number = 4000) and place them uniformly</a:t>
             </a:r>
-            <a:endParaRPr/>
-          </a:p>
-          <a:p>
-            <a:pPr indent="-381000" lvl="1" marL="914400" rtl="0" algn="l">
+            <a:endParaRPr sz="2000" dirty="0"/>
+          </a:p>
+          <a:p>
+            <a:pPr marL="914400" lvl="1" indent="-381000" algn="l" rtl="0">
               <a:spcBef>
                 <a:spcPts val="0"/>
               </a:spcBef>
@@ -5404,13 +5538,13 @@
               <a:buChar char="○"/>
             </a:pPr>
             <a:r>
-              <a:rPr lang="en"/>
+              <a:rPr lang="en" sz="2000" dirty="0"/>
               <a:t>form: change form quality to high</a:t>
             </a:r>
-            <a:endParaRPr/>
-          </a:p>
-          <a:p>
-            <a:pPr indent="-381000" lvl="1" marL="914400" rtl="0" algn="l">
+            <a:endParaRPr sz="2000" dirty="0"/>
+          </a:p>
+          <a:p>
+            <a:pPr marL="914400" lvl="1" indent="-381000" algn="l" rtl="0">
               <a:spcBef>
                 <a:spcPts val="0"/>
               </a:spcBef>
@@ -5421,10 +5555,10 @@
               <a:buChar char="○"/>
             </a:pPr>
             <a:r>
-              <a:rPr lang="en"/>
+              <a:rPr lang="en" sz="2000" dirty="0"/>
               <a:t>rendering: change color and set min and max values based on data</a:t>
             </a:r>
-            <a:endParaRPr/>
+            <a:endParaRPr sz="2000" dirty="0"/>
           </a:p>
         </p:txBody>
       </p:sp>
@@ -5437,11 +5571,11 @@
 </file>
 
 <file path=ppt/slides/slide8.xml><?xml version="1.0" encoding="utf-8"?>
-<p:sld xmlns:a="http://schemas.openxmlformats.org/drawingml/2006/main" xmlns:r="http://schemas.openxmlformats.org/officeDocument/2006/relationships" xmlns:mc="http://schemas.openxmlformats.org/markup-compatibility/2006" xmlns:mv="urn:schemas-microsoft-com:mac:vml" xmlns:p="http://schemas.openxmlformats.org/presentationml/2006/main" xmlns:c="http://schemas.openxmlformats.org/drawingml/2006/chart" xmlns:dgm="http://schemas.openxmlformats.org/drawingml/2006/diagram" xmlns:o="urn:schemas-microsoft-com:office:office" xmlns:v="urn:schemas-microsoft-com:vml" xmlns:pvml="urn:schemas-microsoft-com:office:powerpoint" xmlns:com="http://schemas.openxmlformats.org/drawingml/2006/compatibility" xmlns:p14="http://schemas.microsoft.com/office/powerpoint/2010/main" xmlns:p15="http://schemas.microsoft.com/office/powerpoint/2012/main">
+<p:sld xmlns:a="http://schemas.openxmlformats.org/drawingml/2006/main" xmlns:r="http://schemas.openxmlformats.org/officeDocument/2006/relationships" xmlns:p="http://schemas.openxmlformats.org/presentationml/2006/main">
   <p:cSld>
     <p:spTree>
       <p:nvGrpSpPr>
-        <p:cNvPr id="68" name="Shape 68"/>
+        <p:cNvPr id="1" name="Shape 68"/>
         <p:cNvGrpSpPr/>
         <p:nvPr/>
       </p:nvGrpSpPr>
@@ -5456,7 +5590,9 @@
       <p:sp>
         <p:nvSpPr>
           <p:cNvPr id="69" name="Google Shape;69;p15"/>
-          <p:cNvSpPr txBox="1"/>
+          <p:cNvSpPr txBox="1">
+            <a:spLocks noGrp="1"/>
+          </p:cNvSpPr>
           <p:nvPr>
             <p:ph type="title"/>
           </p:nvPr>
@@ -5471,12 +5607,12 @@
           </a:prstGeom>
         </p:spPr>
         <p:txBody>
-          <a:bodyPr anchorCtr="0" anchor="b" bIns="91425" lIns="91425" spcFirstLastPara="1" rIns="91425" wrap="square" tIns="91425">
+          <a:bodyPr spcFirstLastPara="1" wrap="square" lIns="91425" tIns="91425" rIns="91425" bIns="91425" anchor="b" anchorCtr="0">
             <a:noAutofit/>
           </a:bodyPr>
           <a:lstStyle/>
           <a:p>
-            <a:pPr indent="0" lvl="0" marL="0" rtl="0" algn="l">
+            <a:pPr marL="0" lvl="0" indent="0" algn="l" rtl="0">
               <a:spcBef>
                 <a:spcPts val="0"/>
               </a:spcBef>
@@ -5496,9 +5632,11 @@
       <p:sp>
         <p:nvSpPr>
           <p:cNvPr id="70" name="Google Shape;70;p15"/>
-          <p:cNvSpPr txBox="1"/>
+          <p:cNvSpPr txBox="1">
+            <a:spLocks noGrp="1"/>
+          </p:cNvSpPr>
           <p:nvPr>
-            <p:ph idx="1" type="body"/>
+            <p:ph type="body" idx="1"/>
           </p:nvPr>
         </p:nvSpPr>
         <p:spPr>
@@ -5511,12 +5649,12 @@
           </a:prstGeom>
         </p:spPr>
         <p:txBody>
-          <a:bodyPr anchorCtr="0" anchor="t" bIns="91425" lIns="91425" spcFirstLastPara="1" rIns="91425" wrap="square" tIns="91425">
+          <a:bodyPr spcFirstLastPara="1" wrap="square" lIns="91425" tIns="91425" rIns="91425" bIns="91425" anchor="t" anchorCtr="0">
             <a:noAutofit/>
           </a:bodyPr>
           <a:lstStyle/>
           <a:p>
-            <a:pPr indent="-419100" lvl="0" marL="457200" rtl="0" algn="l">
+            <a:pPr marL="457200" lvl="0" indent="-419100" algn="l" rtl="0">
               <a:spcBef>
                 <a:spcPts val="600"/>
               </a:spcBef>
@@ -5527,13 +5665,13 @@
               <a:buChar char="●"/>
             </a:pPr>
             <a:r>
-              <a:rPr lang="en"/>
+              <a:rPr lang="en" sz="2400" dirty="0"/>
               <a:t>deselect apply operators to all plots and apply subset selections to all plots in the main window </a:t>
             </a:r>
-            <a:endParaRPr/>
-          </a:p>
-          <a:p>
-            <a:pPr indent="-419100" lvl="0" marL="457200" rtl="0" algn="l">
+            <a:endParaRPr sz="2400" dirty="0"/>
+          </a:p>
+          <a:p>
+            <a:pPr marL="457200" lvl="0" indent="-419100" algn="l" rtl="0">
               <a:spcBef>
                 <a:spcPts val="0"/>
               </a:spcBef>
@@ -5544,13 +5682,13 @@
               <a:buChar char="●"/>
             </a:pPr>
             <a:r>
-              <a:rPr lang="en"/>
+              <a:rPr lang="en" sz="2400" dirty="0"/>
               <a:t>highlight the added Vector - U </a:t>
             </a:r>
-            <a:endParaRPr/>
-          </a:p>
-          <a:p>
-            <a:pPr indent="-419100" lvl="0" marL="457200" rtl="0" algn="l">
+            <a:endParaRPr sz="2400" dirty="0"/>
+          </a:p>
+          <a:p>
+            <a:pPr marL="457200" lvl="0" indent="-419100" algn="l" rtl="0">
               <a:spcBef>
                 <a:spcPts val="0"/>
               </a:spcBef>
@@ -5561,13 +5699,13 @@
               <a:buChar char="●"/>
             </a:pPr>
             <a:r>
-              <a:rPr lang="en"/>
+              <a:rPr lang="en" sz="2400" dirty="0"/>
               <a:t>choose operator attributes -&gt; selection -&gt; slicing -&gt; slice</a:t>
             </a:r>
-            <a:endParaRPr/>
-          </a:p>
-          <a:p>
-            <a:pPr indent="-419100" lvl="0" marL="457200" rtl="0" algn="l">
+            <a:endParaRPr sz="2400" dirty="0"/>
+          </a:p>
+          <a:p>
+            <a:pPr marL="457200" lvl="0" indent="-419100" algn="l" rtl="0">
               <a:spcBef>
                 <a:spcPts val="0"/>
               </a:spcBef>
@@ -5578,10 +5716,10 @@
               <a:buChar char="●"/>
             </a:pPr>
             <a:r>
-              <a:rPr lang="en"/>
+              <a:rPr lang="en" sz="2400" dirty="0"/>
               <a:t>slice operator attributes -&gt; choose the slice you want </a:t>
             </a:r>
-            <a:endParaRPr/>
+            <a:endParaRPr sz="2400" dirty="0"/>
           </a:p>
         </p:txBody>
       </p:sp>
@@ -5594,11 +5732,11 @@
 </file>
 
 <file path=ppt/slides/slide9.xml><?xml version="1.0" encoding="utf-8"?>
-<p:sld xmlns:a="http://schemas.openxmlformats.org/drawingml/2006/main" xmlns:r="http://schemas.openxmlformats.org/officeDocument/2006/relationships" xmlns:mc="http://schemas.openxmlformats.org/markup-compatibility/2006" xmlns:mv="urn:schemas-microsoft-com:mac:vml" xmlns:p="http://schemas.openxmlformats.org/presentationml/2006/main" xmlns:c="http://schemas.openxmlformats.org/drawingml/2006/chart" xmlns:dgm="http://schemas.openxmlformats.org/drawingml/2006/diagram" xmlns:o="urn:schemas-microsoft-com:office:office" xmlns:v="urn:schemas-microsoft-com:vml" xmlns:pvml="urn:schemas-microsoft-com:office:powerpoint" xmlns:com="http://schemas.openxmlformats.org/drawingml/2006/compatibility" xmlns:p14="http://schemas.microsoft.com/office/powerpoint/2010/main" xmlns:p15="http://schemas.microsoft.com/office/powerpoint/2012/main">
+<p:sld xmlns:a="http://schemas.openxmlformats.org/drawingml/2006/main" xmlns:r="http://schemas.openxmlformats.org/officeDocument/2006/relationships" xmlns:p="http://schemas.openxmlformats.org/presentationml/2006/main">
   <p:cSld>
     <p:spTree>
       <p:nvGrpSpPr>
-        <p:cNvPr id="74" name="Shape 74"/>
+        <p:cNvPr id="1" name="Shape 74"/>
         <p:cNvGrpSpPr/>
         <p:nvPr/>
       </p:nvGrpSpPr>
@@ -5613,7 +5751,9 @@
       <p:sp>
         <p:nvSpPr>
           <p:cNvPr id="75" name="Google Shape;75;p16"/>
-          <p:cNvSpPr txBox="1"/>
+          <p:cNvSpPr txBox="1">
+            <a:spLocks noGrp="1"/>
+          </p:cNvSpPr>
           <p:nvPr>
             <p:ph type="title"/>
           </p:nvPr>
@@ -5628,12 +5768,12 @@
           </a:prstGeom>
         </p:spPr>
         <p:txBody>
-          <a:bodyPr anchorCtr="0" anchor="b" bIns="91425" lIns="91425" spcFirstLastPara="1" rIns="91425" wrap="square" tIns="91425">
+          <a:bodyPr spcFirstLastPara="1" wrap="square" lIns="91425" tIns="91425" rIns="91425" bIns="91425" anchor="b" anchorCtr="0">
             <a:noAutofit/>
           </a:bodyPr>
           <a:lstStyle/>
           <a:p>
-            <a:pPr indent="0" lvl="0" marL="0" rtl="0" algn="l">
+            <a:pPr marL="0" lvl="0" indent="0" algn="l" rtl="0">
               <a:spcBef>
                 <a:spcPts val="0"/>
               </a:spcBef>
@@ -5653,9 +5793,11 @@
       <p:sp>
         <p:nvSpPr>
           <p:cNvPr id="76" name="Google Shape;76;p16"/>
-          <p:cNvSpPr txBox="1"/>
+          <p:cNvSpPr txBox="1">
+            <a:spLocks noGrp="1"/>
+          </p:cNvSpPr>
           <p:nvPr>
-            <p:ph idx="1" type="body"/>
+            <p:ph type="body" idx="1"/>
           </p:nvPr>
         </p:nvSpPr>
         <p:spPr>
@@ -5668,12 +5810,12 @@
           </a:prstGeom>
         </p:spPr>
         <p:txBody>
-          <a:bodyPr anchorCtr="0" anchor="t" bIns="91425" lIns="91425" spcFirstLastPara="1" rIns="91425" wrap="square" tIns="91425">
+          <a:bodyPr spcFirstLastPara="1" wrap="square" lIns="91425" tIns="91425" rIns="91425" bIns="91425" anchor="t" anchorCtr="0">
             <a:noAutofit/>
           </a:bodyPr>
           <a:lstStyle/>
           <a:p>
-            <a:pPr indent="0" lvl="0" marL="0" rtl="0" algn="l">
+            <a:pPr marL="0" lvl="0" indent="0" algn="l" rtl="0">
               <a:spcBef>
                 <a:spcPts val="600"/>
               </a:spcBef>
@@ -5727,7 +5869,7 @@
 </file>
 
 <file path=ppt/theme/theme1.xml><?xml version="1.0" encoding="utf-8"?>
-<a:theme xmlns:a="http://schemas.openxmlformats.org/drawingml/2006/main" xmlns:r="http://schemas.openxmlformats.org/officeDocument/2006/relationships" name="Simple Light">
+<a:theme xmlns:a="http://schemas.openxmlformats.org/drawingml/2006/main" name="Simple Light">
   <a:themeElements>
     <a:clrScheme name="Custom 347">
       <a:dk1>
@@ -6002,11 +6144,13 @@
       </a:bgFillStyleLst>
     </a:fmtScheme>
   </a:themeElements>
+  <a:objectDefaults/>
+  <a:extraClrSchemeLst/>
 </a:theme>
 </file>
 
 <file path=ppt/theme/theme2.xml><?xml version="1.0" encoding="utf-8"?>
-<a:theme xmlns:a="http://schemas.openxmlformats.org/drawingml/2006/main" xmlns:r="http://schemas.openxmlformats.org/officeDocument/2006/relationships">
+<a:theme xmlns:a="http://schemas.openxmlformats.org/drawingml/2006/main">
   <a:themeElements>
     <a:clrScheme name="Default">
       <a:dk1>
@@ -6281,5 +6425,7 @@
       </a:bgFillStyleLst>
     </a:fmtScheme>
   </a:themeElements>
+  <a:objectDefaults/>
+  <a:extraClrSchemeLst/>
 </a:theme>
 </file>
</xml_diff>